<commit_message>
update ppt with app part
</commit_message>
<xml_diff>
--- a/StarGazers.pptx
+++ b/StarGazers.pptx
@@ -4,6 +4,9 @@
   <p:sldMasterIdLst>
     <p:sldMasterId id="2147483648" r:id="rId1"/>
   </p:sldMasterIdLst>
+  <p:notesMasterIdLst>
+    <p:notesMasterId r:id="rId13"/>
+  </p:notesMasterIdLst>
   <p:sldIdLst>
     <p:sldId id="256" r:id="rId2"/>
     <p:sldId id="257" r:id="rId3"/>
@@ -13,32 +16,125 @@
     <p:sldId id="261" r:id="rId7"/>
     <p:sldId id="262" r:id="rId8"/>
     <p:sldId id="263" r:id="rId9"/>
-    <p:sldId id="264" r:id="rId10"/>
-    <p:sldId id="265" r:id="rId11"/>
+    <p:sldId id="267" r:id="rId10"/>
+    <p:sldId id="264" r:id="rId11"/>
+    <p:sldId id="265" r:id="rId12"/>
   </p:sldIdLst>
-  <p:notesMasterIdLst>
-    <p:notesMasterId r:id="rId12"/>
-  </p:notesMasterIdLst>
   <p:sldSz cx="14630400" cy="8229600"/>
   <p:notesSz cx="8229600" cy="14630400"/>
   <p:embeddedFontLst>
     <p:embeddedFont>
-      <p:font typeface="Montserrat Black"/>
-      <p:regular r:id="rId17"/>
+      <p:font typeface="Inconsolata" pitchFamily="49" charset="0"/>
+      <p:regular r:id="rId14"/>
     </p:embeddedFont>
     <p:embeddedFont>
-      <p:font typeface="Montserrat Black"/>
-      <p:regular r:id="rId18"/>
-    </p:embeddedFont>
-    <p:embeddedFont>
-      <p:font typeface="Inconsolata"/>
-      <p:regular r:id="rId19"/>
-    </p:embeddedFont>
-    <p:embeddedFont>
-      <p:font typeface="Inconsolata"/>
-      <p:regular r:id="rId20"/>
+      <p:font typeface="Montserrat Black" panose="020F0502020204030204" pitchFamily="34" charset="0"/>
+      <p:regular r:id="rId15"/>
+      <p:bold r:id="rId16"/>
+      <p:italic r:id="rId17"/>
+      <p:boldItalic r:id="rId18"/>
     </p:embeddedFont>
   </p:embeddedFontLst>
+  <p:defaultTextStyle>
+    <a:defPPr>
+      <a:defRPr lang="zh-CN"/>
+    </a:defPPr>
+    <a:lvl1pPr marL="0" algn="l" defTabSz="914400" rtl="0" eaLnBrk="1" latinLnBrk="0" hangingPunct="1">
+      <a:defRPr sz="1800" kern="1200">
+        <a:solidFill>
+          <a:schemeClr val="tx1"/>
+        </a:solidFill>
+        <a:latin typeface="+mn-lt"/>
+        <a:ea typeface="+mn-ea"/>
+        <a:cs typeface="+mn-cs"/>
+      </a:defRPr>
+    </a:lvl1pPr>
+    <a:lvl2pPr marL="457200" algn="l" defTabSz="914400" rtl="0" eaLnBrk="1" latinLnBrk="0" hangingPunct="1">
+      <a:defRPr sz="1800" kern="1200">
+        <a:solidFill>
+          <a:schemeClr val="tx1"/>
+        </a:solidFill>
+        <a:latin typeface="+mn-lt"/>
+        <a:ea typeface="+mn-ea"/>
+        <a:cs typeface="+mn-cs"/>
+      </a:defRPr>
+    </a:lvl2pPr>
+    <a:lvl3pPr marL="914400" algn="l" defTabSz="914400" rtl="0" eaLnBrk="1" latinLnBrk="0" hangingPunct="1">
+      <a:defRPr sz="1800" kern="1200">
+        <a:solidFill>
+          <a:schemeClr val="tx1"/>
+        </a:solidFill>
+        <a:latin typeface="+mn-lt"/>
+        <a:ea typeface="+mn-ea"/>
+        <a:cs typeface="+mn-cs"/>
+      </a:defRPr>
+    </a:lvl3pPr>
+    <a:lvl4pPr marL="1371600" algn="l" defTabSz="914400" rtl="0" eaLnBrk="1" latinLnBrk="0" hangingPunct="1">
+      <a:defRPr sz="1800" kern="1200">
+        <a:solidFill>
+          <a:schemeClr val="tx1"/>
+        </a:solidFill>
+        <a:latin typeface="+mn-lt"/>
+        <a:ea typeface="+mn-ea"/>
+        <a:cs typeface="+mn-cs"/>
+      </a:defRPr>
+    </a:lvl4pPr>
+    <a:lvl5pPr marL="1828800" algn="l" defTabSz="914400" rtl="0" eaLnBrk="1" latinLnBrk="0" hangingPunct="1">
+      <a:defRPr sz="1800" kern="1200">
+        <a:solidFill>
+          <a:schemeClr val="tx1"/>
+        </a:solidFill>
+        <a:latin typeface="+mn-lt"/>
+        <a:ea typeface="+mn-ea"/>
+        <a:cs typeface="+mn-cs"/>
+      </a:defRPr>
+    </a:lvl5pPr>
+    <a:lvl6pPr marL="2286000" algn="l" defTabSz="914400" rtl="0" eaLnBrk="1" latinLnBrk="0" hangingPunct="1">
+      <a:defRPr sz="1800" kern="1200">
+        <a:solidFill>
+          <a:schemeClr val="tx1"/>
+        </a:solidFill>
+        <a:latin typeface="+mn-lt"/>
+        <a:ea typeface="+mn-ea"/>
+        <a:cs typeface="+mn-cs"/>
+      </a:defRPr>
+    </a:lvl6pPr>
+    <a:lvl7pPr marL="2743200" algn="l" defTabSz="914400" rtl="0" eaLnBrk="1" latinLnBrk="0" hangingPunct="1">
+      <a:defRPr sz="1800" kern="1200">
+        <a:solidFill>
+          <a:schemeClr val="tx1"/>
+        </a:solidFill>
+        <a:latin typeface="+mn-lt"/>
+        <a:ea typeface="+mn-ea"/>
+        <a:cs typeface="+mn-cs"/>
+      </a:defRPr>
+    </a:lvl7pPr>
+    <a:lvl8pPr marL="3200400" algn="l" defTabSz="914400" rtl="0" eaLnBrk="1" latinLnBrk="0" hangingPunct="1">
+      <a:defRPr sz="1800" kern="1200">
+        <a:solidFill>
+          <a:schemeClr val="tx1"/>
+        </a:solidFill>
+        <a:latin typeface="+mn-lt"/>
+        <a:ea typeface="+mn-ea"/>
+        <a:cs typeface="+mn-cs"/>
+      </a:defRPr>
+    </a:lvl8pPr>
+    <a:lvl9pPr marL="3657600" algn="l" defTabSz="914400" rtl="0" eaLnBrk="1" latinLnBrk="0" hangingPunct="1">
+      <a:defRPr sz="1800" kern="1200">
+        <a:solidFill>
+          <a:schemeClr val="tx1"/>
+        </a:solidFill>
+        <a:latin typeface="+mn-lt"/>
+        <a:ea typeface="+mn-ea"/>
+        <a:cs typeface="+mn-cs"/>
+      </a:defRPr>
+    </a:lvl9pPr>
+  </p:defaultTextStyle>
+  <p:extLst>
+    <p:ext uri="{EFAFB233-063F-42B5-8137-9DF3F51BA10A}">
+      <p15:sldGuideLst xmlns:p15="http://schemas.microsoft.com/office/powerpoint/2012/main"/>
+    </p:ext>
+  </p:extLst>
 </p:presentation>
 </file>
 
@@ -64,234 +160,10 @@
           <a:chExt cx="0" cy="0"/>
         </a:xfrm>
       </p:grpSpPr>
-      <p:sp>
-        <p:nvSpPr>
-          <p:cNvPr id="2" name="Header Placeholder 1"/>
-          <p:cNvSpPr>
-            <a:spLocks noGrp="1"/>
-          </p:cNvSpPr>
-          <p:nvPr>
-            <p:ph type="hdr" sz="quarter"/>
-          </p:nvPr>
-        </p:nvSpPr>
-        <p:spPr>
-          <a:xfrm>
-            <a:off x="0" y="0"/>
-            <a:ext cx="2971800" cy="458788"/>
-          </a:xfrm>
-          <a:prstGeom prst="rect">
-            <a:avLst/>
-          </a:prstGeom>
-        </p:spPr>
-        <p:txBody>
-          <a:bodyPr vert="horz" lIns="91440" tIns="45720" rIns="91440" bIns="45720" rtlCol="0"/>
-          <a:lstStyle>
-            <a:lvl1pPr algn="l">
-              <a:defRPr sz="1200"/>
-            </a:lvl1pPr>
-          </a:lstStyle>
-          <a:p>
-            <a:endParaRPr lang="en-US"/>
-          </a:p>
-        </p:txBody>
-      </p:sp>
-      <p:sp>
-        <p:nvSpPr>
-          <p:cNvPr id="3" name="Date Placeholder 2"/>
-          <p:cNvSpPr>
-            <a:spLocks noGrp="1"/>
-          </p:cNvSpPr>
-          <p:nvPr>
-            <p:ph type="dt" idx="1"/>
-          </p:nvPr>
-        </p:nvSpPr>
-        <p:spPr>
-          <a:xfrm>
-            <a:off x="3884613" y="0"/>
-            <a:ext cx="2971800" cy="458788"/>
-          </a:xfrm>
-          <a:prstGeom prst="rect">
-            <a:avLst/>
-          </a:prstGeom>
-        </p:spPr>
-        <p:txBody>
-          <a:bodyPr vert="horz" lIns="91440" tIns="45720" rIns="91440" bIns="45720" rtlCol="0"/>
-          <a:lstStyle>
-            <a:lvl1pPr algn="r">
-              <a:defRPr sz="1200"/>
-            </a:lvl1pPr>
-          </a:lstStyle>
-          <a:p>
-            <a:fld id="{5282F153-3F37-0F45-9E97-73ACFA13230C}" type="datetimeFigureOut">
-              <a:rPr lang="en-US"/>
-              <a:t>7/23/19</a:t>
-            </a:fld>
-            <a:endParaRPr lang="en-US"/>
-          </a:p>
-        </p:txBody>
-      </p:sp>
-      <p:sp>
-        <p:nvSpPr>
-          <p:cNvPr id="4" name="Slide Image Placeholder 3"/>
-          <p:cNvSpPr>
-            <a:spLocks noGrp="1" noRot="1" noChangeAspect="1"/>
-          </p:cNvSpPr>
-          <p:nvPr>
-            <p:ph type="sldImg" idx="2"/>
-          </p:nvPr>
-        </p:nvSpPr>
-        <p:spPr>
-          <a:xfrm>
-            <a:off x="685800" y="1143000"/>
-            <a:ext cx="5486400" cy="3086100"/>
-          </a:xfrm>
-          <a:prstGeom prst="rect">
-            <a:avLst/>
-          </a:prstGeom>
-          <a:noFill/>
-          <a:ln w="12700">
-            <a:solidFill>
-              <a:prstClr val="black"/>
-            </a:solidFill>
-          </a:ln>
-        </p:spPr>
-        <p:txBody>
-          <a:bodyPr vert="horz" lIns="91440" tIns="45720" rIns="91440" bIns="45720" rtlCol="0" anchor="ctr"/>
-          <a:lstStyle/>
-          <a:p>
-            <a:endParaRPr lang="en-US"/>
-          </a:p>
-        </p:txBody>
-      </p:sp>
-      <p:sp>
-        <p:nvSpPr>
-          <p:cNvPr id="5" name="Notes Placeholder 4"/>
-          <p:cNvSpPr>
-            <a:spLocks noGrp="1"/>
-          </p:cNvSpPr>
-          <p:nvPr>
-            <p:ph type="body" sz="quarter" idx="3"/>
-          </p:nvPr>
-        </p:nvSpPr>
-        <p:spPr>
-          <a:xfrm>
-            <a:off x="685800" y="4400550"/>
-            <a:ext cx="5486400" cy="3600450"/>
-          </a:xfrm>
-          <a:prstGeom prst="rect">
-            <a:avLst/>
-          </a:prstGeom>
-        </p:spPr>
-        <p:txBody>
-          <a:bodyPr vert="horz" lIns="91440" tIns="45720" rIns="91440" bIns="45720" rtlCol="0"/>
-          <a:lstStyle/>
-          <a:p>
-            <a:pPr lvl="0"/>
-            <a:r>
-              <a:rPr lang="en-US"/>
-              <a:t>Click to edit Master text styles</a:t>
-            </a:r>
-          </a:p>
-          <a:p>
-            <a:pPr lvl="1"/>
-            <a:r>
-              <a:rPr lang="en-US"/>
-              <a:t>Second level</a:t>
-            </a:r>
-          </a:p>
-          <a:p>
-            <a:pPr lvl="2"/>
-            <a:r>
-              <a:rPr lang="en-US"/>
-              <a:t>Third level</a:t>
-            </a:r>
-          </a:p>
-          <a:p>
-            <a:pPr lvl="3"/>
-            <a:r>
-              <a:rPr lang="en-US"/>
-              <a:t>Fourth level</a:t>
-            </a:r>
-          </a:p>
-          <a:p>
-            <a:pPr lvl="4"/>
-            <a:r>
-              <a:rPr lang="en-US"/>
-              <a:t>Fifth level</a:t>
-            </a:r>
-          </a:p>
-        </p:txBody>
-      </p:sp>
-      <p:sp>
-        <p:nvSpPr>
-          <p:cNvPr id="6" name="Footer Placeholder 5"/>
-          <p:cNvSpPr>
-            <a:spLocks noGrp="1"/>
-          </p:cNvSpPr>
-          <p:nvPr>
-            <p:ph type="ftr" sz="quarter" idx="4"/>
-          </p:nvPr>
-        </p:nvSpPr>
-        <p:spPr>
-          <a:xfrm>
-            <a:off x="0" y="8685213"/>
-            <a:ext cx="2971800" cy="458787"/>
-          </a:xfrm>
-          <a:prstGeom prst="rect">
-            <a:avLst/>
-          </a:prstGeom>
-        </p:spPr>
-        <p:txBody>
-          <a:bodyPr vert="horz" lIns="91440" tIns="45720" rIns="91440" bIns="45720" rtlCol="0" anchor="b"/>
-          <a:lstStyle>
-            <a:lvl1pPr algn="l">
-              <a:defRPr sz="1200"/>
-            </a:lvl1pPr>
-          </a:lstStyle>
-          <a:p>
-            <a:endParaRPr lang="en-US"/>
-          </a:p>
-        </p:txBody>
-      </p:sp>
-      <p:sp>
-        <p:nvSpPr>
-          <p:cNvPr id="7" name="Slide Number Placeholder 6"/>
-          <p:cNvSpPr>
-            <a:spLocks noGrp="1"/>
-          </p:cNvSpPr>
-          <p:nvPr>
-            <p:ph type="sldNum" sz="quarter" idx="5"/>
-          </p:nvPr>
-        </p:nvSpPr>
-        <p:spPr>
-          <a:xfrm>
-            <a:off x="3884613" y="8685213"/>
-            <a:ext cx="2971800" cy="458787"/>
-          </a:xfrm>
-          <a:prstGeom prst="rect">
-            <a:avLst/>
-          </a:prstGeom>
-        </p:spPr>
-        <p:txBody>
-          <a:bodyPr vert="horz" lIns="91440" tIns="45720" rIns="91440" bIns="45720" rtlCol="0" anchor="b"/>
-          <a:lstStyle>
-            <a:lvl1pPr algn="r">
-              <a:defRPr sz="1200"/>
-            </a:lvl1pPr>
-          </a:lstStyle>
-          <a:p>
-            <a:fld id="{CE5E9CC1-C706-0F49-92D6-E571CC5EEA8F}" type="slidenum">
-              <a:rPr lang="en-US"/>
-              <a:t>‹#›</a:t>
-            </a:fld>
-            <a:endParaRPr lang="en-US"/>
-          </a:p>
-        </p:txBody>
-      </p:sp>
     </p:spTree>
     <p:extLst>
       <p:ext uri="{BB962C8B-B14F-4D97-AF65-F5344CB8AC3E}">
-        <p14:creationId xmlns:p14="http://schemas.microsoft.com/office/powerpoint/2010/main" val="1024086991"/>
+        <p14:creationId xmlns:p14="http://schemas.microsoft.com/office/powerpoint/2010/main" val="2860523022"/>
       </p:ext>
     </p:extLst>
   </p:cSld>
@@ -435,10 +307,6 @@
           <a:bodyPr/>
           <a:lstStyle/>
           <a:p>
-            <a:r>
-              <a:rPr lang="en-US" dirty="0"/>
-              <a:t/>
-            </a:r>
             <a:endParaRPr lang="en-US" dirty="0"/>
           </a:p>
         </p:txBody>
@@ -523,10 +391,6 @@
           <a:bodyPr/>
           <a:lstStyle/>
           <a:p>
-            <a:r>
-              <a:rPr lang="en-US" dirty="0"/>
-              <a:t/>
-            </a:r>
             <a:endParaRPr lang="en-US" dirty="0"/>
           </a:p>
         </p:txBody>
@@ -549,6 +413,90 @@
             <a:fld id="{F7021451-1387-4CA6-816F-3879F97B5CBC}" type="slidenum">
               <a:rPr lang="en-US"/>
               <a:t>10</a:t>
+            </a:fld>
+            <a:endParaRPr lang="en-US"/>
+          </a:p>
+        </p:txBody>
+      </p:sp>
+    </p:spTree>
+    <p:extLst>
+      <p:ext uri="{BB962C8B-B14F-4D97-AF65-F5344CB8AC3E}">
+        <p14:creationId xmlns:p14="http://schemas.microsoft.com/office/powerpoint/2010/main" val="1024086991"/>
+      </p:ext>
+    </p:extLst>
+  </p:cSld>
+  <p:clrMapOvr>
+    <a:masterClrMapping/>
+  </p:clrMapOvr>
+</p:notes>
+</file>
+
+<file path=ppt/notesSlides/notesSlide11.xml><?xml version="1.0" encoding="utf-8"?>
+<p:notes xmlns:a="http://schemas.openxmlformats.org/drawingml/2006/main" xmlns:r="http://schemas.openxmlformats.org/officeDocument/2006/relationships" xmlns:p="http://schemas.openxmlformats.org/presentationml/2006/main">
+  <p:cSld>
+    <p:spTree>
+      <p:nvGrpSpPr>
+        <p:cNvPr id="1" name=""/>
+        <p:cNvGrpSpPr/>
+        <p:nvPr/>
+      </p:nvGrpSpPr>
+      <p:grpSpPr>
+        <a:xfrm>
+          <a:off x="0" y="0"/>
+          <a:ext cx="0" cy="0"/>
+          <a:chOff x="0" y="0"/>
+          <a:chExt cx="0" cy="0"/>
+        </a:xfrm>
+      </p:grpSpPr>
+      <p:sp>
+        <p:nvSpPr>
+          <p:cNvPr id="2" name="Slide Image Placeholder 1"/>
+          <p:cNvSpPr>
+            <a:spLocks noGrp="1" noRot="1" noChangeAspect="1"/>
+          </p:cNvSpPr>
+          <p:nvPr>
+            <p:ph type="sldImg"/>
+          </p:nvPr>
+        </p:nvSpPr>
+        <p:spPr/>
+      </p:sp>
+      <p:sp>
+        <p:nvSpPr>
+          <p:cNvPr id="3" name="Notes Placeholder 2"/>
+          <p:cNvSpPr>
+            <a:spLocks noGrp="1"/>
+          </p:cNvSpPr>
+          <p:nvPr>
+            <p:ph type="body" idx="1"/>
+          </p:nvPr>
+        </p:nvSpPr>
+        <p:spPr/>
+        <p:txBody>
+          <a:bodyPr/>
+          <a:lstStyle/>
+          <a:p>
+            <a:endParaRPr lang="en-US" dirty="0"/>
+          </a:p>
+        </p:txBody>
+      </p:sp>
+      <p:sp>
+        <p:nvSpPr>
+          <p:cNvPr id="4" name="Slide Number Placeholder 3"/>
+          <p:cNvSpPr>
+            <a:spLocks noGrp="1"/>
+          </p:cNvSpPr>
+          <p:nvPr>
+            <p:ph type="sldNum" sz="quarter" idx="10"/>
+          </p:nvPr>
+        </p:nvSpPr>
+        <p:spPr/>
+        <p:txBody>
+          <a:bodyPr/>
+          <a:lstStyle/>
+          <a:p>
+            <a:fld id="{F7021451-1387-4CA6-816F-3879F97B5CBC}" type="slidenum">
+              <a:rPr lang="en-US"/>
+              <a:t>11</a:t>
             </a:fld>
             <a:endParaRPr lang="en-US"/>
           </a:p>
@@ -611,10 +559,6 @@
           <a:bodyPr/>
           <a:lstStyle/>
           <a:p>
-            <a:r>
-              <a:rPr lang="en-US" dirty="0"/>
-              <a:t/>
-            </a:r>
             <a:endParaRPr lang="en-US" dirty="0"/>
           </a:p>
         </p:txBody>
@@ -699,10 +643,6 @@
           <a:bodyPr/>
           <a:lstStyle/>
           <a:p>
-            <a:r>
-              <a:rPr lang="en-US" dirty="0"/>
-              <a:t/>
-            </a:r>
             <a:endParaRPr lang="en-US" dirty="0"/>
           </a:p>
         </p:txBody>
@@ -787,10 +727,6 @@
           <a:bodyPr/>
           <a:lstStyle/>
           <a:p>
-            <a:r>
-              <a:rPr lang="en-US" dirty="0"/>
-              <a:t/>
-            </a:r>
             <a:endParaRPr lang="en-US" dirty="0"/>
           </a:p>
         </p:txBody>
@@ -875,10 +811,6 @@
           <a:bodyPr/>
           <a:lstStyle/>
           <a:p>
-            <a:r>
-              <a:rPr lang="en-US" dirty="0"/>
-              <a:t/>
-            </a:r>
             <a:endParaRPr lang="en-US" dirty="0"/>
           </a:p>
         </p:txBody>
@@ -963,10 +895,6 @@
           <a:bodyPr/>
           <a:lstStyle/>
           <a:p>
-            <a:r>
-              <a:rPr lang="en-US" dirty="0"/>
-              <a:t/>
-            </a:r>
             <a:endParaRPr lang="en-US" dirty="0"/>
           </a:p>
         </p:txBody>
@@ -1051,10 +979,6 @@
           <a:bodyPr/>
           <a:lstStyle/>
           <a:p>
-            <a:r>
-              <a:rPr lang="en-US" dirty="0"/>
-              <a:t/>
-            </a:r>
             <a:endParaRPr lang="en-US" dirty="0"/>
           </a:p>
         </p:txBody>
@@ -1139,10 +1063,6 @@
           <a:bodyPr/>
           <a:lstStyle/>
           <a:p>
-            <a:r>
-              <a:rPr lang="en-US" dirty="0"/>
-              <a:t/>
-            </a:r>
             <a:endParaRPr lang="en-US" dirty="0"/>
           </a:p>
         </p:txBody>
@@ -1188,7 +1108,13 @@
   <p:cSld>
     <p:spTree>
       <p:nvGrpSpPr>
-        <p:cNvPr id="1" name=""/>
+        <p:cNvPr id="1" name="">
+          <a:extLst>
+            <a:ext uri="{FF2B5EF4-FFF2-40B4-BE49-F238E27FC236}">
+              <a16:creationId xmlns:a16="http://schemas.microsoft.com/office/drawing/2014/main" id="{522EEE9A-6805-8DDE-5819-788FA36DC89E}"/>
+            </a:ext>
+          </a:extLst>
+        </p:cNvPr>
         <p:cNvGrpSpPr/>
         <p:nvPr/>
       </p:nvGrpSpPr>
@@ -1202,7 +1128,13 @@
       </p:grpSpPr>
       <p:sp>
         <p:nvSpPr>
-          <p:cNvPr id="2" name="Slide Image Placeholder 1"/>
+          <p:cNvPr id="2" name="Slide Image Placeholder 1">
+            <a:extLst>
+              <a:ext uri="{FF2B5EF4-FFF2-40B4-BE49-F238E27FC236}">
+                <a16:creationId xmlns:a16="http://schemas.microsoft.com/office/drawing/2014/main" id="{D80A2970-9C29-4DB0-5E73-3D94331675F4}"/>
+              </a:ext>
+            </a:extLst>
+          </p:cNvPr>
           <p:cNvSpPr>
             <a:spLocks noGrp="1" noRot="1" noChangeAspect="1"/>
           </p:cNvSpPr>
@@ -1214,7 +1146,13 @@
       </p:sp>
       <p:sp>
         <p:nvSpPr>
-          <p:cNvPr id="3" name="Notes Placeholder 2"/>
+          <p:cNvPr id="3" name="Notes Placeholder 2">
+            <a:extLst>
+              <a:ext uri="{FF2B5EF4-FFF2-40B4-BE49-F238E27FC236}">
+                <a16:creationId xmlns:a16="http://schemas.microsoft.com/office/drawing/2014/main" id="{4E73B4AF-C38E-20AE-A67A-24457E7AFAEA}"/>
+              </a:ext>
+            </a:extLst>
+          </p:cNvPr>
           <p:cNvSpPr>
             <a:spLocks noGrp="1"/>
           </p:cNvSpPr>
@@ -1227,17 +1165,19 @@
           <a:bodyPr/>
           <a:lstStyle/>
           <a:p>
-            <a:r>
-              <a:rPr lang="en-US" dirty="0"/>
-              <a:t/>
-            </a:r>
             <a:endParaRPr lang="en-US" dirty="0"/>
           </a:p>
         </p:txBody>
       </p:sp>
       <p:sp>
         <p:nvSpPr>
-          <p:cNvPr id="4" name="Slide Number Placeholder 3"/>
+          <p:cNvPr id="4" name="Slide Number Placeholder 3">
+            <a:extLst>
+              <a:ext uri="{FF2B5EF4-FFF2-40B4-BE49-F238E27FC236}">
+                <a16:creationId xmlns:a16="http://schemas.microsoft.com/office/drawing/2014/main" id="{9C97AB6E-0240-7670-9F5D-7721B83C3C10}"/>
+              </a:ext>
+            </a:extLst>
+          </p:cNvPr>
           <p:cNvSpPr>
             <a:spLocks noGrp="1"/>
           </p:cNvSpPr>
@@ -1261,7 +1201,7 @@
     </p:spTree>
     <p:extLst>
       <p:ext uri="{BB962C8B-B14F-4D97-AF65-F5344CB8AC3E}">
-        <p14:creationId xmlns:p14="http://schemas.microsoft.com/office/powerpoint/2010/main" val="1024086991"/>
+        <p14:creationId xmlns:p14="http://schemas.microsoft.com/office/powerpoint/2010/main" val="576719467"/>
       </p:ext>
     </p:extLst>
   </p:cSld>
@@ -1309,6 +1249,7 @@
         <a:solidFill>
           <a:srgbClr val="000000"/>
         </a:solidFill>
+        <a:effectLst/>
       </p:bgPr>
     </p:bg>
     <p:spTree>
@@ -1368,7 +1309,7 @@
       <p:pic>
         <p:nvPicPr>
           <p:cNvPr id="4" name="Image 0" descr="preencoded.png">
-            <a:hlinkClick r:id="rId2" tooltip=""/>
+            <a:hlinkClick r:id="rId2"/>
           </p:cNvPr>
           <p:cNvPicPr>
             <a:picLocks noChangeAspect="1"/>
@@ -1376,7 +1317,7 @@
           <p:nvPr/>
         </p:nvPicPr>
         <p:blipFill>
-          <a:blip r:embed="rId1"/>
+          <a:blip r:embed="rId3"/>
           <a:stretch>
             <a:fillRect/>
           </a:stretch>
@@ -1407,6 +1348,7 @@
         <a:solidFill>
           <a:srgbClr val="000000"/>
         </a:solidFill>
+        <a:effectLst/>
       </p:bgPr>
     </p:bg>
     <p:spTree>
@@ -1466,7 +1408,7 @@
       <p:pic>
         <p:nvPicPr>
           <p:cNvPr id="4" name="Image 0" descr="preencoded.png">
-            <a:hlinkClick r:id="rId2" tooltip=""/>
+            <a:hlinkClick r:id="rId2"/>
           </p:cNvPr>
           <p:cNvPicPr>
             <a:picLocks noChangeAspect="1"/>
@@ -1474,7 +1416,7 @@
           <p:nvPr/>
         </p:nvPicPr>
         <p:blipFill>
-          <a:blip r:embed="rId1"/>
+          <a:blip r:embed="rId3"/>
           <a:stretch>
             <a:fillRect/>
           </a:stretch>
@@ -1505,6 +1447,7 @@
         <a:solidFill>
           <a:srgbClr val="000000"/>
         </a:solidFill>
+        <a:effectLst/>
       </p:bgPr>
     </p:bg>
     <p:spTree>
@@ -1564,7 +1507,7 @@
       <p:pic>
         <p:nvPicPr>
           <p:cNvPr id="4" name="Image 0" descr="preencoded.png">
-            <a:hlinkClick r:id="rId2" tooltip=""/>
+            <a:hlinkClick r:id="rId2"/>
           </p:cNvPr>
           <p:cNvPicPr>
             <a:picLocks noChangeAspect="1"/>
@@ -1572,7 +1515,7 @@
           <p:nvPr/>
         </p:nvPicPr>
         <p:blipFill>
-          <a:blip r:embed="rId1"/>
+          <a:blip r:embed="rId3"/>
           <a:stretch>
             <a:fillRect/>
           </a:stretch>
@@ -1603,6 +1546,7 @@
         <a:solidFill>
           <a:srgbClr val="000000"/>
         </a:solidFill>
+        <a:effectLst/>
       </p:bgPr>
     </p:bg>
     <p:spTree>
@@ -1662,7 +1606,7 @@
       <p:pic>
         <p:nvPicPr>
           <p:cNvPr id="4" name="Image 0" descr="preencoded.png">
-            <a:hlinkClick r:id="rId2" tooltip=""/>
+            <a:hlinkClick r:id="rId2"/>
           </p:cNvPr>
           <p:cNvPicPr>
             <a:picLocks noChangeAspect="1"/>
@@ -1670,7 +1614,7 @@
           <p:nvPr/>
         </p:nvPicPr>
         <p:blipFill>
-          <a:blip r:embed="rId1"/>
+          <a:blip r:embed="rId3"/>
           <a:stretch>
             <a:fillRect/>
           </a:stretch>
@@ -1701,6 +1645,7 @@
         <a:solidFill>
           <a:srgbClr val="000000"/>
         </a:solidFill>
+        <a:effectLst/>
       </p:bgPr>
     </p:bg>
     <p:spTree>
@@ -1760,7 +1705,7 @@
       <p:pic>
         <p:nvPicPr>
           <p:cNvPr id="4" name="Image 0" descr="preencoded.png">
-            <a:hlinkClick r:id="rId2" tooltip=""/>
+            <a:hlinkClick r:id="rId2"/>
           </p:cNvPr>
           <p:cNvPicPr>
             <a:picLocks noChangeAspect="1"/>
@@ -1768,7 +1713,7 @@
           <p:nvPr/>
         </p:nvPicPr>
         <p:blipFill>
-          <a:blip r:embed="rId1"/>
+          <a:blip r:embed="rId3"/>
           <a:stretch>
             <a:fillRect/>
           </a:stretch>
@@ -1799,6 +1744,7 @@
         <a:solidFill>
           <a:srgbClr val="000000"/>
         </a:solidFill>
+        <a:effectLst/>
       </p:bgPr>
     </p:bg>
     <p:spTree>
@@ -1858,7 +1804,7 @@
       <p:pic>
         <p:nvPicPr>
           <p:cNvPr id="4" name="Image 0" descr="preencoded.png">
-            <a:hlinkClick r:id="rId2" tooltip=""/>
+            <a:hlinkClick r:id="rId2"/>
           </p:cNvPr>
           <p:cNvPicPr>
             <a:picLocks noChangeAspect="1"/>
@@ -1866,7 +1812,7 @@
           <p:nvPr/>
         </p:nvPicPr>
         <p:blipFill>
-          <a:blip r:embed="rId1"/>
+          <a:blip r:embed="rId3"/>
           <a:stretch>
             <a:fillRect/>
           </a:stretch>
@@ -1897,6 +1843,7 @@
         <a:solidFill>
           <a:srgbClr val="000000"/>
         </a:solidFill>
+        <a:effectLst/>
       </p:bgPr>
     </p:bg>
     <p:spTree>
@@ -1956,7 +1903,7 @@
       <p:pic>
         <p:nvPicPr>
           <p:cNvPr id="4" name="Image 0" descr="preencoded.png">
-            <a:hlinkClick r:id="rId2" tooltip=""/>
+            <a:hlinkClick r:id="rId2"/>
           </p:cNvPr>
           <p:cNvPicPr>
             <a:picLocks noChangeAspect="1"/>
@@ -1964,7 +1911,7 @@
           <p:nvPr/>
         </p:nvPicPr>
         <p:blipFill>
-          <a:blip r:embed="rId1"/>
+          <a:blip r:embed="rId3"/>
           <a:stretch>
             <a:fillRect/>
           </a:stretch>
@@ -1995,6 +1942,7 @@
         <a:solidFill>
           <a:srgbClr val="000000"/>
         </a:solidFill>
+        <a:effectLst/>
       </p:bgPr>
     </p:bg>
     <p:spTree>
@@ -2054,7 +2002,7 @@
       <p:pic>
         <p:nvPicPr>
           <p:cNvPr id="4" name="Image 0" descr="preencoded.png">
-            <a:hlinkClick r:id="rId2" tooltip=""/>
+            <a:hlinkClick r:id="rId2"/>
           </p:cNvPr>
           <p:cNvPicPr>
             <a:picLocks noChangeAspect="1"/>
@@ -2062,7 +2010,7 @@
           <p:nvPr/>
         </p:nvPicPr>
         <p:blipFill>
-          <a:blip r:embed="rId1"/>
+          <a:blip r:embed="rId3"/>
           <a:stretch>
             <a:fillRect/>
           </a:stretch>
@@ -2093,6 +2041,7 @@
         <a:solidFill>
           <a:srgbClr val="000000"/>
         </a:solidFill>
+        <a:effectLst/>
       </p:bgPr>
     </p:bg>
     <p:spTree>
@@ -2152,7 +2101,7 @@
       <p:pic>
         <p:nvPicPr>
           <p:cNvPr id="4" name="Image 0" descr="preencoded.png">
-            <a:hlinkClick r:id="rId2" tooltip=""/>
+            <a:hlinkClick r:id="rId2"/>
           </p:cNvPr>
           <p:cNvPicPr>
             <a:picLocks noChangeAspect="1"/>
@@ -2160,7 +2109,7 @@
           <p:nvPr/>
         </p:nvPicPr>
         <p:blipFill>
-          <a:blip r:embed="rId1"/>
+          <a:blip r:embed="rId3"/>
           <a:stretch>
             <a:fillRect/>
           </a:stretch>
@@ -2191,6 +2140,7 @@
         <a:solidFill>
           <a:srgbClr val="000000"/>
         </a:solidFill>
+        <a:effectLst/>
       </p:bgPr>
     </p:bg>
     <p:spTree>
@@ -2250,7 +2200,7 @@
       <p:pic>
         <p:nvPicPr>
           <p:cNvPr id="4" name="Image 0" descr="preencoded.png">
-            <a:hlinkClick r:id="rId2" tooltip=""/>
+            <a:hlinkClick r:id="rId2"/>
           </p:cNvPr>
           <p:cNvPicPr>
             <a:picLocks noChangeAspect="1"/>
@@ -2258,7 +2208,7 @@
           <p:nvPr/>
         </p:nvPicPr>
         <p:blipFill>
-          <a:blip r:embed="rId1"/>
+          <a:blip r:embed="rId3"/>
           <a:stretch>
             <a:fillRect/>
           </a:stretch>
@@ -2284,6 +2234,11 @@
 <file path=ppt/slideMasters/slideMaster1.xml><?xml version="1.0" encoding="utf-8"?>
 <p:sldMaster xmlns:a="http://schemas.openxmlformats.org/drawingml/2006/main" xmlns:r="http://schemas.openxmlformats.org/officeDocument/2006/relationships" xmlns:p="http://schemas.openxmlformats.org/presentationml/2006/main">
   <p:cSld>
+    <p:bg>
+      <p:bgRef idx="1001">
+        <a:schemeClr val="bg1"/>
+      </p:bgRef>
+    </p:bg>
     <p:spTree>
       <p:nvGrpSpPr>
         <p:cNvPr id="1" name=""/>
@@ -2606,7 +2561,7 @@
           <a:bodyPr wrap="square" lIns="0" tIns="0" rIns="0" bIns="0" rtlCol="0" anchor="t"/>
           <a:lstStyle/>
           <a:p>
-            <a:pPr algn="l" indent="0" marL="0">
+            <a:pPr marL="0" indent="0" algn="l">
               <a:lnSpc>
                 <a:spcPts val="5550"/>
               </a:lnSpc>
@@ -2648,7 +2603,7 @@
           <a:bodyPr wrap="none" lIns="0" tIns="0" rIns="0" bIns="0" rtlCol="0" anchor="t"/>
           <a:lstStyle/>
           <a:p>
-            <a:pPr algn="l" indent="0" marL="0">
+            <a:pPr marL="0" indent="0" algn="l">
               <a:lnSpc>
                 <a:spcPts val="2850"/>
               </a:lnSpc>
@@ -2690,7 +2645,7 @@
           <a:bodyPr wrap="none" lIns="0" tIns="0" rIns="0" bIns="0" rtlCol="0" anchor="t"/>
           <a:lstStyle/>
           <a:p>
-            <a:pPr algn="l" indent="0" marL="0">
+            <a:pPr marL="0" indent="0" algn="l">
               <a:lnSpc>
                 <a:spcPts val="2850"/>
               </a:lnSpc>
@@ -2720,6 +2675,440 @@
 </file>
 
 <file path=ppt/slides/slide10.xml><?xml version="1.0" encoding="utf-8"?>
+<p:sld xmlns:a="http://schemas.openxmlformats.org/drawingml/2006/main" xmlns:r="http://schemas.openxmlformats.org/officeDocument/2006/relationships" xmlns:p="http://schemas.openxmlformats.org/presentationml/2006/main">
+  <p:cSld name="Slide 9">
+    <p:spTree>
+      <p:nvGrpSpPr>
+        <p:cNvPr id="1" name=""/>
+        <p:cNvGrpSpPr/>
+        <p:nvPr/>
+      </p:nvGrpSpPr>
+      <p:grpSpPr>
+        <a:xfrm>
+          <a:off x="0" y="0"/>
+          <a:ext cx="0" cy="0"/>
+          <a:chOff x="0" y="0"/>
+          <a:chExt cx="0" cy="0"/>
+        </a:xfrm>
+      </p:grpSpPr>
+      <p:sp>
+        <p:nvSpPr>
+          <p:cNvPr id="2" name="Text 0"/>
+          <p:cNvSpPr/>
+          <p:nvPr/>
+        </p:nvSpPr>
+        <p:spPr>
+          <a:xfrm>
+            <a:off x="793790" y="2430304"/>
+            <a:ext cx="6885980" cy="708779"/>
+          </a:xfrm>
+          <a:prstGeom prst="rect">
+            <a:avLst/>
+          </a:prstGeom>
+          <a:noFill/>
+          <a:ln/>
+        </p:spPr>
+        <p:txBody>
+          <a:bodyPr wrap="none" lIns="0" tIns="0" rIns="0" bIns="0" rtlCol="0" anchor="t"/>
+          <a:lstStyle/>
+          <a:p>
+            <a:pPr marL="0" indent="0" algn="l">
+              <a:lnSpc>
+                <a:spcPts val="5550"/>
+              </a:lnSpc>
+              <a:buNone/>
+            </a:pPr>
+            <a:r>
+              <a:rPr lang="en-US" sz="4450" b="1" dirty="0">
+                <a:solidFill>
+                  <a:srgbClr val="151617"/>
+                </a:solidFill>
+                <a:latin typeface="Montserrat Black" pitchFamily="34" charset="0"/>
+                <a:ea typeface="Montserrat Black" pitchFamily="34" charset="-122"/>
+                <a:cs typeface="Montserrat Black" pitchFamily="34" charset="-120"/>
+              </a:rPr>
+              <a:t>Current Project Status</a:t>
+            </a:r>
+            <a:endParaRPr lang="en-US" sz="4450" dirty="0"/>
+          </a:p>
+        </p:txBody>
+      </p:sp>
+      <p:sp>
+        <p:nvSpPr>
+          <p:cNvPr id="3" name="Shape 1"/>
+          <p:cNvSpPr/>
+          <p:nvPr/>
+        </p:nvSpPr>
+        <p:spPr>
+          <a:xfrm>
+            <a:off x="793790" y="3592711"/>
+            <a:ext cx="6408063" cy="2206585"/>
+          </a:xfrm>
+          <a:prstGeom prst="roundRect">
+            <a:avLst>
+              <a:gd name="adj" fmla="val 414"/>
+            </a:avLst>
+          </a:prstGeom>
+          <a:solidFill>
+            <a:srgbClr val="F8ECE4"/>
+          </a:solidFill>
+          <a:ln w="7620">
+            <a:solidFill>
+              <a:srgbClr val="151617"/>
+            </a:solidFill>
+            <a:prstDash val="solid"/>
+          </a:ln>
+          <a:effectLst>
+            <a:outerShdw dist="20320" dir="2700000" algn="bl" rotWithShape="0">
+              <a:srgbClr val="151617">
+                <a:alpha val="100000"/>
+              </a:srgbClr>
+            </a:outerShdw>
+          </a:effectLst>
+        </p:spPr>
+      </p:sp>
+      <p:sp>
+        <p:nvSpPr>
+          <p:cNvPr id="4" name="Text 2"/>
+          <p:cNvSpPr/>
+          <p:nvPr/>
+        </p:nvSpPr>
+        <p:spPr>
+          <a:xfrm>
+            <a:off x="1028224" y="3827145"/>
+            <a:ext cx="2835235" cy="354330"/>
+          </a:xfrm>
+          <a:prstGeom prst="rect">
+            <a:avLst/>
+          </a:prstGeom>
+          <a:noFill/>
+          <a:ln/>
+        </p:spPr>
+        <p:txBody>
+          <a:bodyPr wrap="none" lIns="0" tIns="0" rIns="0" bIns="0" rtlCol="0" anchor="t"/>
+          <a:lstStyle/>
+          <a:p>
+            <a:pPr marL="0" indent="0" algn="l">
+              <a:lnSpc>
+                <a:spcPts val="2750"/>
+              </a:lnSpc>
+              <a:buNone/>
+            </a:pPr>
+            <a:r>
+              <a:rPr lang="en-US" sz="2200" b="1" dirty="0">
+                <a:solidFill>
+                  <a:srgbClr val="151617"/>
+                </a:solidFill>
+                <a:latin typeface="Montserrat Black" pitchFamily="34" charset="0"/>
+                <a:ea typeface="Montserrat Black" pitchFamily="34" charset="-122"/>
+                <a:cs typeface="Montserrat Black" pitchFamily="34" charset="-120"/>
+              </a:rPr>
+              <a:t>Completed</a:t>
+            </a:r>
+            <a:endParaRPr lang="en-US" sz="2200" dirty="0"/>
+          </a:p>
+        </p:txBody>
+      </p:sp>
+      <p:sp>
+        <p:nvSpPr>
+          <p:cNvPr id="5" name="Text 3"/>
+          <p:cNvSpPr/>
+          <p:nvPr/>
+        </p:nvSpPr>
+        <p:spPr>
+          <a:xfrm>
+            <a:off x="1028224" y="4317563"/>
+            <a:ext cx="5939195" cy="362903"/>
+          </a:xfrm>
+          <a:prstGeom prst="rect">
+            <a:avLst/>
+          </a:prstGeom>
+          <a:noFill/>
+          <a:ln/>
+        </p:spPr>
+        <p:txBody>
+          <a:bodyPr wrap="none" lIns="0" tIns="0" rIns="0" bIns="0" rtlCol="0" anchor="t"/>
+          <a:lstStyle/>
+          <a:p>
+            <a:pPr marL="342900" indent="-342900" algn="l">
+              <a:lnSpc>
+                <a:spcPts val="2850"/>
+              </a:lnSpc>
+              <a:buSzPct val="100000"/>
+              <a:buChar char="•"/>
+            </a:pPr>
+            <a:r>
+              <a:rPr lang="en-US" sz="1750" dirty="0">
+                <a:solidFill>
+                  <a:srgbClr val="151617"/>
+                </a:solidFill>
+                <a:latin typeface="Inconsolata" pitchFamily="34" charset="0"/>
+                <a:ea typeface="Inconsolata" pitchFamily="34" charset="-122"/>
+                <a:cs typeface="Inconsolata" pitchFamily="34" charset="-120"/>
+              </a:rPr>
+              <a:t>Feature engineering pipeline</a:t>
+            </a:r>
+            <a:endParaRPr lang="en-US" sz="1750" dirty="0"/>
+          </a:p>
+        </p:txBody>
+      </p:sp>
+      <p:sp>
+        <p:nvSpPr>
+          <p:cNvPr id="6" name="Text 4"/>
+          <p:cNvSpPr/>
+          <p:nvPr/>
+        </p:nvSpPr>
+        <p:spPr>
+          <a:xfrm>
+            <a:off x="1028224" y="4759762"/>
+            <a:ext cx="5939195" cy="362903"/>
+          </a:xfrm>
+          <a:prstGeom prst="rect">
+            <a:avLst/>
+          </a:prstGeom>
+          <a:noFill/>
+          <a:ln/>
+        </p:spPr>
+        <p:txBody>
+          <a:bodyPr wrap="none" lIns="0" tIns="0" rIns="0" bIns="0" rtlCol="0" anchor="t"/>
+          <a:lstStyle/>
+          <a:p>
+            <a:pPr marL="342900" indent="-342900" algn="l">
+              <a:lnSpc>
+                <a:spcPts val="2850"/>
+              </a:lnSpc>
+              <a:buSzPct val="100000"/>
+              <a:buChar char="•"/>
+            </a:pPr>
+            <a:r>
+              <a:rPr lang="en-US" sz="1750" dirty="0">
+                <a:solidFill>
+                  <a:srgbClr val="151617"/>
+                </a:solidFill>
+                <a:latin typeface="Inconsolata" pitchFamily="34" charset="0"/>
+                <a:ea typeface="Inconsolata" pitchFamily="34" charset="-122"/>
+                <a:cs typeface="Inconsolata" pitchFamily="34" charset="-120"/>
+              </a:rPr>
+              <a:t>Model training and evaluation</a:t>
+            </a:r>
+            <a:endParaRPr lang="en-US" sz="1750" dirty="0"/>
+          </a:p>
+        </p:txBody>
+      </p:sp>
+      <p:sp>
+        <p:nvSpPr>
+          <p:cNvPr id="7" name="Text 5"/>
+          <p:cNvSpPr/>
+          <p:nvPr/>
+        </p:nvSpPr>
+        <p:spPr>
+          <a:xfrm>
+            <a:off x="1028224" y="5201960"/>
+            <a:ext cx="5939195" cy="362903"/>
+          </a:xfrm>
+          <a:prstGeom prst="rect">
+            <a:avLst/>
+          </a:prstGeom>
+          <a:noFill/>
+          <a:ln/>
+        </p:spPr>
+        <p:txBody>
+          <a:bodyPr wrap="none" lIns="0" tIns="0" rIns="0" bIns="0" rtlCol="0" anchor="t"/>
+          <a:lstStyle/>
+          <a:p>
+            <a:pPr marL="342900" indent="-342900" algn="l">
+              <a:lnSpc>
+                <a:spcPts val="2850"/>
+              </a:lnSpc>
+              <a:buSzPct val="100000"/>
+              <a:buChar char="•"/>
+            </a:pPr>
+            <a:r>
+              <a:rPr lang="en-US" sz="1750" dirty="0">
+                <a:solidFill>
+                  <a:srgbClr val="151617"/>
+                </a:solidFill>
+                <a:latin typeface="Inconsolata" pitchFamily="34" charset="0"/>
+                <a:ea typeface="Inconsolata" pitchFamily="34" charset="-122"/>
+                <a:cs typeface="Inconsolata" pitchFamily="34" charset="-120"/>
+              </a:rPr>
+              <a:t>FastAPI application implementation</a:t>
+            </a:r>
+            <a:endParaRPr lang="en-US" sz="1750" dirty="0"/>
+          </a:p>
+        </p:txBody>
+      </p:sp>
+      <p:sp>
+        <p:nvSpPr>
+          <p:cNvPr id="8" name="Shape 6"/>
+          <p:cNvSpPr/>
+          <p:nvPr/>
+        </p:nvSpPr>
+        <p:spPr>
+          <a:xfrm>
+            <a:off x="7428667" y="3592711"/>
+            <a:ext cx="6408063" cy="2206585"/>
+          </a:xfrm>
+          <a:prstGeom prst="roundRect">
+            <a:avLst>
+              <a:gd name="adj" fmla="val 414"/>
+            </a:avLst>
+          </a:prstGeom>
+          <a:solidFill>
+            <a:srgbClr val="F8ECE4"/>
+          </a:solidFill>
+          <a:ln w="7620">
+            <a:solidFill>
+              <a:srgbClr val="151617"/>
+            </a:solidFill>
+            <a:prstDash val="solid"/>
+          </a:ln>
+          <a:effectLst>
+            <a:outerShdw dist="20320" dir="2700000" algn="bl" rotWithShape="0">
+              <a:srgbClr val="151617">
+                <a:alpha val="100000"/>
+              </a:srgbClr>
+            </a:outerShdw>
+          </a:effectLst>
+        </p:spPr>
+      </p:sp>
+      <p:sp>
+        <p:nvSpPr>
+          <p:cNvPr id="9" name="Text 7"/>
+          <p:cNvSpPr/>
+          <p:nvPr/>
+        </p:nvSpPr>
+        <p:spPr>
+          <a:xfrm>
+            <a:off x="7663101" y="3827145"/>
+            <a:ext cx="2835235" cy="354330"/>
+          </a:xfrm>
+          <a:prstGeom prst="rect">
+            <a:avLst/>
+          </a:prstGeom>
+          <a:noFill/>
+          <a:ln/>
+        </p:spPr>
+        <p:txBody>
+          <a:bodyPr wrap="none" lIns="0" tIns="0" rIns="0" bIns="0" rtlCol="0" anchor="t"/>
+          <a:lstStyle/>
+          <a:p>
+            <a:pPr marL="0" indent="0" algn="l">
+              <a:lnSpc>
+                <a:spcPts val="2750"/>
+              </a:lnSpc>
+              <a:buNone/>
+            </a:pPr>
+            <a:r>
+              <a:rPr lang="en-US" sz="2200" b="1" dirty="0">
+                <a:solidFill>
+                  <a:srgbClr val="151617"/>
+                </a:solidFill>
+                <a:latin typeface="Montserrat Black" pitchFamily="34" charset="0"/>
+                <a:ea typeface="Montserrat Black" pitchFamily="34" charset="-122"/>
+                <a:cs typeface="Montserrat Black" pitchFamily="34" charset="-120"/>
+              </a:rPr>
+              <a:t>Upcoming</a:t>
+            </a:r>
+            <a:endParaRPr lang="en-US" sz="2200" dirty="0"/>
+          </a:p>
+        </p:txBody>
+      </p:sp>
+      <p:sp>
+        <p:nvSpPr>
+          <p:cNvPr id="10" name="Text 8"/>
+          <p:cNvSpPr/>
+          <p:nvPr/>
+        </p:nvSpPr>
+        <p:spPr>
+          <a:xfrm>
+            <a:off x="7663101" y="4317563"/>
+            <a:ext cx="5939195" cy="362903"/>
+          </a:xfrm>
+          <a:prstGeom prst="rect">
+            <a:avLst/>
+          </a:prstGeom>
+          <a:noFill/>
+          <a:ln/>
+        </p:spPr>
+        <p:txBody>
+          <a:bodyPr wrap="none" lIns="0" tIns="0" rIns="0" bIns="0" rtlCol="0" anchor="t"/>
+          <a:lstStyle/>
+          <a:p>
+            <a:pPr marL="342900" indent="-342900" algn="l">
+              <a:lnSpc>
+                <a:spcPts val="2850"/>
+              </a:lnSpc>
+              <a:buSzPct val="100000"/>
+              <a:buChar char="•"/>
+            </a:pPr>
+            <a:r>
+              <a:rPr lang="en-US" sz="1750" dirty="0">
+                <a:solidFill>
+                  <a:srgbClr val="151617"/>
+                </a:solidFill>
+                <a:latin typeface="Inconsolata" pitchFamily="34" charset="0"/>
+                <a:ea typeface="Inconsolata" pitchFamily="34" charset="-122"/>
+                <a:cs typeface="Inconsolata" pitchFamily="34" charset="-120"/>
+              </a:rPr>
+              <a:t>Dockerization of Flask app</a:t>
+            </a:r>
+            <a:endParaRPr lang="en-US" sz="1750" dirty="0"/>
+          </a:p>
+        </p:txBody>
+      </p:sp>
+      <p:sp>
+        <p:nvSpPr>
+          <p:cNvPr id="11" name="Text 9"/>
+          <p:cNvSpPr/>
+          <p:nvPr/>
+        </p:nvSpPr>
+        <p:spPr>
+          <a:xfrm>
+            <a:off x="7663101" y="4759762"/>
+            <a:ext cx="5939195" cy="362903"/>
+          </a:xfrm>
+          <a:prstGeom prst="rect">
+            <a:avLst/>
+          </a:prstGeom>
+          <a:noFill/>
+          <a:ln/>
+        </p:spPr>
+        <p:txBody>
+          <a:bodyPr wrap="none" lIns="0" tIns="0" rIns="0" bIns="0" rtlCol="0" anchor="t"/>
+          <a:lstStyle/>
+          <a:p>
+            <a:pPr marL="342900" indent="-342900" algn="l">
+              <a:lnSpc>
+                <a:spcPts val="2850"/>
+              </a:lnSpc>
+              <a:buSzPct val="100000"/>
+              <a:buChar char="•"/>
+            </a:pPr>
+            <a:r>
+              <a:rPr lang="en-US" sz="1750" dirty="0">
+                <a:solidFill>
+                  <a:srgbClr val="151617"/>
+                </a:solidFill>
+                <a:latin typeface="Inconsolata" pitchFamily="34" charset="0"/>
+                <a:ea typeface="Inconsolata" pitchFamily="34" charset="-122"/>
+                <a:cs typeface="Inconsolata" pitchFamily="34" charset="-120"/>
+              </a:rPr>
+              <a:t>API serving and deployment</a:t>
+            </a:r>
+            <a:endParaRPr lang="en-US" sz="1750" dirty="0"/>
+          </a:p>
+        </p:txBody>
+      </p:sp>
+    </p:spTree>
+  </p:cSld>
+  <p:clrMapOvr>
+    <a:masterClrMapping/>
+  </p:clrMapOvr>
+</p:sld>
+</file>
+
+<file path=ppt/slides/slide11.xml><?xml version="1.0" encoding="utf-8"?>
 <p:sld xmlns:a="http://schemas.openxmlformats.org/drawingml/2006/main" xmlns:r="http://schemas.openxmlformats.org/officeDocument/2006/relationships" xmlns:p="http://schemas.openxmlformats.org/presentationml/2006/main">
   <p:cSld name="Slide 10">
     <p:spTree>
@@ -2757,7 +3146,7 @@
           <a:bodyPr wrap="none" lIns="0" tIns="0" rIns="0" bIns="0" rtlCol="0" anchor="t"/>
           <a:lstStyle/>
           <a:p>
-            <a:pPr algn="l" indent="0" marL="0">
+            <a:pPr marL="0" indent="0" algn="l">
               <a:lnSpc>
                 <a:spcPts val="5550"/>
               </a:lnSpc>
@@ -2804,7 +3193,7 @@
             <a:prstDash val="solid"/>
           </a:ln>
           <a:effectLst>
-            <a:outerShdw sx="100000" sy="100000" kx="0" ky="0" algn="bl" rotWithShape="0" blurRad="0" dist="20320" dir="2700000">
+            <a:outerShdw dist="20320" dir="2700000" algn="bl" rotWithShape="0">
               <a:srgbClr val="151617">
                 <a:alpha val="100000"/>
               </a:srgbClr>
@@ -2833,7 +3222,7 @@
           <a:bodyPr wrap="none" lIns="0" tIns="0" rIns="0" bIns="0" rtlCol="0" anchor="t"/>
           <a:lstStyle/>
           <a:p>
-            <a:pPr algn="l" indent="0" marL="0">
+            <a:pPr marL="0" indent="0" algn="l">
               <a:lnSpc>
                 <a:spcPts val="2750"/>
               </a:lnSpc>
@@ -2875,14 +3264,14 @@
           <a:bodyPr wrap="none" lIns="0" tIns="0" rIns="0" bIns="0" rtlCol="0" anchor="t"/>
           <a:lstStyle/>
           <a:p>
-            <a:pPr algn="l" indent="0" marL="0">
+            <a:pPr marL="0" indent="0" algn="l">
               <a:lnSpc>
                 <a:spcPts val="2850"/>
               </a:lnSpc>
               <a:buNone/>
             </a:pPr>
             <a:r>
-              <a:rPr lang="en-US" sz="1750" dirty="0">
+              <a:rPr lang="en-US" sz="1750" dirty="0" err="1">
                 <a:solidFill>
                   <a:srgbClr val="151617"/>
                 </a:solidFill>
@@ -2890,7 +3279,18 @@
                 <a:ea typeface="Inconsolata" pitchFamily="34" charset="-122"/>
                 <a:cs typeface="Inconsolata" pitchFamily="34" charset="-120"/>
               </a:rPr>
-              <a:t>Dockerize FastAPI application</a:t>
+              <a:t>Dockerize</a:t>
+            </a:r>
+            <a:r>
+              <a:rPr lang="en-US" sz="1750" dirty="0">
+                <a:solidFill>
+                  <a:srgbClr val="151617"/>
+                </a:solidFill>
+                <a:latin typeface="Inconsolata" pitchFamily="34" charset="0"/>
+                <a:ea typeface="Inconsolata" pitchFamily="34" charset="-122"/>
+                <a:cs typeface="Inconsolata" pitchFamily="34" charset="-120"/>
+              </a:rPr>
+              <a:t> Flask application</a:t>
             </a:r>
             <a:endParaRPr lang="en-US" sz="1750" dirty="0"/>
           </a:p>
@@ -2922,7 +3322,7 @@
             <a:prstDash val="solid"/>
           </a:ln>
           <a:effectLst>
-            <a:outerShdw sx="100000" sy="100000" kx="0" ky="0" algn="bl" rotWithShape="0" blurRad="0" dist="20320" dir="2700000">
+            <a:outerShdw dist="20320" dir="2700000" algn="bl" rotWithShape="0">
               <a:srgbClr val="151617">
                 <a:alpha val="100000"/>
               </a:srgbClr>
@@ -2951,7 +3351,7 @@
           <a:bodyPr wrap="none" lIns="0" tIns="0" rIns="0" bIns="0" rtlCol="0" anchor="t"/>
           <a:lstStyle/>
           <a:p>
-            <a:pPr algn="l" indent="0" marL="0">
+            <a:pPr marL="0" indent="0" algn="l">
               <a:lnSpc>
                 <a:spcPts val="2750"/>
               </a:lnSpc>
@@ -2993,7 +3393,7 @@
           <a:bodyPr wrap="none" lIns="0" tIns="0" rIns="0" bIns="0" rtlCol="0" anchor="t"/>
           <a:lstStyle/>
           <a:p>
-            <a:pPr algn="l" indent="0" marL="0">
+            <a:pPr marL="0" indent="0" algn="l">
               <a:lnSpc>
                 <a:spcPts val="2850"/>
               </a:lnSpc>
@@ -3040,7 +3440,7 @@
             <a:prstDash val="solid"/>
           </a:ln>
           <a:effectLst>
-            <a:outerShdw sx="100000" sy="100000" kx="0" ky="0" algn="bl" rotWithShape="0" blurRad="0" dist="20320" dir="2700000">
+            <a:outerShdw dist="20320" dir="2700000" algn="bl" rotWithShape="0">
               <a:srgbClr val="151617">
                 <a:alpha val="100000"/>
               </a:srgbClr>
@@ -3069,7 +3469,7 @@
           <a:bodyPr wrap="none" lIns="0" tIns="0" rIns="0" bIns="0" rtlCol="0" anchor="t"/>
           <a:lstStyle/>
           <a:p>
-            <a:pPr algn="l" indent="0" marL="0">
+            <a:pPr marL="0" indent="0" algn="l">
               <a:lnSpc>
                 <a:spcPts val="2750"/>
               </a:lnSpc>
@@ -3111,7 +3511,7 @@
           <a:bodyPr wrap="none" lIns="0" tIns="0" rIns="0" bIns="0" rtlCol="0" anchor="t"/>
           <a:lstStyle/>
           <a:p>
-            <a:pPr algn="l" indent="0" marL="0">
+            <a:pPr marL="0" indent="0" algn="l">
               <a:lnSpc>
                 <a:spcPts val="2850"/>
               </a:lnSpc>
@@ -3158,7 +3558,7 @@
             <a:prstDash val="solid"/>
           </a:ln>
           <a:effectLst>
-            <a:outerShdw sx="100000" sy="100000" kx="0" ky="0" algn="bl" rotWithShape="0" blurRad="0" dist="20320" dir="2700000">
+            <a:outerShdw dist="20320" dir="2700000" algn="bl" rotWithShape="0">
               <a:srgbClr val="151617">
                 <a:alpha val="100000"/>
               </a:srgbClr>
@@ -3187,7 +3587,7 @@
           <a:bodyPr wrap="none" lIns="0" tIns="0" rIns="0" bIns="0" rtlCol="0" anchor="t"/>
           <a:lstStyle/>
           <a:p>
-            <a:pPr algn="l" indent="0" marL="0">
+            <a:pPr marL="0" indent="0" algn="l">
               <a:lnSpc>
                 <a:spcPts val="2750"/>
               </a:lnSpc>
@@ -3229,7 +3629,7 @@
           <a:bodyPr wrap="none" lIns="0" tIns="0" rIns="0" bIns="0" rtlCol="0" anchor="t"/>
           <a:lstStyle/>
           <a:p>
-            <a:pPr algn="l" indent="0" marL="0">
+            <a:pPr marL="0" indent="0" algn="l">
               <a:lnSpc>
                 <a:spcPts val="2850"/>
               </a:lnSpc>
@@ -3276,7 +3676,7 @@
             <a:prstDash val="solid"/>
           </a:ln>
           <a:effectLst>
-            <a:outerShdw sx="100000" sy="100000" kx="0" ky="0" algn="bl" rotWithShape="0" blurRad="0" dist="20320" dir="2700000">
+            <a:outerShdw dist="20320" dir="2700000" algn="bl" rotWithShape="0">
               <a:srgbClr val="151617">
                 <a:alpha val="100000"/>
               </a:srgbClr>
@@ -3305,7 +3705,7 @@
           <a:bodyPr wrap="none" lIns="0" tIns="0" rIns="0" bIns="0" rtlCol="0" anchor="t"/>
           <a:lstStyle/>
           <a:p>
-            <a:pPr algn="l" indent="0" marL="0">
+            <a:pPr marL="0" indent="0" algn="l">
               <a:lnSpc>
                 <a:spcPts val="2750"/>
               </a:lnSpc>
@@ -3347,7 +3747,7 @@
           <a:bodyPr wrap="none" lIns="0" tIns="0" rIns="0" bIns="0" rtlCol="0" anchor="t"/>
           <a:lstStyle/>
           <a:p>
-            <a:pPr algn="l" indent="0" marL="0">
+            <a:pPr marL="0" indent="0" algn="l">
               <a:lnSpc>
                 <a:spcPts val="2850"/>
               </a:lnSpc>
@@ -3414,7 +3814,7 @@
           <a:bodyPr wrap="none" lIns="0" tIns="0" rIns="0" bIns="0" rtlCol="0" anchor="t"/>
           <a:lstStyle/>
           <a:p>
-            <a:pPr algn="l" indent="0" marL="0">
+            <a:pPr marL="0" indent="0" algn="l">
               <a:lnSpc>
                 <a:spcPts val="5550"/>
               </a:lnSpc>
@@ -3461,7 +3861,7 @@
             <a:prstDash val="solid"/>
           </a:ln>
           <a:effectLst>
-            <a:outerShdw sx="100000" sy="100000" kx="0" ky="0" algn="bl" rotWithShape="0" blurRad="0" dist="20320" dir="2700000">
+            <a:outerShdw dist="20320" dir="2700000" algn="bl" rotWithShape="0">
               <a:srgbClr val="151617">
                 <a:alpha val="100000"/>
               </a:srgbClr>
@@ -3490,7 +3890,7 @@
           <a:bodyPr wrap="none" lIns="0" tIns="0" rIns="0" bIns="0" rtlCol="0" anchor="t"/>
           <a:lstStyle/>
           <a:p>
-            <a:pPr algn="l" indent="0" marL="0">
+            <a:pPr marL="0" indent="0" algn="l">
               <a:lnSpc>
                 <a:spcPts val="2750"/>
               </a:lnSpc>
@@ -3532,7 +3932,7 @@
           <a:bodyPr wrap="none" lIns="0" tIns="0" rIns="0" bIns="0" rtlCol="0" anchor="t"/>
           <a:lstStyle/>
           <a:p>
-            <a:pPr algn="l" marL="342900" indent="-342900">
+            <a:pPr marL="342900" indent="-342900" algn="l">
               <a:lnSpc>
                 <a:spcPts val="2850"/>
               </a:lnSpc>
@@ -3575,7 +3975,7 @@
           <a:bodyPr wrap="none" lIns="0" tIns="0" rIns="0" bIns="0" rtlCol="0" anchor="t"/>
           <a:lstStyle/>
           <a:p>
-            <a:pPr algn="l" marL="342900" indent="-342900">
+            <a:pPr marL="342900" indent="-342900" algn="l">
               <a:lnSpc>
                 <a:spcPts val="2850"/>
               </a:lnSpc>
@@ -3618,7 +4018,7 @@
           <a:bodyPr wrap="none" lIns="0" tIns="0" rIns="0" bIns="0" rtlCol="0" anchor="t"/>
           <a:lstStyle/>
           <a:p>
-            <a:pPr algn="l" marL="342900" indent="-342900">
+            <a:pPr marL="342900" indent="-342900" algn="l">
               <a:lnSpc>
                 <a:spcPts val="2850"/>
               </a:lnSpc>
@@ -3661,7 +4061,7 @@
           <a:bodyPr wrap="none" lIns="0" tIns="0" rIns="0" bIns="0" rtlCol="0" anchor="t"/>
           <a:lstStyle/>
           <a:p>
-            <a:pPr algn="l" marL="342900" indent="-342900">
+            <a:pPr marL="342900" indent="-342900" algn="l">
               <a:lnSpc>
                 <a:spcPts val="2850"/>
               </a:lnSpc>
@@ -3704,7 +4104,7 @@
           <a:bodyPr wrap="none" lIns="0" tIns="0" rIns="0" bIns="0" rtlCol="0" anchor="t"/>
           <a:lstStyle/>
           <a:p>
-            <a:pPr algn="l" marL="342900" indent="-342900">
+            <a:pPr marL="342900" indent="-342900" algn="l">
               <a:lnSpc>
                 <a:spcPts val="2850"/>
               </a:lnSpc>
@@ -3752,7 +4152,7 @@
             <a:prstDash val="solid"/>
           </a:ln>
           <a:effectLst>
-            <a:outerShdw sx="100000" sy="100000" kx="0" ky="0" algn="bl" rotWithShape="0" blurRad="0" dist="20320" dir="2700000">
+            <a:outerShdw dist="20320" dir="2700000" algn="bl" rotWithShape="0">
               <a:srgbClr val="151617">
                 <a:alpha val="100000"/>
               </a:srgbClr>
@@ -3781,7 +4181,7 @@
           <a:bodyPr wrap="none" lIns="0" tIns="0" rIns="0" bIns="0" rtlCol="0" anchor="t"/>
           <a:lstStyle/>
           <a:p>
-            <a:pPr algn="l" indent="0" marL="0">
+            <a:pPr marL="0" indent="0" algn="l">
               <a:lnSpc>
                 <a:spcPts val="2750"/>
               </a:lnSpc>
@@ -3823,7 +4223,7 @@
           <a:bodyPr wrap="square" lIns="0" tIns="0" rIns="0" bIns="0" rtlCol="0" anchor="t"/>
           <a:lstStyle/>
           <a:p>
-            <a:pPr algn="l" indent="0" marL="0">
+            <a:pPr marL="0" indent="0" algn="l">
               <a:lnSpc>
                 <a:spcPts val="2850"/>
               </a:lnSpc>
@@ -3870,7 +4270,7 @@
             <a:prstDash val="solid"/>
           </a:ln>
           <a:effectLst>
-            <a:outerShdw sx="100000" sy="100000" kx="0" ky="0" algn="bl" rotWithShape="0" blurRad="0" dist="20320" dir="2700000">
+            <a:outerShdw dist="20320" dir="2700000" algn="bl" rotWithShape="0">
               <a:srgbClr val="151617">
                 <a:alpha val="100000"/>
               </a:srgbClr>
@@ -3899,7 +4299,7 @@
           <a:bodyPr wrap="none" lIns="0" tIns="0" rIns="0" bIns="0" rtlCol="0" anchor="t"/>
           <a:lstStyle/>
           <a:p>
-            <a:pPr algn="l" indent="0" marL="0">
+            <a:pPr marL="0" indent="0" algn="l">
               <a:lnSpc>
                 <a:spcPts val="2750"/>
               </a:lnSpc>
@@ -3941,7 +4341,7 @@
           <a:bodyPr wrap="none" lIns="0" tIns="0" rIns="0" bIns="0" rtlCol="0" anchor="t"/>
           <a:lstStyle/>
           <a:p>
-            <a:pPr algn="l" marL="342900" indent="-342900">
+            <a:pPr marL="342900" indent="-342900" algn="l">
               <a:lnSpc>
                 <a:spcPts val="2850"/>
               </a:lnSpc>
@@ -3957,7 +4357,7 @@
                 <a:ea typeface="Inconsolata" pitchFamily="34" charset="-122"/>
                 <a:cs typeface="Inconsolata" pitchFamily="34" charset="-120"/>
               </a:rPr>
-              <a:t>Python, FastAPI</a:t>
+              <a:t>Python, Flask</a:t>
             </a:r>
             <a:endParaRPr lang="en-US" sz="1750" dirty="0"/>
           </a:p>
@@ -3984,7 +4384,7 @@
           <a:bodyPr wrap="none" lIns="0" tIns="0" rIns="0" bIns="0" rtlCol="0" anchor="t"/>
           <a:lstStyle/>
           <a:p>
-            <a:pPr algn="l" marL="342900" indent="-342900">
+            <a:pPr marL="342900" indent="-342900" algn="l">
               <a:lnSpc>
                 <a:spcPts val="2850"/>
               </a:lnSpc>
@@ -4027,7 +4427,7 @@
           <a:bodyPr wrap="none" lIns="0" tIns="0" rIns="0" bIns="0" rtlCol="0" anchor="t"/>
           <a:lstStyle/>
           <a:p>
-            <a:pPr algn="l" marL="342900" indent="-342900">
+            <a:pPr marL="342900" indent="-342900" algn="l">
               <a:lnSpc>
                 <a:spcPts val="2850"/>
               </a:lnSpc>
@@ -4070,7 +4470,7 @@
           <a:bodyPr wrap="none" lIns="0" tIns="0" rIns="0" bIns="0" rtlCol="0" anchor="t"/>
           <a:lstStyle/>
           <a:p>
-            <a:pPr algn="l" marL="342900" indent="-342900">
+            <a:pPr marL="342900" indent="-342900" algn="l">
               <a:lnSpc>
                 <a:spcPts val="2850"/>
               </a:lnSpc>
@@ -4138,7 +4538,7 @@
           <a:bodyPr wrap="none" lIns="0" tIns="0" rIns="0" bIns="0" rtlCol="0" anchor="t"/>
           <a:lstStyle/>
           <a:p>
-            <a:pPr algn="l" indent="0" marL="0">
+            <a:pPr marL="0" indent="0" algn="l">
               <a:lnSpc>
                 <a:spcPts val="5550"/>
               </a:lnSpc>
@@ -4185,7 +4585,7 @@
             <a:prstDash val="solid"/>
           </a:ln>
           <a:effectLst>
-            <a:outerShdw sx="100000" sy="100000" kx="0" ky="0" algn="bl" rotWithShape="0" blurRad="0" dist="20320" dir="2700000">
+            <a:outerShdw dist="20320" dir="2700000" algn="bl" rotWithShape="0">
               <a:srgbClr val="151617">
                 <a:alpha val="100000"/>
               </a:srgbClr>
@@ -4195,14 +4595,14 @@
       </p:sp>
       <p:pic>
         <p:nvPicPr>
-          <p:cNvPr id="4" name="Image 0" descr="preencoded.png">    </p:cNvPr>
+          <p:cNvPr id="4" name="Image 0" descr="preencoded.png"/>
           <p:cNvPicPr>
             <a:picLocks noChangeAspect="1"/>
           </p:cNvPicPr>
           <p:nvPr/>
         </p:nvPicPr>
         <p:blipFill>
-          <a:blip r:embed="rId1"/>
+          <a:blip r:embed="rId3"/>
           <a:stretch>
             <a:fillRect/>
           </a:stretch>
@@ -4238,7 +4638,7 @@
           <a:bodyPr wrap="none" lIns="0" tIns="0" rIns="0" bIns="0" rtlCol="0" anchor="t"/>
           <a:lstStyle/>
           <a:p>
-            <a:pPr algn="l" indent="0" marL="0">
+            <a:pPr marL="0" indent="0" algn="l">
               <a:lnSpc>
                 <a:spcPts val="2750"/>
               </a:lnSpc>
@@ -4280,7 +4680,7 @@
           <a:bodyPr wrap="none" lIns="0" tIns="0" rIns="0" bIns="0" rtlCol="0" anchor="t"/>
           <a:lstStyle/>
           <a:p>
-            <a:pPr algn="l" indent="0" marL="0">
+            <a:pPr marL="0" indent="0" algn="l">
               <a:lnSpc>
                 <a:spcPts val="2850"/>
               </a:lnSpc>
@@ -4327,7 +4727,7 @@
             <a:prstDash val="solid"/>
           </a:ln>
           <a:effectLst>
-            <a:outerShdw sx="100000" sy="100000" kx="0" ky="0" algn="bl" rotWithShape="0" blurRad="0" dist="20320" dir="2700000">
+            <a:outerShdw dist="20320" dir="2700000" algn="bl" rotWithShape="0">
               <a:srgbClr val="151617">
                 <a:alpha val="100000"/>
               </a:srgbClr>
@@ -4337,14 +4737,14 @@
       </p:sp>
       <p:pic>
         <p:nvPicPr>
-          <p:cNvPr id="8" name="Image 1" descr="preencoded.png">    </p:cNvPr>
+          <p:cNvPr id="8" name="Image 1" descr="preencoded.png"/>
           <p:cNvPicPr>
             <a:picLocks noChangeAspect="1"/>
           </p:cNvPicPr>
           <p:nvPr/>
         </p:nvPicPr>
         <p:blipFill>
-          <a:blip r:embed="rId2"/>
+          <a:blip r:embed="rId4"/>
           <a:stretch>
             <a:fillRect/>
           </a:stretch>
@@ -4380,7 +4780,7 @@
           <a:bodyPr wrap="none" lIns="0" tIns="0" rIns="0" bIns="0" rtlCol="0" anchor="t"/>
           <a:lstStyle/>
           <a:p>
-            <a:pPr algn="l" indent="0" marL="0">
+            <a:pPr marL="0" indent="0" algn="l">
               <a:lnSpc>
                 <a:spcPts val="2750"/>
               </a:lnSpc>
@@ -4422,7 +4822,7 @@
           <a:bodyPr wrap="none" lIns="0" tIns="0" rIns="0" bIns="0" rtlCol="0" anchor="t"/>
           <a:lstStyle/>
           <a:p>
-            <a:pPr algn="l" indent="0" marL="0">
+            <a:pPr marL="0" indent="0" algn="l">
               <a:lnSpc>
                 <a:spcPts val="2850"/>
               </a:lnSpc>
@@ -4469,7 +4869,7 @@
             <a:prstDash val="solid"/>
           </a:ln>
           <a:effectLst>
-            <a:outerShdw sx="100000" sy="100000" kx="0" ky="0" algn="bl" rotWithShape="0" blurRad="0" dist="20320" dir="2700000">
+            <a:outerShdw dist="20320" dir="2700000" algn="bl" rotWithShape="0">
               <a:srgbClr val="151617">
                 <a:alpha val="100000"/>
               </a:srgbClr>
@@ -4479,14 +4879,14 @@
       </p:sp>
       <p:pic>
         <p:nvPicPr>
-          <p:cNvPr id="12" name="Image 2" descr="preencoded.png">    </p:cNvPr>
+          <p:cNvPr id="12" name="Image 2" descr="preencoded.png"/>
           <p:cNvPicPr>
             <a:picLocks noChangeAspect="1"/>
           </p:cNvPicPr>
           <p:nvPr/>
         </p:nvPicPr>
         <p:blipFill>
-          <a:blip r:embed="rId3"/>
+          <a:blip r:embed="rId5"/>
           <a:stretch>
             <a:fillRect/>
           </a:stretch>
@@ -4522,7 +4922,7 @@
           <a:bodyPr wrap="none" lIns="0" tIns="0" rIns="0" bIns="0" rtlCol="0" anchor="t"/>
           <a:lstStyle/>
           <a:p>
-            <a:pPr algn="l" indent="0" marL="0">
+            <a:pPr marL="0" indent="0" algn="l">
               <a:lnSpc>
                 <a:spcPts val="2750"/>
               </a:lnSpc>
@@ -4564,7 +4964,7 @@
           <a:bodyPr wrap="none" lIns="0" tIns="0" rIns="0" bIns="0" rtlCol="0" anchor="t"/>
           <a:lstStyle/>
           <a:p>
-            <a:pPr algn="l" indent="0" marL="0">
+            <a:pPr marL="0" indent="0" algn="l">
               <a:lnSpc>
                 <a:spcPts val="2850"/>
               </a:lnSpc>
@@ -4611,7 +5011,7 @@
             <a:prstDash val="solid"/>
           </a:ln>
           <a:effectLst>
-            <a:outerShdw sx="100000" sy="100000" kx="0" ky="0" algn="bl" rotWithShape="0" blurRad="0" dist="20320" dir="2700000">
+            <a:outerShdw dist="20320" dir="2700000" algn="bl" rotWithShape="0">
               <a:srgbClr val="151617">
                 <a:alpha val="100000"/>
               </a:srgbClr>
@@ -4621,14 +5021,14 @@
       </p:sp>
       <p:pic>
         <p:nvPicPr>
-          <p:cNvPr id="16" name="Image 3" descr="preencoded.png">    </p:cNvPr>
+          <p:cNvPr id="16" name="Image 3" descr="preencoded.png"/>
           <p:cNvPicPr>
             <a:picLocks noChangeAspect="1"/>
           </p:cNvPicPr>
           <p:nvPr/>
         </p:nvPicPr>
         <p:blipFill>
-          <a:blip r:embed="rId4"/>
+          <a:blip r:embed="rId6"/>
           <a:stretch>
             <a:fillRect/>
           </a:stretch>
@@ -4664,7 +5064,7 @@
           <a:bodyPr wrap="none" lIns="0" tIns="0" rIns="0" bIns="0" rtlCol="0" anchor="t"/>
           <a:lstStyle/>
           <a:p>
-            <a:pPr algn="l" indent="0" marL="0">
+            <a:pPr marL="0" indent="0" algn="l">
               <a:lnSpc>
                 <a:spcPts val="2750"/>
               </a:lnSpc>
@@ -4706,7 +5106,7 @@
           <a:bodyPr wrap="none" lIns="0" tIns="0" rIns="0" bIns="0" rtlCol="0" anchor="t"/>
           <a:lstStyle/>
           <a:p>
-            <a:pPr algn="l" indent="0" marL="0">
+            <a:pPr marL="0" indent="0" algn="l">
               <a:lnSpc>
                 <a:spcPts val="2850"/>
               </a:lnSpc>
@@ -4773,7 +5173,7 @@
           <a:bodyPr wrap="none" lIns="0" tIns="0" rIns="0" bIns="0" rtlCol="0" anchor="t"/>
           <a:lstStyle/>
           <a:p>
-            <a:pPr algn="l" indent="0" marL="0">
+            <a:pPr marL="0" indent="0" algn="l">
               <a:lnSpc>
                 <a:spcPts val="5550"/>
               </a:lnSpc>
@@ -4820,7 +5220,7 @@
             <a:prstDash val="solid"/>
           </a:ln>
           <a:effectLst>
-            <a:outerShdw sx="100000" sy="100000" kx="0" ky="0" algn="bl" rotWithShape="0" blurRad="0" dist="20320" dir="2700000">
+            <a:outerShdw dist="20320" dir="2700000" algn="bl" rotWithShape="0">
               <a:srgbClr val="151617">
                 <a:alpha val="100000"/>
               </a:srgbClr>
@@ -4849,7 +5249,7 @@
           <a:bodyPr wrap="none" lIns="0" tIns="0" rIns="0" bIns="0" rtlCol="0" anchor="t"/>
           <a:lstStyle/>
           <a:p>
-            <a:pPr algn="l" indent="0" marL="0">
+            <a:pPr marL="0" indent="0" algn="l">
               <a:lnSpc>
                 <a:spcPts val="2750"/>
               </a:lnSpc>
@@ -4891,7 +5291,7 @@
           <a:bodyPr wrap="square" lIns="0" tIns="0" rIns="0" bIns="0" rtlCol="0" anchor="t"/>
           <a:lstStyle/>
           <a:p>
-            <a:pPr algn="l" indent="0" marL="0">
+            <a:pPr marL="0" indent="0" algn="l">
               <a:lnSpc>
                 <a:spcPts val="2850"/>
               </a:lnSpc>
@@ -4938,7 +5338,7 @@
             <a:prstDash val="solid"/>
           </a:ln>
           <a:effectLst>
-            <a:outerShdw sx="100000" sy="100000" kx="0" ky="0" algn="bl" rotWithShape="0" blurRad="0" dist="20320" dir="2700000">
+            <a:outerShdw dist="20320" dir="2700000" algn="bl" rotWithShape="0">
               <a:srgbClr val="151617">
                 <a:alpha val="100000"/>
               </a:srgbClr>
@@ -4967,7 +5367,7 @@
           <a:bodyPr wrap="square" lIns="0" tIns="0" rIns="0" bIns="0" rtlCol="0" anchor="t"/>
           <a:lstStyle/>
           <a:p>
-            <a:pPr algn="l" indent="0" marL="0">
+            <a:pPr marL="0" indent="0" algn="l">
               <a:lnSpc>
                 <a:spcPts val="2750"/>
               </a:lnSpc>
@@ -5009,7 +5409,7 @@
           <a:bodyPr wrap="square" lIns="0" tIns="0" rIns="0" bIns="0" rtlCol="0" anchor="t"/>
           <a:lstStyle/>
           <a:p>
-            <a:pPr algn="l" indent="0" marL="0">
+            <a:pPr marL="0" indent="0" algn="l">
               <a:lnSpc>
                 <a:spcPts val="2850"/>
               </a:lnSpc>
@@ -5056,7 +5456,7 @@
             <a:prstDash val="solid"/>
           </a:ln>
           <a:effectLst>
-            <a:outerShdw sx="100000" sy="100000" kx="0" ky="0" algn="bl" rotWithShape="0" blurRad="0" dist="20320" dir="2700000">
+            <a:outerShdw dist="20320" dir="2700000" algn="bl" rotWithShape="0">
               <a:srgbClr val="151617">
                 <a:alpha val="100000"/>
               </a:srgbClr>
@@ -5085,7 +5485,7 @@
           <a:bodyPr wrap="none" lIns="0" tIns="0" rIns="0" bIns="0" rtlCol="0" anchor="t"/>
           <a:lstStyle/>
           <a:p>
-            <a:pPr algn="l" indent="0" marL="0">
+            <a:pPr marL="0" indent="0" algn="l">
               <a:lnSpc>
                 <a:spcPts val="2750"/>
               </a:lnSpc>
@@ -5127,7 +5527,7 @@
           <a:bodyPr wrap="square" lIns="0" tIns="0" rIns="0" bIns="0" rtlCol="0" anchor="t"/>
           <a:lstStyle/>
           <a:p>
-            <a:pPr algn="l" indent="0" marL="0">
+            <a:pPr marL="0" indent="0" algn="l">
               <a:lnSpc>
                 <a:spcPts val="2850"/>
               </a:lnSpc>
@@ -5174,7 +5574,7 @@
             <a:prstDash val="solid"/>
           </a:ln>
           <a:effectLst>
-            <a:outerShdw sx="100000" sy="100000" kx="0" ky="0" algn="bl" rotWithShape="0" blurRad="0" dist="20320" dir="2700000">
+            <a:outerShdw dist="20320" dir="2700000" algn="bl" rotWithShape="0">
               <a:srgbClr val="151617">
                 <a:alpha val="100000"/>
               </a:srgbClr>
@@ -5203,7 +5603,7 @@
           <a:bodyPr wrap="none" lIns="0" tIns="0" rIns="0" bIns="0" rtlCol="0" anchor="t"/>
           <a:lstStyle/>
           <a:p>
-            <a:pPr algn="l" indent="0" marL="0">
+            <a:pPr marL="0" indent="0" algn="l">
               <a:lnSpc>
                 <a:spcPts val="2750"/>
               </a:lnSpc>
@@ -5245,7 +5645,7 @@
           <a:bodyPr wrap="square" lIns="0" tIns="0" rIns="0" bIns="0" rtlCol="0" anchor="t"/>
           <a:lstStyle/>
           <a:p>
-            <a:pPr algn="l" indent="0" marL="0">
+            <a:pPr marL="0" indent="0" algn="l">
               <a:lnSpc>
                 <a:spcPts val="2850"/>
               </a:lnSpc>
@@ -5260,7 +5660,7 @@
                 <a:ea typeface="Inconsolata" pitchFamily="34" charset="-122"/>
                 <a:cs typeface="Inconsolata" pitchFamily="34" charset="-120"/>
               </a:rPr>
-              <a:t>FastAPI prediction endpoint (in progress)</a:t>
+              <a:t>Flask prediction endpoint (in progress)</a:t>
             </a:r>
             <a:endParaRPr lang="en-US" sz="1750" dirty="0"/>
           </a:p>
@@ -5312,7 +5712,7 @@
           <a:bodyPr wrap="none" lIns="0" tIns="0" rIns="0" bIns="0" rtlCol="0" anchor="t"/>
           <a:lstStyle/>
           <a:p>
-            <a:pPr algn="l" indent="0" marL="0">
+            <a:pPr marL="0" indent="0" algn="l">
               <a:lnSpc>
                 <a:spcPts val="5550"/>
               </a:lnSpc>
@@ -5354,7 +5754,7 @@
           <a:bodyPr wrap="none" lIns="0" tIns="0" rIns="0" bIns="0" rtlCol="0" anchor="t"/>
           <a:lstStyle/>
           <a:p>
-            <a:pPr algn="l" indent="0" marL="0">
+            <a:pPr marL="0" indent="0" algn="l">
               <a:lnSpc>
                 <a:spcPts val="2750"/>
               </a:lnSpc>
@@ -5396,7 +5796,7 @@
           <a:bodyPr wrap="none" lIns="0" tIns="0" rIns="0" bIns="0" rtlCol="0" anchor="t"/>
           <a:lstStyle/>
           <a:p>
-            <a:pPr algn="l" marL="342900" indent="-342900">
+            <a:pPr marL="342900" indent="-342900" algn="l">
               <a:lnSpc>
                 <a:spcPts val="2850"/>
               </a:lnSpc>
@@ -5439,7 +5839,7 @@
           <a:bodyPr wrap="none" lIns="0" tIns="0" rIns="0" bIns="0" rtlCol="0" anchor="t"/>
           <a:lstStyle/>
           <a:p>
-            <a:pPr algn="l" marL="342900" indent="-342900">
+            <a:pPr marL="342900" indent="-342900" algn="l">
               <a:lnSpc>
                 <a:spcPts val="2850"/>
               </a:lnSpc>
@@ -5482,7 +5882,7 @@
           <a:bodyPr wrap="none" lIns="0" tIns="0" rIns="0" bIns="0" rtlCol="0" anchor="t"/>
           <a:lstStyle/>
           <a:p>
-            <a:pPr algn="l" indent="0" marL="0">
+            <a:pPr marL="0" indent="0" algn="l">
               <a:lnSpc>
                 <a:spcPts val="2750"/>
               </a:lnSpc>
@@ -5524,7 +5924,7 @@
           <a:bodyPr wrap="none" lIns="0" tIns="0" rIns="0" bIns="0" rtlCol="0" anchor="t"/>
           <a:lstStyle/>
           <a:p>
-            <a:pPr algn="l" marL="342900" indent="-342900">
+            <a:pPr marL="342900" indent="-342900" algn="l">
               <a:lnSpc>
                 <a:spcPts val="2850"/>
               </a:lnSpc>
@@ -5567,7 +5967,7 @@
           <a:bodyPr wrap="none" lIns="0" tIns="0" rIns="0" bIns="0" rtlCol="0" anchor="t"/>
           <a:lstStyle/>
           <a:p>
-            <a:pPr algn="l" marL="342900" indent="-342900">
+            <a:pPr marL="342900" indent="-342900" algn="l">
               <a:lnSpc>
                 <a:spcPts val="2850"/>
               </a:lnSpc>
@@ -5610,7 +6010,7 @@
           <a:bodyPr wrap="none" lIns="0" tIns="0" rIns="0" bIns="0" rtlCol="0" anchor="t"/>
           <a:lstStyle/>
           <a:p>
-            <a:pPr algn="l" marL="342900" indent="-342900">
+            <a:pPr marL="342900" indent="-342900" algn="l">
               <a:lnSpc>
                 <a:spcPts val="2850"/>
               </a:lnSpc>
@@ -5678,7 +6078,7 @@
           <a:bodyPr wrap="none" lIns="0" tIns="0" rIns="0" bIns="0" rtlCol="0" anchor="t"/>
           <a:lstStyle/>
           <a:p>
-            <a:pPr algn="l" indent="0" marL="0">
+            <a:pPr marL="0" indent="0" algn="l">
               <a:lnSpc>
                 <a:spcPts val="5550"/>
               </a:lnSpc>
@@ -5720,7 +6120,7 @@
           <a:bodyPr wrap="none" lIns="0" tIns="0" rIns="0" bIns="0" rtlCol="0" anchor="t"/>
           <a:lstStyle/>
           <a:p>
-            <a:pPr algn="r" indent="0" marL="0">
+            <a:pPr marL="0" indent="0" algn="r">
               <a:lnSpc>
                 <a:spcPts val="2750"/>
               </a:lnSpc>
@@ -5762,7 +6162,7 @@
           <a:bodyPr wrap="none" lIns="0" tIns="0" rIns="0" bIns="0" rtlCol="0" anchor="t"/>
           <a:lstStyle/>
           <a:p>
-            <a:pPr algn="l" marL="342900" indent="-342900">
+            <a:pPr marL="342900" indent="-342900" algn="l">
               <a:lnSpc>
                 <a:spcPts val="2850"/>
               </a:lnSpc>
@@ -5805,7 +6205,7 @@
           <a:bodyPr wrap="none" lIns="0" tIns="0" rIns="0" bIns="0" rtlCol="0" anchor="t"/>
           <a:lstStyle/>
           <a:p>
-            <a:pPr algn="l" marL="342900" indent="-342900">
+            <a:pPr marL="342900" indent="-342900" algn="l">
               <a:lnSpc>
                 <a:spcPts val="2850"/>
               </a:lnSpc>
@@ -5848,7 +6248,7 @@
           <a:bodyPr wrap="none" lIns="0" tIns="0" rIns="0" bIns="0" rtlCol="0" anchor="t"/>
           <a:lstStyle/>
           <a:p>
-            <a:pPr algn="l" marL="342900" indent="-342900">
+            <a:pPr marL="342900" indent="-342900" algn="l">
               <a:lnSpc>
                 <a:spcPts val="2850"/>
               </a:lnSpc>
@@ -5872,438 +6272,7 @@
       </p:sp>
       <p:pic>
         <p:nvPicPr>
-          <p:cNvPr id="7" name="Image 0" descr="preencoded.png">    </p:cNvPr>
-          <p:cNvPicPr>
-            <a:picLocks noChangeAspect="1"/>
-          </p:cNvPicPr>
-          <p:nvPr/>
-        </p:nvPicPr>
-        <p:blipFill>
-          <a:blip r:embed="rId1"/>
-          <a:stretch>
-            <a:fillRect/>
-          </a:stretch>
-        </p:blipFill>
-        <p:spPr>
-          <a:xfrm>
-            <a:off x="5032653" y="2413516"/>
-            <a:ext cx="4564975" cy="4564975"/>
-          </a:xfrm>
-          <a:prstGeom prst="rect">
-            <a:avLst/>
-          </a:prstGeom>
-        </p:spPr>
-      </p:pic>
-      <p:sp>
-        <p:nvSpPr>
-          <p:cNvPr id="8" name="Text 5"/>
-          <p:cNvSpPr/>
-          <p:nvPr/>
-        </p:nvSpPr>
-        <p:spPr>
-          <a:xfrm>
-            <a:off x="5547717" y="4483775"/>
-            <a:ext cx="339328" cy="424220"/>
-          </a:xfrm>
-          <a:prstGeom prst="rect">
-            <a:avLst/>
-          </a:prstGeom>
-          <a:noFill/>
-          <a:ln/>
-        </p:spPr>
-        <p:txBody>
-          <a:bodyPr wrap="none" lIns="0" tIns="0" rIns="0" bIns="0" rtlCol="0" anchor="t"/>
-          <a:lstStyle/>
-          <a:p>
-            <a:pPr algn="l" indent="0" marL="0">
-              <a:lnSpc>
-                <a:spcPts val="4250"/>
-              </a:lnSpc>
-              <a:buNone/>
-            </a:pPr>
-            <a:r>
-              <a:rPr lang="en-US" sz="2650" b="1" dirty="0">
-                <a:solidFill>
-                  <a:srgbClr val="151617"/>
-                </a:solidFill>
-                <a:latin typeface="Montserrat Black" pitchFamily="34" charset="0"/>
-                <a:ea typeface="Montserrat Black" pitchFamily="34" charset="-122"/>
-                <a:cs typeface="Montserrat Black" pitchFamily="34" charset="-120"/>
-              </a:rPr>
-              <a:t>1</a:t>
-            </a:r>
-            <a:endParaRPr lang="en-US" sz="2650" dirty="0"/>
-          </a:p>
-        </p:txBody>
-      </p:sp>
-      <p:sp>
-        <p:nvSpPr>
-          <p:cNvPr id="9" name="Text 6"/>
-          <p:cNvSpPr/>
-          <p:nvPr/>
-        </p:nvSpPr>
-        <p:spPr>
-          <a:xfrm>
-            <a:off x="9937790" y="2620685"/>
-            <a:ext cx="2835235" cy="354330"/>
-          </a:xfrm>
-          <a:prstGeom prst="rect">
-            <a:avLst/>
-          </a:prstGeom>
-          <a:noFill/>
-          <a:ln/>
-        </p:spPr>
-        <p:txBody>
-          <a:bodyPr wrap="none" lIns="0" tIns="0" rIns="0" bIns="0" rtlCol="0" anchor="t"/>
-          <a:lstStyle/>
-          <a:p>
-            <a:pPr algn="l" indent="0" marL="0">
-              <a:lnSpc>
-                <a:spcPts val="2750"/>
-              </a:lnSpc>
-              <a:buNone/>
-            </a:pPr>
-            <a:r>
-              <a:rPr lang="en-US" sz="2200" b="1" dirty="0">
-                <a:solidFill>
-                  <a:srgbClr val="151617"/>
-                </a:solidFill>
-                <a:latin typeface="Montserrat Black" pitchFamily="34" charset="0"/>
-                <a:ea typeface="Montserrat Black" pitchFamily="34" charset="-122"/>
-                <a:cs typeface="Montserrat Black" pitchFamily="34" charset="-120"/>
-              </a:rPr>
-              <a:t>Derived Features</a:t>
-            </a:r>
-            <a:endParaRPr lang="en-US" sz="2200" dirty="0"/>
-          </a:p>
-        </p:txBody>
-      </p:sp>
-      <p:sp>
-        <p:nvSpPr>
-          <p:cNvPr id="10" name="Text 7"/>
-          <p:cNvSpPr/>
-          <p:nvPr/>
-        </p:nvSpPr>
-        <p:spPr>
-          <a:xfrm>
-            <a:off x="9937790" y="3111103"/>
-            <a:ext cx="3898821" cy="362903"/>
-          </a:xfrm>
-          <a:prstGeom prst="rect">
-            <a:avLst/>
-          </a:prstGeom>
-          <a:noFill/>
-          <a:ln/>
-        </p:spPr>
-        <p:txBody>
-          <a:bodyPr wrap="none" lIns="0" tIns="0" rIns="0" bIns="0" rtlCol="0" anchor="t"/>
-          <a:lstStyle/>
-          <a:p>
-            <a:pPr algn="l" marL="342900" indent="-342900">
-              <a:lnSpc>
-                <a:spcPts val="2850"/>
-              </a:lnSpc>
-              <a:buSzPct val="100000"/>
-              <a:buChar char="•"/>
-            </a:pPr>
-            <a:r>
-              <a:rPr lang="en-US" sz="1750" dirty="0">
-                <a:solidFill>
-                  <a:srgbClr val="151617"/>
-                </a:solidFill>
-                <a:latin typeface="Inconsolata" pitchFamily="34" charset="0"/>
-                <a:ea typeface="Inconsolata" pitchFamily="34" charset="-122"/>
-                <a:cs typeface="Inconsolata" pitchFamily="34" charset="-120"/>
-              </a:rPr>
-              <a:t>Repository age (days)</a:t>
-            </a:r>
-            <a:endParaRPr lang="en-US" sz="1750" dirty="0"/>
-          </a:p>
-        </p:txBody>
-      </p:sp>
-      <p:sp>
-        <p:nvSpPr>
-          <p:cNvPr id="11" name="Text 8"/>
-          <p:cNvSpPr/>
-          <p:nvPr/>
-        </p:nvSpPr>
-        <p:spPr>
-          <a:xfrm>
-            <a:off x="9937790" y="3553301"/>
-            <a:ext cx="3898821" cy="362903"/>
-          </a:xfrm>
-          <a:prstGeom prst="rect">
-            <a:avLst/>
-          </a:prstGeom>
-          <a:noFill/>
-          <a:ln/>
-        </p:spPr>
-        <p:txBody>
-          <a:bodyPr wrap="none" lIns="0" tIns="0" rIns="0" bIns="0" rtlCol="0" anchor="t"/>
-          <a:lstStyle/>
-          <a:p>
-            <a:pPr algn="l" marL="342900" indent="-342900">
-              <a:lnSpc>
-                <a:spcPts val="2850"/>
-              </a:lnSpc>
-              <a:buSzPct val="100000"/>
-              <a:buChar char="•"/>
-            </a:pPr>
-            <a:r>
-              <a:rPr lang="en-US" sz="1750" dirty="0">
-                <a:solidFill>
-                  <a:srgbClr val="151617"/>
-                </a:solidFill>
-                <a:latin typeface="Inconsolata" pitchFamily="34" charset="0"/>
-                <a:ea typeface="Inconsolata" pitchFamily="34" charset="-122"/>
-                <a:cs typeface="Inconsolata" pitchFamily="34" charset="-120"/>
-              </a:rPr>
-              <a:t>Commit velocity</a:t>
-            </a:r>
-            <a:endParaRPr lang="en-US" sz="1750" dirty="0"/>
-          </a:p>
-        </p:txBody>
-      </p:sp>
-      <p:sp>
-        <p:nvSpPr>
-          <p:cNvPr id="12" name="Text 9"/>
-          <p:cNvSpPr/>
-          <p:nvPr/>
-        </p:nvSpPr>
-        <p:spPr>
-          <a:xfrm>
-            <a:off x="9937790" y="3995499"/>
-            <a:ext cx="3898821" cy="362903"/>
-          </a:xfrm>
-          <a:prstGeom prst="rect">
-            <a:avLst/>
-          </a:prstGeom>
-          <a:noFill/>
-          <a:ln/>
-        </p:spPr>
-        <p:txBody>
-          <a:bodyPr wrap="none" lIns="0" tIns="0" rIns="0" bIns="0" rtlCol="0" anchor="t"/>
-          <a:lstStyle/>
-          <a:p>
-            <a:pPr algn="l" marL="342900" indent="-342900">
-              <a:lnSpc>
-                <a:spcPts val="2850"/>
-              </a:lnSpc>
-              <a:buSzPct val="100000"/>
-              <a:buChar char="•"/>
-            </a:pPr>
-            <a:r>
-              <a:rPr lang="en-US" sz="1750" dirty="0">
-                <a:solidFill>
-                  <a:srgbClr val="151617"/>
-                </a:solidFill>
-                <a:latin typeface="Inconsolata" pitchFamily="34" charset="0"/>
-                <a:ea typeface="Inconsolata" pitchFamily="34" charset="-122"/>
-                <a:cs typeface="Inconsolata" pitchFamily="34" charset="-120"/>
-              </a:rPr>
-              <a:t>Number of topics</a:t>
-            </a:r>
-            <a:endParaRPr lang="en-US" sz="1750" dirty="0"/>
-          </a:p>
-        </p:txBody>
-      </p:sp>
-      <p:pic>
-        <p:nvPicPr>
-          <p:cNvPr id="13" name="Image 1" descr="preencoded.png">    </p:cNvPr>
-          <p:cNvPicPr>
-            <a:picLocks noChangeAspect="1"/>
-          </p:cNvPicPr>
-          <p:nvPr/>
-        </p:nvPicPr>
-        <p:blipFill>
-          <a:blip r:embed="rId2"/>
-          <a:stretch>
-            <a:fillRect/>
-          </a:stretch>
-        </p:blipFill>
-        <p:spPr>
-          <a:xfrm>
-            <a:off x="5032653" y="2413516"/>
-            <a:ext cx="4564975" cy="4564975"/>
-          </a:xfrm>
-          <a:prstGeom prst="rect">
-            <a:avLst/>
-          </a:prstGeom>
-        </p:spPr>
-      </p:pic>
-      <p:sp>
-        <p:nvSpPr>
-          <p:cNvPr id="14" name="Text 10"/>
-          <p:cNvSpPr/>
-          <p:nvPr/>
-        </p:nvSpPr>
-        <p:spPr>
-          <a:xfrm>
-            <a:off x="7944326" y="3100149"/>
-            <a:ext cx="339328" cy="424220"/>
-          </a:xfrm>
-          <a:prstGeom prst="rect">
-            <a:avLst/>
-          </a:prstGeom>
-          <a:noFill/>
-          <a:ln/>
-        </p:spPr>
-        <p:txBody>
-          <a:bodyPr wrap="none" lIns="0" tIns="0" rIns="0" bIns="0" rtlCol="0" anchor="t"/>
-          <a:lstStyle/>
-          <a:p>
-            <a:pPr algn="l" indent="0" marL="0">
-              <a:lnSpc>
-                <a:spcPts val="4250"/>
-              </a:lnSpc>
-              <a:buNone/>
-            </a:pPr>
-            <a:r>
-              <a:rPr lang="en-US" sz="2650" b="1" dirty="0">
-                <a:solidFill>
-                  <a:srgbClr val="151617"/>
-                </a:solidFill>
-                <a:latin typeface="Montserrat Black" pitchFamily="34" charset="0"/>
-                <a:ea typeface="Montserrat Black" pitchFamily="34" charset="-122"/>
-                <a:cs typeface="Montserrat Black" pitchFamily="34" charset="-120"/>
-              </a:rPr>
-              <a:t>2</a:t>
-            </a:r>
-            <a:endParaRPr lang="en-US" sz="2650" dirty="0"/>
-          </a:p>
-        </p:txBody>
-      </p:sp>
-      <p:sp>
-        <p:nvSpPr>
-          <p:cNvPr id="15" name="Text 11"/>
-          <p:cNvSpPr/>
-          <p:nvPr/>
-        </p:nvSpPr>
-        <p:spPr>
-          <a:xfrm>
-            <a:off x="9937790" y="5112901"/>
-            <a:ext cx="2835235" cy="354330"/>
-          </a:xfrm>
-          <a:prstGeom prst="rect">
-            <a:avLst/>
-          </a:prstGeom>
-          <a:noFill/>
-          <a:ln/>
-        </p:spPr>
-        <p:txBody>
-          <a:bodyPr wrap="none" lIns="0" tIns="0" rIns="0" bIns="0" rtlCol="0" anchor="t"/>
-          <a:lstStyle/>
-          <a:p>
-            <a:pPr algn="l" indent="0" marL="0">
-              <a:lnSpc>
-                <a:spcPts val="2750"/>
-              </a:lnSpc>
-              <a:buNone/>
-            </a:pPr>
-            <a:r>
-              <a:rPr lang="en-US" sz="2200" b="1" dirty="0">
-                <a:solidFill>
-                  <a:srgbClr val="151617"/>
-                </a:solidFill>
-                <a:latin typeface="Montserrat Black" pitchFamily="34" charset="0"/>
-                <a:ea typeface="Montserrat Black" pitchFamily="34" charset="-122"/>
-                <a:cs typeface="Montserrat Black" pitchFamily="34" charset="-120"/>
-              </a:rPr>
-              <a:t>Data Cleaning</a:t>
-            </a:r>
-            <a:endParaRPr lang="en-US" sz="2200" dirty="0"/>
-          </a:p>
-        </p:txBody>
-      </p:sp>
-      <p:sp>
-        <p:nvSpPr>
-          <p:cNvPr id="16" name="Text 12"/>
-          <p:cNvSpPr/>
-          <p:nvPr/>
-        </p:nvSpPr>
-        <p:spPr>
-          <a:xfrm>
-            <a:off x="9937790" y="5603319"/>
-            <a:ext cx="3898821" cy="725805"/>
-          </a:xfrm>
-          <a:prstGeom prst="rect">
-            <a:avLst/>
-          </a:prstGeom>
-          <a:noFill/>
-          <a:ln/>
-        </p:spPr>
-        <p:txBody>
-          <a:bodyPr wrap="square" lIns="0" tIns="0" rIns="0" bIns="0" rtlCol="0" anchor="t"/>
-          <a:lstStyle/>
-          <a:p>
-            <a:pPr algn="l" marL="342900" indent="-342900">
-              <a:lnSpc>
-                <a:spcPts val="2850"/>
-              </a:lnSpc>
-              <a:buSzPct val="100000"/>
-              <a:buChar char="•"/>
-            </a:pPr>
-            <a:r>
-              <a:rPr lang="en-US" sz="1750" dirty="0">
-                <a:solidFill>
-                  <a:srgbClr val="151617"/>
-                </a:solidFill>
-                <a:latin typeface="Inconsolata" pitchFamily="34" charset="0"/>
-                <a:ea typeface="Inconsolata" pitchFamily="34" charset="-122"/>
-                <a:cs typeface="Inconsolata" pitchFamily="34" charset="-120"/>
-              </a:rPr>
-              <a:t>Dropped empty fields like subscribers</a:t>
-            </a:r>
-            <a:endParaRPr lang="en-US" sz="1750" dirty="0"/>
-          </a:p>
-        </p:txBody>
-      </p:sp>
-      <p:sp>
-        <p:nvSpPr>
-          <p:cNvPr id="17" name="Text 13"/>
-          <p:cNvSpPr/>
-          <p:nvPr/>
-        </p:nvSpPr>
-        <p:spPr>
-          <a:xfrm>
-            <a:off x="9937790" y="6408420"/>
-            <a:ext cx="3898821" cy="362903"/>
-          </a:xfrm>
-          <a:prstGeom prst="rect">
-            <a:avLst/>
-          </a:prstGeom>
-          <a:noFill/>
-          <a:ln/>
-        </p:spPr>
-        <p:txBody>
-          <a:bodyPr wrap="none" lIns="0" tIns="0" rIns="0" bIns="0" rtlCol="0" anchor="t"/>
-          <a:lstStyle/>
-          <a:p>
-            <a:pPr algn="l" marL="342900" indent="-342900">
-              <a:lnSpc>
-                <a:spcPts val="2850"/>
-              </a:lnSpc>
-              <a:buSzPct val="100000"/>
-              <a:buChar char="•"/>
-            </a:pPr>
-            <a:r>
-              <a:rPr lang="en-US" sz="1750" dirty="0">
-                <a:solidFill>
-                  <a:srgbClr val="151617"/>
-                </a:solidFill>
-                <a:latin typeface="Inconsolata" pitchFamily="34" charset="0"/>
-                <a:ea typeface="Inconsolata" pitchFamily="34" charset="-122"/>
-                <a:cs typeface="Inconsolata" pitchFamily="34" charset="-120"/>
-              </a:rPr>
-              <a:t>Output saved in Parquet format</a:t>
-            </a:r>
-            <a:endParaRPr lang="en-US" sz="1750" dirty="0"/>
-          </a:p>
-        </p:txBody>
-      </p:sp>
-      <p:pic>
-        <p:nvPicPr>
-          <p:cNvPr id="18" name="Image 2" descr="preencoded.png">    </p:cNvPr>
+          <p:cNvPr id="7" name="Image 0" descr="preencoded.png"/>
           <p:cNvPicPr>
             <a:picLocks noChangeAspect="1"/>
           </p:cNvPicPr>
@@ -6327,6 +6296,437 @@
       </p:pic>
       <p:sp>
         <p:nvSpPr>
+          <p:cNvPr id="8" name="Text 5"/>
+          <p:cNvSpPr/>
+          <p:nvPr/>
+        </p:nvSpPr>
+        <p:spPr>
+          <a:xfrm>
+            <a:off x="5547717" y="4483775"/>
+            <a:ext cx="339328" cy="424220"/>
+          </a:xfrm>
+          <a:prstGeom prst="rect">
+            <a:avLst/>
+          </a:prstGeom>
+          <a:noFill/>
+          <a:ln/>
+        </p:spPr>
+        <p:txBody>
+          <a:bodyPr wrap="none" lIns="0" tIns="0" rIns="0" bIns="0" rtlCol="0" anchor="t"/>
+          <a:lstStyle/>
+          <a:p>
+            <a:pPr marL="0" indent="0" algn="l">
+              <a:lnSpc>
+                <a:spcPts val="4250"/>
+              </a:lnSpc>
+              <a:buNone/>
+            </a:pPr>
+            <a:r>
+              <a:rPr lang="en-US" sz="2650" b="1" dirty="0">
+                <a:solidFill>
+                  <a:srgbClr val="151617"/>
+                </a:solidFill>
+                <a:latin typeface="Montserrat Black" pitchFamily="34" charset="0"/>
+                <a:ea typeface="Montserrat Black" pitchFamily="34" charset="-122"/>
+                <a:cs typeface="Montserrat Black" pitchFamily="34" charset="-120"/>
+              </a:rPr>
+              <a:t>1</a:t>
+            </a:r>
+            <a:endParaRPr lang="en-US" sz="2650" dirty="0"/>
+          </a:p>
+        </p:txBody>
+      </p:sp>
+      <p:sp>
+        <p:nvSpPr>
+          <p:cNvPr id="9" name="Text 6"/>
+          <p:cNvSpPr/>
+          <p:nvPr/>
+        </p:nvSpPr>
+        <p:spPr>
+          <a:xfrm>
+            <a:off x="9937790" y="2620685"/>
+            <a:ext cx="2835235" cy="354330"/>
+          </a:xfrm>
+          <a:prstGeom prst="rect">
+            <a:avLst/>
+          </a:prstGeom>
+          <a:noFill/>
+          <a:ln/>
+        </p:spPr>
+        <p:txBody>
+          <a:bodyPr wrap="none" lIns="0" tIns="0" rIns="0" bIns="0" rtlCol="0" anchor="t"/>
+          <a:lstStyle/>
+          <a:p>
+            <a:pPr marL="0" indent="0" algn="l">
+              <a:lnSpc>
+                <a:spcPts val="2750"/>
+              </a:lnSpc>
+              <a:buNone/>
+            </a:pPr>
+            <a:r>
+              <a:rPr lang="en-US" sz="2200" b="1" dirty="0">
+                <a:solidFill>
+                  <a:srgbClr val="151617"/>
+                </a:solidFill>
+                <a:latin typeface="Montserrat Black" pitchFamily="34" charset="0"/>
+                <a:ea typeface="Montserrat Black" pitchFamily="34" charset="-122"/>
+                <a:cs typeface="Montserrat Black" pitchFamily="34" charset="-120"/>
+              </a:rPr>
+              <a:t>Derived Features</a:t>
+            </a:r>
+            <a:endParaRPr lang="en-US" sz="2200" dirty="0"/>
+          </a:p>
+        </p:txBody>
+      </p:sp>
+      <p:sp>
+        <p:nvSpPr>
+          <p:cNvPr id="10" name="Text 7"/>
+          <p:cNvSpPr/>
+          <p:nvPr/>
+        </p:nvSpPr>
+        <p:spPr>
+          <a:xfrm>
+            <a:off x="9937790" y="3111103"/>
+            <a:ext cx="3898821" cy="362903"/>
+          </a:xfrm>
+          <a:prstGeom prst="rect">
+            <a:avLst/>
+          </a:prstGeom>
+          <a:noFill/>
+          <a:ln/>
+        </p:spPr>
+        <p:txBody>
+          <a:bodyPr wrap="none" lIns="0" tIns="0" rIns="0" bIns="0" rtlCol="0" anchor="t"/>
+          <a:lstStyle/>
+          <a:p>
+            <a:pPr marL="342900" indent="-342900" algn="l">
+              <a:lnSpc>
+                <a:spcPts val="2850"/>
+              </a:lnSpc>
+              <a:buSzPct val="100000"/>
+              <a:buChar char="•"/>
+            </a:pPr>
+            <a:r>
+              <a:rPr lang="en-US" sz="1750" dirty="0">
+                <a:solidFill>
+                  <a:srgbClr val="151617"/>
+                </a:solidFill>
+                <a:latin typeface="Inconsolata" pitchFamily="34" charset="0"/>
+                <a:ea typeface="Inconsolata" pitchFamily="34" charset="-122"/>
+                <a:cs typeface="Inconsolata" pitchFamily="34" charset="-120"/>
+              </a:rPr>
+              <a:t>Repository age (days)</a:t>
+            </a:r>
+            <a:endParaRPr lang="en-US" sz="1750" dirty="0"/>
+          </a:p>
+        </p:txBody>
+      </p:sp>
+      <p:sp>
+        <p:nvSpPr>
+          <p:cNvPr id="11" name="Text 8"/>
+          <p:cNvSpPr/>
+          <p:nvPr/>
+        </p:nvSpPr>
+        <p:spPr>
+          <a:xfrm>
+            <a:off x="9937790" y="3553301"/>
+            <a:ext cx="3898821" cy="362903"/>
+          </a:xfrm>
+          <a:prstGeom prst="rect">
+            <a:avLst/>
+          </a:prstGeom>
+          <a:noFill/>
+          <a:ln/>
+        </p:spPr>
+        <p:txBody>
+          <a:bodyPr wrap="none" lIns="0" tIns="0" rIns="0" bIns="0" rtlCol="0" anchor="t"/>
+          <a:lstStyle/>
+          <a:p>
+            <a:pPr marL="342900" indent="-342900" algn="l">
+              <a:lnSpc>
+                <a:spcPts val="2850"/>
+              </a:lnSpc>
+              <a:buSzPct val="100000"/>
+              <a:buChar char="•"/>
+            </a:pPr>
+            <a:r>
+              <a:rPr lang="en-US" sz="1750" dirty="0">
+                <a:solidFill>
+                  <a:srgbClr val="151617"/>
+                </a:solidFill>
+                <a:latin typeface="Inconsolata" pitchFamily="34" charset="0"/>
+                <a:ea typeface="Inconsolata" pitchFamily="34" charset="-122"/>
+                <a:cs typeface="Inconsolata" pitchFamily="34" charset="-120"/>
+              </a:rPr>
+              <a:t>Commit velocity</a:t>
+            </a:r>
+            <a:endParaRPr lang="en-US" sz="1750" dirty="0"/>
+          </a:p>
+        </p:txBody>
+      </p:sp>
+      <p:sp>
+        <p:nvSpPr>
+          <p:cNvPr id="12" name="Text 9"/>
+          <p:cNvSpPr/>
+          <p:nvPr/>
+        </p:nvSpPr>
+        <p:spPr>
+          <a:xfrm>
+            <a:off x="9937790" y="3995499"/>
+            <a:ext cx="3898821" cy="362903"/>
+          </a:xfrm>
+          <a:prstGeom prst="rect">
+            <a:avLst/>
+          </a:prstGeom>
+          <a:noFill/>
+          <a:ln/>
+        </p:spPr>
+        <p:txBody>
+          <a:bodyPr wrap="none" lIns="0" tIns="0" rIns="0" bIns="0" rtlCol="0" anchor="t"/>
+          <a:lstStyle/>
+          <a:p>
+            <a:pPr marL="342900" indent="-342900" algn="l">
+              <a:lnSpc>
+                <a:spcPts val="2850"/>
+              </a:lnSpc>
+              <a:buSzPct val="100000"/>
+              <a:buChar char="•"/>
+            </a:pPr>
+            <a:r>
+              <a:rPr lang="en-US" sz="1750" dirty="0">
+                <a:solidFill>
+                  <a:srgbClr val="151617"/>
+                </a:solidFill>
+                <a:latin typeface="Inconsolata" pitchFamily="34" charset="0"/>
+                <a:ea typeface="Inconsolata" pitchFamily="34" charset="-122"/>
+                <a:cs typeface="Inconsolata" pitchFamily="34" charset="-120"/>
+              </a:rPr>
+              <a:t>Number of topics</a:t>
+            </a:r>
+            <a:endParaRPr lang="en-US" sz="1750" dirty="0"/>
+          </a:p>
+        </p:txBody>
+      </p:sp>
+      <p:pic>
+        <p:nvPicPr>
+          <p:cNvPr id="13" name="Image 1" descr="preencoded.png"/>
+          <p:cNvPicPr>
+            <a:picLocks noChangeAspect="1"/>
+          </p:cNvPicPr>
+          <p:nvPr/>
+        </p:nvPicPr>
+        <p:blipFill>
+          <a:blip r:embed="rId4"/>
+          <a:stretch>
+            <a:fillRect/>
+          </a:stretch>
+        </p:blipFill>
+        <p:spPr>
+          <a:xfrm>
+            <a:off x="5032653" y="2413516"/>
+            <a:ext cx="4564975" cy="4564975"/>
+          </a:xfrm>
+          <a:prstGeom prst="rect">
+            <a:avLst/>
+          </a:prstGeom>
+        </p:spPr>
+      </p:pic>
+      <p:sp>
+        <p:nvSpPr>
+          <p:cNvPr id="14" name="Text 10"/>
+          <p:cNvSpPr/>
+          <p:nvPr/>
+        </p:nvSpPr>
+        <p:spPr>
+          <a:xfrm>
+            <a:off x="7944326" y="3100149"/>
+            <a:ext cx="339328" cy="424220"/>
+          </a:xfrm>
+          <a:prstGeom prst="rect">
+            <a:avLst/>
+          </a:prstGeom>
+          <a:noFill/>
+          <a:ln/>
+        </p:spPr>
+        <p:txBody>
+          <a:bodyPr wrap="none" lIns="0" tIns="0" rIns="0" bIns="0" rtlCol="0" anchor="t"/>
+          <a:lstStyle/>
+          <a:p>
+            <a:pPr marL="0" indent="0" algn="l">
+              <a:lnSpc>
+                <a:spcPts val="4250"/>
+              </a:lnSpc>
+              <a:buNone/>
+            </a:pPr>
+            <a:r>
+              <a:rPr lang="en-US" sz="2650" b="1" dirty="0">
+                <a:solidFill>
+                  <a:srgbClr val="151617"/>
+                </a:solidFill>
+                <a:latin typeface="Montserrat Black" pitchFamily="34" charset="0"/>
+                <a:ea typeface="Montserrat Black" pitchFamily="34" charset="-122"/>
+                <a:cs typeface="Montserrat Black" pitchFamily="34" charset="-120"/>
+              </a:rPr>
+              <a:t>2</a:t>
+            </a:r>
+            <a:endParaRPr lang="en-US" sz="2650" dirty="0"/>
+          </a:p>
+        </p:txBody>
+      </p:sp>
+      <p:sp>
+        <p:nvSpPr>
+          <p:cNvPr id="15" name="Text 11"/>
+          <p:cNvSpPr/>
+          <p:nvPr/>
+        </p:nvSpPr>
+        <p:spPr>
+          <a:xfrm>
+            <a:off x="9937790" y="5112901"/>
+            <a:ext cx="2835235" cy="354330"/>
+          </a:xfrm>
+          <a:prstGeom prst="rect">
+            <a:avLst/>
+          </a:prstGeom>
+          <a:noFill/>
+          <a:ln/>
+        </p:spPr>
+        <p:txBody>
+          <a:bodyPr wrap="none" lIns="0" tIns="0" rIns="0" bIns="0" rtlCol="0" anchor="t"/>
+          <a:lstStyle/>
+          <a:p>
+            <a:pPr marL="0" indent="0" algn="l">
+              <a:lnSpc>
+                <a:spcPts val="2750"/>
+              </a:lnSpc>
+              <a:buNone/>
+            </a:pPr>
+            <a:r>
+              <a:rPr lang="en-US" sz="2200" b="1" dirty="0">
+                <a:solidFill>
+                  <a:srgbClr val="151617"/>
+                </a:solidFill>
+                <a:latin typeface="Montserrat Black" pitchFamily="34" charset="0"/>
+                <a:ea typeface="Montserrat Black" pitchFamily="34" charset="-122"/>
+                <a:cs typeface="Montserrat Black" pitchFamily="34" charset="-120"/>
+              </a:rPr>
+              <a:t>Data Cleaning</a:t>
+            </a:r>
+            <a:endParaRPr lang="en-US" sz="2200" dirty="0"/>
+          </a:p>
+        </p:txBody>
+      </p:sp>
+      <p:sp>
+        <p:nvSpPr>
+          <p:cNvPr id="16" name="Text 12"/>
+          <p:cNvSpPr/>
+          <p:nvPr/>
+        </p:nvSpPr>
+        <p:spPr>
+          <a:xfrm>
+            <a:off x="9937790" y="5603319"/>
+            <a:ext cx="3898821" cy="725805"/>
+          </a:xfrm>
+          <a:prstGeom prst="rect">
+            <a:avLst/>
+          </a:prstGeom>
+          <a:noFill/>
+          <a:ln/>
+        </p:spPr>
+        <p:txBody>
+          <a:bodyPr wrap="square" lIns="0" tIns="0" rIns="0" bIns="0" rtlCol="0" anchor="t"/>
+          <a:lstStyle/>
+          <a:p>
+            <a:pPr marL="342900" indent="-342900" algn="l">
+              <a:lnSpc>
+                <a:spcPts val="2850"/>
+              </a:lnSpc>
+              <a:buSzPct val="100000"/>
+              <a:buChar char="•"/>
+            </a:pPr>
+            <a:r>
+              <a:rPr lang="en-US" sz="1750" dirty="0">
+                <a:solidFill>
+                  <a:srgbClr val="151617"/>
+                </a:solidFill>
+                <a:latin typeface="Inconsolata" pitchFamily="34" charset="0"/>
+                <a:ea typeface="Inconsolata" pitchFamily="34" charset="-122"/>
+                <a:cs typeface="Inconsolata" pitchFamily="34" charset="-120"/>
+              </a:rPr>
+              <a:t>Dropped empty fields like subscribers</a:t>
+            </a:r>
+            <a:endParaRPr lang="en-US" sz="1750" dirty="0"/>
+          </a:p>
+        </p:txBody>
+      </p:sp>
+      <p:sp>
+        <p:nvSpPr>
+          <p:cNvPr id="17" name="Text 13"/>
+          <p:cNvSpPr/>
+          <p:nvPr/>
+        </p:nvSpPr>
+        <p:spPr>
+          <a:xfrm>
+            <a:off x="9937790" y="6408420"/>
+            <a:ext cx="3898821" cy="362903"/>
+          </a:xfrm>
+          <a:prstGeom prst="rect">
+            <a:avLst/>
+          </a:prstGeom>
+          <a:noFill/>
+          <a:ln/>
+        </p:spPr>
+        <p:txBody>
+          <a:bodyPr wrap="none" lIns="0" tIns="0" rIns="0" bIns="0" rtlCol="0" anchor="t"/>
+          <a:lstStyle/>
+          <a:p>
+            <a:pPr marL="342900" indent="-342900" algn="l">
+              <a:lnSpc>
+                <a:spcPts val="2850"/>
+              </a:lnSpc>
+              <a:buSzPct val="100000"/>
+              <a:buChar char="•"/>
+            </a:pPr>
+            <a:r>
+              <a:rPr lang="en-US" sz="1750" dirty="0">
+                <a:solidFill>
+                  <a:srgbClr val="151617"/>
+                </a:solidFill>
+                <a:latin typeface="Inconsolata" pitchFamily="34" charset="0"/>
+                <a:ea typeface="Inconsolata" pitchFamily="34" charset="-122"/>
+                <a:cs typeface="Inconsolata" pitchFamily="34" charset="-120"/>
+              </a:rPr>
+              <a:t>Output saved in Parquet format</a:t>
+            </a:r>
+            <a:endParaRPr lang="en-US" sz="1750" dirty="0"/>
+          </a:p>
+        </p:txBody>
+      </p:sp>
+      <p:pic>
+        <p:nvPicPr>
+          <p:cNvPr id="18" name="Image 2" descr="preencoded.png"/>
+          <p:cNvPicPr>
+            <a:picLocks noChangeAspect="1"/>
+          </p:cNvPicPr>
+          <p:nvPr/>
+        </p:nvPicPr>
+        <p:blipFill>
+          <a:blip r:embed="rId5"/>
+          <a:stretch>
+            <a:fillRect/>
+          </a:stretch>
+        </p:blipFill>
+        <p:spPr>
+          <a:xfrm>
+            <a:off x="5032653" y="2413516"/>
+            <a:ext cx="4564975" cy="4564975"/>
+          </a:xfrm>
+          <a:prstGeom prst="rect">
+            <a:avLst/>
+          </a:prstGeom>
+        </p:spPr>
+      </p:pic>
+      <p:sp>
+        <p:nvSpPr>
           <p:cNvPr id="19" name="Text 14"/>
           <p:cNvSpPr/>
           <p:nvPr/>
@@ -6346,7 +6746,7 @@
           <a:bodyPr wrap="none" lIns="0" tIns="0" rIns="0" bIns="0" rtlCol="0" anchor="t"/>
           <a:lstStyle/>
           <a:p>
-            <a:pPr algn="l" indent="0" marL="0">
+            <a:pPr marL="0" indent="0" algn="l">
               <a:lnSpc>
                 <a:spcPts val="4250"/>
               </a:lnSpc>
@@ -6413,7 +6813,7 @@
           <a:bodyPr wrap="none" lIns="0" tIns="0" rIns="0" bIns="0" rtlCol="0" anchor="t"/>
           <a:lstStyle/>
           <a:p>
-            <a:pPr algn="l" indent="0" marL="0">
+            <a:pPr marL="0" indent="0" algn="l">
               <a:lnSpc>
                 <a:spcPts val="5550"/>
               </a:lnSpc>
@@ -6460,7 +6860,7 @@
             <a:prstDash val="solid"/>
           </a:ln>
           <a:effectLst>
-            <a:outerShdw sx="100000" sy="100000" kx="0" ky="0" algn="bl" rotWithShape="0" blurRad="0" dist="20320" dir="2700000">
+            <a:outerShdw dist="20320" dir="2700000" algn="bl" rotWithShape="0">
               <a:srgbClr val="151617">
                 <a:alpha val="100000"/>
               </a:srgbClr>
@@ -6489,7 +6889,7 @@
           <a:bodyPr wrap="none" lIns="0" tIns="0" rIns="0" bIns="0" rtlCol="0" anchor="t"/>
           <a:lstStyle/>
           <a:p>
-            <a:pPr algn="l" indent="0" marL="0">
+            <a:pPr marL="0" indent="0" algn="l">
               <a:lnSpc>
                 <a:spcPts val="2750"/>
               </a:lnSpc>
@@ -6531,7 +6931,7 @@
           <a:bodyPr wrap="square" lIns="0" tIns="0" rIns="0" bIns="0" rtlCol="0" anchor="t"/>
           <a:lstStyle/>
           <a:p>
-            <a:pPr algn="l" indent="0" marL="0">
+            <a:pPr marL="0" indent="0" algn="l">
               <a:lnSpc>
                 <a:spcPts val="2850"/>
               </a:lnSpc>
@@ -6578,7 +6978,7 @@
             <a:prstDash val="solid"/>
           </a:ln>
           <a:effectLst>
-            <a:outerShdw sx="100000" sy="100000" kx="0" ky="0" algn="bl" rotWithShape="0" blurRad="0" dist="20320" dir="2700000">
+            <a:outerShdw dist="20320" dir="2700000" algn="bl" rotWithShape="0">
               <a:srgbClr val="151617">
                 <a:alpha val="100000"/>
               </a:srgbClr>
@@ -6607,7 +7007,7 @@
           <a:bodyPr wrap="none" lIns="0" tIns="0" rIns="0" bIns="0" rtlCol="0" anchor="t"/>
           <a:lstStyle/>
           <a:p>
-            <a:pPr algn="l" indent="0" marL="0">
+            <a:pPr marL="0" indent="0" algn="l">
               <a:lnSpc>
                 <a:spcPts val="2750"/>
               </a:lnSpc>
@@ -6649,7 +7049,7 @@
           <a:bodyPr wrap="none" lIns="0" tIns="0" rIns="0" bIns="0" rtlCol="0" anchor="t"/>
           <a:lstStyle/>
           <a:p>
-            <a:pPr algn="l" marL="342900" indent="-342900">
+            <a:pPr marL="342900" indent="-342900" algn="l">
               <a:lnSpc>
                 <a:spcPts val="2850"/>
               </a:lnSpc>
@@ -6692,7 +7092,7 @@
           <a:bodyPr wrap="none" lIns="0" tIns="0" rIns="0" bIns="0" rtlCol="0" anchor="t"/>
           <a:lstStyle/>
           <a:p>
-            <a:pPr algn="l" marL="342900" indent="-342900">
+            <a:pPr marL="342900" indent="-342900" algn="l">
               <a:lnSpc>
                 <a:spcPts val="2850"/>
               </a:lnSpc>
@@ -6735,7 +7135,7 @@
           <a:bodyPr wrap="none" lIns="0" tIns="0" rIns="0" bIns="0" rtlCol="0" anchor="t"/>
           <a:lstStyle/>
           <a:p>
-            <a:pPr algn="l" marL="342900" indent="-342900">
+            <a:pPr marL="342900" indent="-342900" algn="l">
               <a:lnSpc>
                 <a:spcPts val="2850"/>
               </a:lnSpc>
@@ -6778,7 +7178,7 @@
           <a:bodyPr wrap="none" lIns="0" tIns="0" rIns="0" bIns="0" rtlCol="0" anchor="t"/>
           <a:lstStyle/>
           <a:p>
-            <a:pPr algn="l" marL="342900" indent="-342900">
+            <a:pPr marL="342900" indent="-342900" algn="l">
               <a:lnSpc>
                 <a:spcPts val="2850"/>
               </a:lnSpc>
@@ -6821,7 +7221,7 @@
           <a:bodyPr wrap="none" lIns="0" tIns="0" rIns="0" bIns="0" rtlCol="0" anchor="t"/>
           <a:lstStyle/>
           <a:p>
-            <a:pPr algn="l" marL="342900" indent="-342900">
+            <a:pPr marL="342900" indent="-342900" algn="l">
               <a:lnSpc>
                 <a:spcPts val="2850"/>
               </a:lnSpc>
@@ -6869,7 +7269,7 @@
             <a:prstDash val="solid"/>
           </a:ln>
           <a:effectLst>
-            <a:outerShdw sx="100000" sy="100000" kx="0" ky="0" algn="bl" rotWithShape="0" blurRad="0" dist="20320" dir="2700000">
+            <a:outerShdw dist="20320" dir="2700000" algn="bl" rotWithShape="0">
               <a:srgbClr val="151617">
                 <a:alpha val="100000"/>
               </a:srgbClr>
@@ -6898,7 +7298,7 @@
           <a:bodyPr wrap="none" lIns="0" tIns="0" rIns="0" bIns="0" rtlCol="0" anchor="t"/>
           <a:lstStyle/>
           <a:p>
-            <a:pPr algn="l" indent="0" marL="0">
+            <a:pPr marL="0" indent="0" algn="l">
               <a:lnSpc>
                 <a:spcPts val="2750"/>
               </a:lnSpc>
@@ -6940,7 +7340,7 @@
           <a:bodyPr wrap="square" lIns="0" tIns="0" rIns="0" bIns="0" rtlCol="0" anchor="t"/>
           <a:lstStyle/>
           <a:p>
-            <a:pPr algn="l" indent="0" marL="0">
+            <a:pPr marL="0" indent="0" algn="l">
               <a:lnSpc>
                 <a:spcPts val="2850"/>
               </a:lnSpc>
@@ -7007,7 +7407,7 @@
           <a:bodyPr wrap="none" lIns="0" tIns="0" rIns="0" bIns="0" rtlCol="0" anchor="t"/>
           <a:lstStyle/>
           <a:p>
-            <a:pPr algn="l" indent="0" marL="0">
+            <a:pPr marL="0" indent="0" algn="l">
               <a:lnSpc>
                 <a:spcPts val="5550"/>
               </a:lnSpc>
@@ -7049,7 +7449,7 @@
           <a:bodyPr wrap="none" lIns="0" tIns="0" rIns="0" bIns="0" rtlCol="0" anchor="t"/>
           <a:lstStyle/>
           <a:p>
-            <a:pPr algn="l" indent="0" marL="0">
+            <a:pPr marL="0" indent="0" algn="l">
               <a:lnSpc>
                 <a:spcPts val="2750"/>
               </a:lnSpc>
@@ -7091,7 +7491,7 @@
           <a:bodyPr wrap="none" lIns="0" tIns="0" rIns="0" bIns="0" rtlCol="0" anchor="t"/>
           <a:lstStyle/>
           <a:p>
-            <a:pPr algn="l" marL="342900" indent="-342900">
+            <a:pPr marL="342900" indent="-342900" algn="l">
               <a:lnSpc>
                 <a:spcPts val="2850"/>
               </a:lnSpc>
@@ -7134,7 +7534,7 @@
           <a:bodyPr wrap="none" lIns="0" tIns="0" rIns="0" bIns="0" rtlCol="0" anchor="t"/>
           <a:lstStyle/>
           <a:p>
-            <a:pPr algn="l" marL="342900" indent="-342900">
+            <a:pPr marL="342900" indent="-342900" algn="l">
               <a:lnSpc>
                 <a:spcPts val="2850"/>
               </a:lnSpc>
@@ -7177,7 +7577,7 @@
           <a:bodyPr wrap="none" lIns="0" tIns="0" rIns="0" bIns="0" rtlCol="0" anchor="t"/>
           <a:lstStyle/>
           <a:p>
-            <a:pPr algn="l" indent="0" marL="0">
+            <a:pPr marL="0" indent="0" algn="l">
               <a:lnSpc>
                 <a:spcPts val="2750"/>
               </a:lnSpc>
@@ -7219,7 +7619,7 @@
           <a:bodyPr wrap="none" lIns="0" tIns="0" rIns="0" bIns="0" rtlCol="0" anchor="t"/>
           <a:lstStyle/>
           <a:p>
-            <a:pPr algn="l" indent="0" marL="0">
+            <a:pPr marL="0" indent="0" algn="l">
               <a:lnSpc>
                 <a:spcPts val="2850"/>
               </a:lnSpc>
@@ -7261,7 +7661,7 @@
           <a:bodyPr wrap="none" lIns="0" tIns="0" rIns="0" bIns="0" rtlCol="0" anchor="t"/>
           <a:lstStyle/>
           <a:p>
-            <a:pPr algn="l" indent="0" marL="0">
+            <a:pPr marL="0" indent="0" algn="l">
               <a:lnSpc>
                 <a:spcPts val="2850"/>
               </a:lnSpc>
@@ -7303,7 +7703,7 @@
           <a:bodyPr wrap="none" lIns="0" tIns="0" rIns="0" bIns="0" rtlCol="0" anchor="t"/>
           <a:lstStyle/>
           <a:p>
-            <a:pPr algn="l" indent="0" marL="0">
+            <a:pPr marL="0" indent="0" algn="l">
               <a:lnSpc>
                 <a:spcPts val="2850"/>
               </a:lnSpc>
@@ -7320,12 +7720,6 @@
               </a:rPr>
               <a:t>Trade-off:</a:t>
             </a:r>
-            <a:pPr algn="l" indent="0" marL="0">
-              <a:lnSpc>
-                <a:spcPts val="2850"/>
-              </a:lnSpc>
-              <a:buNone/>
-            </a:pPr>
             <a:r>
               <a:rPr lang="en-US" sz="1750" dirty="0">
                 <a:solidFill>
@@ -7351,10 +7745,16 @@
 
 <file path=ppt/slides/slide9.xml><?xml version="1.0" encoding="utf-8"?>
 <p:sld xmlns:a="http://schemas.openxmlformats.org/drawingml/2006/main" xmlns:r="http://schemas.openxmlformats.org/officeDocument/2006/relationships" xmlns:p="http://schemas.openxmlformats.org/presentationml/2006/main">
-  <p:cSld name="Slide 9">
+  <p:cSld>
     <p:spTree>
       <p:nvGrpSpPr>
-        <p:cNvPr id="1" name=""/>
+        <p:cNvPr id="1" name="">
+          <a:extLst>
+            <a:ext uri="{FF2B5EF4-FFF2-40B4-BE49-F238E27FC236}">
+              <a16:creationId xmlns:a16="http://schemas.microsoft.com/office/drawing/2014/main" id="{314886D1-9C84-D65D-96ED-DBB5B263570B}"/>
+            </a:ext>
+          </a:extLst>
+        </p:cNvPr>
         <p:cNvGrpSpPr/>
         <p:nvPr/>
       </p:nvGrpSpPr>
@@ -7368,26 +7768,32 @@
       </p:grpSpPr>
       <p:sp>
         <p:nvSpPr>
-          <p:cNvPr id="2" name="Text 0"/>
-          <p:cNvSpPr/>
-          <p:nvPr/>
-        </p:nvSpPr>
-        <p:spPr>
-          <a:xfrm>
-            <a:off x="793790" y="2430304"/>
-            <a:ext cx="6885980" cy="708779"/>
-          </a:xfrm>
-          <a:prstGeom prst="rect">
-            <a:avLst/>
-          </a:prstGeom>
-          <a:noFill/>
-          <a:ln/>
-        </p:spPr>
-        <p:txBody>
-          <a:bodyPr wrap="none" lIns="0" tIns="0" rIns="0" bIns="0" rtlCol="0" anchor="t"/>
-          <a:lstStyle/>
-          <a:p>
-            <a:pPr algn="l" indent="0" marL="0">
+          <p:cNvPr id="2" name="Text 0">
+            <a:extLst>
+              <a:ext uri="{FF2B5EF4-FFF2-40B4-BE49-F238E27FC236}">
+                <a16:creationId xmlns:a16="http://schemas.microsoft.com/office/drawing/2014/main" id="{2F36632B-FD23-A471-30F6-018A4AE5BF1D}"/>
+              </a:ext>
+            </a:extLst>
+          </p:cNvPr>
+          <p:cNvSpPr/>
+          <p:nvPr/>
+        </p:nvSpPr>
+        <p:spPr>
+          <a:xfrm>
+            <a:off x="793789" y="1508447"/>
+            <a:ext cx="8575293" cy="708779"/>
+          </a:xfrm>
+          <a:prstGeom prst="rect">
+            <a:avLst/>
+          </a:prstGeom>
+          <a:noFill/>
+          <a:ln/>
+        </p:spPr>
+        <p:txBody>
+          <a:bodyPr wrap="none" lIns="0" tIns="0" rIns="0" bIns="0" rtlCol="0" anchor="t"/>
+          <a:lstStyle/>
+          <a:p>
+            <a:pPr marL="0" indent="0" algn="l">
               <a:lnSpc>
                 <a:spcPts val="5550"/>
               </a:lnSpc>
@@ -7402,7 +7808,7 @@
                 <a:ea typeface="Montserrat Black" pitchFamily="34" charset="-122"/>
                 <a:cs typeface="Montserrat Black" pitchFamily="34" charset="-120"/>
               </a:rPr>
-              <a:t>Current Project Status</a:t>
+              <a:t>Flask Application Overview</a:t>
             </a:r>
             <a:endParaRPr lang="en-US" sz="4450" dirty="0"/>
           </a:p>
@@ -7410,18 +7816,24 @@
       </p:sp>
       <p:sp>
         <p:nvSpPr>
-          <p:cNvPr id="3" name="Shape 1"/>
-          <p:cNvSpPr/>
-          <p:nvPr/>
-        </p:nvSpPr>
-        <p:spPr>
-          <a:xfrm>
-            <a:off x="793790" y="3592711"/>
-            <a:ext cx="6408063" cy="2206585"/>
+          <p:cNvPr id="3" name="Shape 1">
+            <a:extLst>
+              <a:ext uri="{FF2B5EF4-FFF2-40B4-BE49-F238E27FC236}">
+                <a16:creationId xmlns:a16="http://schemas.microsoft.com/office/drawing/2014/main" id="{FFE2F8C0-FA49-0F93-53A8-4FCAF21BB3F7}"/>
+              </a:ext>
+            </a:extLst>
+          </p:cNvPr>
+          <p:cNvSpPr/>
+          <p:nvPr/>
+        </p:nvSpPr>
+        <p:spPr>
+          <a:xfrm>
+            <a:off x="793790" y="3135088"/>
+            <a:ext cx="170021" cy="853321"/>
           </a:xfrm>
           <a:prstGeom prst="roundRect">
             <a:avLst>
-              <a:gd name="adj" fmla="val 414"/>
+              <a:gd name="adj" fmla="val 5378"/>
             </a:avLst>
           </a:prstGeom>
           <a:solidFill>
@@ -7434,7 +7846,7 @@
             <a:prstDash val="solid"/>
           </a:ln>
           <a:effectLst>
-            <a:outerShdw sx="100000" sy="100000" kx="0" ky="0" algn="bl" rotWithShape="0" blurRad="0" dist="20320" dir="2700000">
+            <a:outerShdw dist="20320" dir="2700000" algn="bl" rotWithShape="0">
               <a:srgbClr val="151617">
                 <a:alpha val="100000"/>
               </a:srgbClr>
@@ -7444,13 +7856,19 @@
       </p:sp>
       <p:sp>
         <p:nvSpPr>
-          <p:cNvPr id="4" name="Text 2"/>
-          <p:cNvSpPr/>
-          <p:nvPr/>
-        </p:nvSpPr>
-        <p:spPr>
-          <a:xfrm>
-            <a:off x="1028224" y="3827145"/>
+          <p:cNvPr id="4" name="Text 2">
+            <a:extLst>
+              <a:ext uri="{FF2B5EF4-FFF2-40B4-BE49-F238E27FC236}">
+                <a16:creationId xmlns:a16="http://schemas.microsoft.com/office/drawing/2014/main" id="{C1FA51E3-8671-305A-ECA9-CF2E2821DD8D}"/>
+              </a:ext>
+            </a:extLst>
+          </p:cNvPr>
+          <p:cNvSpPr/>
+          <p:nvPr/>
+        </p:nvSpPr>
+        <p:spPr>
+          <a:xfrm>
+            <a:off x="1303973" y="3135088"/>
             <a:ext cx="2835235" cy="354330"/>
           </a:xfrm>
           <a:prstGeom prst="rect">
@@ -7463,11 +7881,10 @@
           <a:bodyPr wrap="none" lIns="0" tIns="0" rIns="0" bIns="0" rtlCol="0" anchor="t"/>
           <a:lstStyle/>
           <a:p>
-            <a:pPr algn="l" indent="0" marL="0">
+            <a:pPr>
               <a:lnSpc>
                 <a:spcPts val="2750"/>
               </a:lnSpc>
-              <a:buNone/>
             </a:pPr>
             <a:r>
               <a:rPr lang="en-US" sz="2200" b="1" dirty="0">
@@ -7478,7 +7895,7 @@
                 <a:ea typeface="Montserrat Black" pitchFamily="34" charset="-122"/>
                 <a:cs typeface="Montserrat Black" pitchFamily="34" charset="-120"/>
               </a:rPr>
-              <a:t>Completed</a:t>
+              <a:t>Built with Flask</a:t>
             </a:r>
             <a:endParaRPr lang="en-US" sz="2200" dirty="0"/>
           </a:p>
@@ -7486,147 +7903,24 @@
       </p:sp>
       <p:sp>
         <p:nvSpPr>
-          <p:cNvPr id="5" name="Text 3"/>
-          <p:cNvSpPr/>
-          <p:nvPr/>
-        </p:nvSpPr>
-        <p:spPr>
-          <a:xfrm>
-            <a:off x="1028224" y="4317563"/>
-            <a:ext cx="5939195" cy="362903"/>
-          </a:xfrm>
-          <a:prstGeom prst="rect">
-            <a:avLst/>
-          </a:prstGeom>
-          <a:noFill/>
-          <a:ln/>
-        </p:spPr>
-        <p:txBody>
-          <a:bodyPr wrap="none" lIns="0" tIns="0" rIns="0" bIns="0" rtlCol="0" anchor="t"/>
-          <a:lstStyle/>
-          <a:p>
-            <a:pPr algn="l" marL="342900" indent="-342900">
-              <a:lnSpc>
-                <a:spcPts val="2850"/>
-              </a:lnSpc>
-              <a:buSzPct val="100000"/>
-              <a:buChar char="•"/>
-            </a:pPr>
-            <a:r>
-              <a:rPr lang="en-US" sz="1750" dirty="0">
-                <a:solidFill>
-                  <a:srgbClr val="151617"/>
-                </a:solidFill>
-                <a:latin typeface="Inconsolata" pitchFamily="34" charset="0"/>
-                <a:ea typeface="Inconsolata" pitchFamily="34" charset="-122"/>
-                <a:cs typeface="Inconsolata" pitchFamily="34" charset="-120"/>
-              </a:rPr>
-              <a:t>Feature engineering pipeline</a:t>
-            </a:r>
-            <a:endParaRPr lang="en-US" sz="1750" dirty="0"/>
-          </a:p>
-        </p:txBody>
-      </p:sp>
-      <p:sp>
-        <p:nvSpPr>
-          <p:cNvPr id="6" name="Text 4"/>
-          <p:cNvSpPr/>
-          <p:nvPr/>
-        </p:nvSpPr>
-        <p:spPr>
-          <a:xfrm>
-            <a:off x="1028224" y="4759762"/>
-            <a:ext cx="5939195" cy="362903"/>
-          </a:xfrm>
-          <a:prstGeom prst="rect">
-            <a:avLst/>
-          </a:prstGeom>
-          <a:noFill/>
-          <a:ln/>
-        </p:spPr>
-        <p:txBody>
-          <a:bodyPr wrap="none" lIns="0" tIns="0" rIns="0" bIns="0" rtlCol="0" anchor="t"/>
-          <a:lstStyle/>
-          <a:p>
-            <a:pPr algn="l" marL="342900" indent="-342900">
-              <a:lnSpc>
-                <a:spcPts val="2850"/>
-              </a:lnSpc>
-              <a:buSzPct val="100000"/>
-              <a:buChar char="•"/>
-            </a:pPr>
-            <a:r>
-              <a:rPr lang="en-US" sz="1750" dirty="0">
-                <a:solidFill>
-                  <a:srgbClr val="151617"/>
-                </a:solidFill>
-                <a:latin typeface="Inconsolata" pitchFamily="34" charset="0"/>
-                <a:ea typeface="Inconsolata" pitchFamily="34" charset="-122"/>
-                <a:cs typeface="Inconsolata" pitchFamily="34" charset="-120"/>
-              </a:rPr>
-              <a:t>Model training and evaluation</a:t>
-            </a:r>
-            <a:endParaRPr lang="en-US" sz="1750" dirty="0"/>
-          </a:p>
-        </p:txBody>
-      </p:sp>
-      <p:sp>
-        <p:nvSpPr>
-          <p:cNvPr id="7" name="Text 5"/>
-          <p:cNvSpPr/>
-          <p:nvPr/>
-        </p:nvSpPr>
-        <p:spPr>
-          <a:xfrm>
-            <a:off x="1028224" y="5201960"/>
-            <a:ext cx="5939195" cy="362903"/>
-          </a:xfrm>
-          <a:prstGeom prst="rect">
-            <a:avLst/>
-          </a:prstGeom>
-          <a:noFill/>
-          <a:ln/>
-        </p:spPr>
-        <p:txBody>
-          <a:bodyPr wrap="none" lIns="0" tIns="0" rIns="0" bIns="0" rtlCol="0" anchor="t"/>
-          <a:lstStyle/>
-          <a:p>
-            <a:pPr algn="l" marL="342900" indent="-342900">
-              <a:lnSpc>
-                <a:spcPts val="2850"/>
-              </a:lnSpc>
-              <a:buSzPct val="100000"/>
-              <a:buChar char="•"/>
-            </a:pPr>
-            <a:r>
-              <a:rPr lang="en-US" sz="1750" dirty="0">
-                <a:solidFill>
-                  <a:srgbClr val="151617"/>
-                </a:solidFill>
-                <a:latin typeface="Inconsolata" pitchFamily="34" charset="0"/>
-                <a:ea typeface="Inconsolata" pitchFamily="34" charset="-122"/>
-                <a:cs typeface="Inconsolata" pitchFamily="34" charset="-120"/>
-              </a:rPr>
-              <a:t>FastAPI application implementation</a:t>
-            </a:r>
-            <a:endParaRPr lang="en-US" sz="1750" dirty="0"/>
-          </a:p>
-        </p:txBody>
-      </p:sp>
-      <p:sp>
-        <p:nvSpPr>
-          <p:cNvPr id="8" name="Shape 6"/>
-          <p:cNvSpPr/>
-          <p:nvPr/>
-        </p:nvSpPr>
-        <p:spPr>
-          <a:xfrm>
-            <a:off x="7428667" y="3592711"/>
-            <a:ext cx="6408063" cy="2206585"/>
+          <p:cNvPr id="6" name="Shape 4">
+            <a:extLst>
+              <a:ext uri="{FF2B5EF4-FFF2-40B4-BE49-F238E27FC236}">
+                <a16:creationId xmlns:a16="http://schemas.microsoft.com/office/drawing/2014/main" id="{137DCD15-5FC1-02BC-EC29-1E36F83E24BB}"/>
+              </a:ext>
+            </a:extLst>
+          </p:cNvPr>
+          <p:cNvSpPr/>
+          <p:nvPr/>
+        </p:nvSpPr>
+        <p:spPr>
+          <a:xfrm>
+            <a:off x="1133951" y="4215223"/>
+            <a:ext cx="170021" cy="853321"/>
           </a:xfrm>
           <a:prstGeom prst="roundRect">
             <a:avLst>
-              <a:gd name="adj" fmla="val 414"/>
+              <a:gd name="adj" fmla="val 5378"/>
             </a:avLst>
           </a:prstGeom>
           <a:solidFill>
@@ -7639,7 +7933,7 @@
             <a:prstDash val="solid"/>
           </a:ln>
           <a:effectLst>
-            <a:outerShdw sx="100000" sy="100000" kx="0" ky="0" algn="bl" rotWithShape="0" blurRad="0" dist="20320" dir="2700000">
+            <a:outerShdw dist="20320" dir="2700000" algn="bl" rotWithShape="0">
               <a:srgbClr val="151617">
                 <a:alpha val="100000"/>
               </a:srgbClr>
@@ -7649,13 +7943,19 @@
       </p:sp>
       <p:sp>
         <p:nvSpPr>
-          <p:cNvPr id="9" name="Text 7"/>
-          <p:cNvSpPr/>
-          <p:nvPr/>
-        </p:nvSpPr>
-        <p:spPr>
-          <a:xfrm>
-            <a:off x="7663101" y="3827145"/>
+          <p:cNvPr id="7" name="Text 5">
+            <a:extLst>
+              <a:ext uri="{FF2B5EF4-FFF2-40B4-BE49-F238E27FC236}">
+                <a16:creationId xmlns:a16="http://schemas.microsoft.com/office/drawing/2014/main" id="{59B01A36-E346-F8A2-BC9B-9F5332BCE1FD}"/>
+              </a:ext>
+            </a:extLst>
+          </p:cNvPr>
+          <p:cNvSpPr/>
+          <p:nvPr/>
+        </p:nvSpPr>
+        <p:spPr>
+          <a:xfrm>
+            <a:off x="1644134" y="4215223"/>
             <a:ext cx="2835235" cy="354330"/>
           </a:xfrm>
           <a:prstGeom prst="rect">
@@ -7668,11 +7968,10 @@
           <a:bodyPr wrap="none" lIns="0" tIns="0" rIns="0" bIns="0" rtlCol="0" anchor="t"/>
           <a:lstStyle/>
           <a:p>
-            <a:pPr algn="l" indent="0" marL="0">
+            <a:pPr>
               <a:lnSpc>
                 <a:spcPts val="2750"/>
               </a:lnSpc>
-              <a:buNone/>
             </a:pPr>
             <a:r>
               <a:rPr lang="en-US" sz="2200" b="1" dirty="0">
@@ -7683,7 +7982,7 @@
                 <a:ea typeface="Montserrat Black" pitchFamily="34" charset="-122"/>
                 <a:cs typeface="Montserrat Black" pitchFamily="34" charset="-120"/>
               </a:rPr>
-              <a:t>Upcoming</a:t>
+              <a:t>Provides a full user flow</a:t>
             </a:r>
             <a:endParaRPr lang="en-US" sz="2200" dirty="0"/>
           </a:p>
@@ -7691,31 +7990,35 @@
       </p:sp>
       <p:sp>
         <p:nvSpPr>
-          <p:cNvPr id="10" name="Text 8"/>
-          <p:cNvSpPr/>
-          <p:nvPr/>
-        </p:nvSpPr>
-        <p:spPr>
-          <a:xfrm>
-            <a:off x="7663101" y="4317563"/>
-            <a:ext cx="5939195" cy="362903"/>
-          </a:xfrm>
-          <a:prstGeom prst="rect">
-            <a:avLst/>
-          </a:prstGeom>
-          <a:noFill/>
-          <a:ln/>
-        </p:spPr>
-        <p:txBody>
-          <a:bodyPr wrap="none" lIns="0" tIns="0" rIns="0" bIns="0" rtlCol="0" anchor="t"/>
-          <a:lstStyle/>
-          <a:p>
-            <a:pPr algn="l" marL="342900" indent="-342900">
+          <p:cNvPr id="8" name="Text 6">
+            <a:extLst>
+              <a:ext uri="{FF2B5EF4-FFF2-40B4-BE49-F238E27FC236}">
+                <a16:creationId xmlns:a16="http://schemas.microsoft.com/office/drawing/2014/main" id="{6100D6E1-D078-84B2-193A-996F573D30D4}"/>
+              </a:ext>
+            </a:extLst>
+          </p:cNvPr>
+          <p:cNvSpPr/>
+          <p:nvPr/>
+        </p:nvSpPr>
+        <p:spPr>
+          <a:xfrm>
+            <a:off x="1644134" y="4705641"/>
+            <a:ext cx="5333441" cy="362903"/>
+          </a:xfrm>
+          <a:prstGeom prst="rect">
+            <a:avLst/>
+          </a:prstGeom>
+          <a:noFill/>
+          <a:ln/>
+        </p:spPr>
+        <p:txBody>
+          <a:bodyPr wrap="none" lIns="0" tIns="0" rIns="0" bIns="0" rtlCol="0" anchor="t"/>
+          <a:lstStyle/>
+          <a:p>
+            <a:pPr>
               <a:lnSpc>
                 <a:spcPts val="2850"/>
               </a:lnSpc>
-              <a:buSzPct val="100000"/>
-              <a:buChar char="•"/>
             </a:pPr>
             <a:r>
               <a:rPr lang="en-US" sz="1750" dirty="0">
@@ -7726,7 +8029,7 @@
                 <a:ea typeface="Inconsolata" pitchFamily="34" charset="-122"/>
                 <a:cs typeface="Inconsolata" pitchFamily="34" charset="-120"/>
               </a:rPr>
-              <a:t>Dockerization of FastAPI app</a:t>
+              <a:t>Input form → POST request → result display</a:t>
             </a:r>
             <a:endParaRPr lang="en-US" sz="1750" dirty="0"/>
           </a:p>
@@ -7734,31 +8037,169 @@
       </p:sp>
       <p:sp>
         <p:nvSpPr>
-          <p:cNvPr id="11" name="Text 9"/>
-          <p:cNvSpPr/>
-          <p:nvPr/>
-        </p:nvSpPr>
-        <p:spPr>
-          <a:xfrm>
-            <a:off x="7663101" y="4759762"/>
-            <a:ext cx="5939195" cy="362903"/>
-          </a:xfrm>
-          <a:prstGeom prst="rect">
-            <a:avLst/>
-          </a:prstGeom>
-          <a:noFill/>
-          <a:ln/>
-        </p:spPr>
-        <p:txBody>
-          <a:bodyPr wrap="none" lIns="0" tIns="0" rIns="0" bIns="0" rtlCol="0" anchor="t"/>
-          <a:lstStyle/>
-          <a:p>
-            <a:pPr algn="l" marL="342900" indent="-342900">
+          <p:cNvPr id="9" name="Shape 7">
+            <a:extLst>
+              <a:ext uri="{FF2B5EF4-FFF2-40B4-BE49-F238E27FC236}">
+                <a16:creationId xmlns:a16="http://schemas.microsoft.com/office/drawing/2014/main" id="{70983DE9-E15B-BFC5-A059-0B85CC07F0B7}"/>
+              </a:ext>
+            </a:extLst>
+          </p:cNvPr>
+          <p:cNvSpPr/>
+          <p:nvPr/>
+        </p:nvSpPr>
+        <p:spPr>
+          <a:xfrm>
+            <a:off x="1474232" y="5295358"/>
+            <a:ext cx="170021" cy="853321"/>
+          </a:xfrm>
+          <a:prstGeom prst="roundRect">
+            <a:avLst>
+              <a:gd name="adj" fmla="val 5378"/>
+            </a:avLst>
+          </a:prstGeom>
+          <a:solidFill>
+            <a:srgbClr val="F8ECE4"/>
+          </a:solidFill>
+          <a:ln w="7620">
+            <a:solidFill>
+              <a:srgbClr val="151617"/>
+            </a:solidFill>
+            <a:prstDash val="solid"/>
+          </a:ln>
+          <a:effectLst>
+            <a:outerShdw dist="20320" dir="2700000" algn="bl" rotWithShape="0">
+              <a:srgbClr val="151617">
+                <a:alpha val="100000"/>
+              </a:srgbClr>
+            </a:outerShdw>
+          </a:effectLst>
+        </p:spPr>
+      </p:sp>
+      <p:sp>
+        <p:nvSpPr>
+          <p:cNvPr id="10" name="Text 8">
+            <a:extLst>
+              <a:ext uri="{FF2B5EF4-FFF2-40B4-BE49-F238E27FC236}">
+                <a16:creationId xmlns:a16="http://schemas.microsoft.com/office/drawing/2014/main" id="{F7E4201C-0A05-4251-D1F9-C491BACF443F}"/>
+              </a:ext>
+            </a:extLst>
+          </p:cNvPr>
+          <p:cNvSpPr/>
+          <p:nvPr/>
+        </p:nvSpPr>
+        <p:spPr>
+          <a:xfrm>
+            <a:off x="1984415" y="5295358"/>
+            <a:ext cx="3685818" cy="354330"/>
+          </a:xfrm>
+          <a:prstGeom prst="rect">
+            <a:avLst/>
+          </a:prstGeom>
+          <a:noFill/>
+          <a:ln/>
+        </p:spPr>
+        <p:txBody>
+          <a:bodyPr wrap="none" lIns="0" tIns="0" rIns="0" bIns="0" rtlCol="0" anchor="t"/>
+          <a:lstStyle/>
+          <a:p>
+            <a:pPr>
+              <a:lnSpc>
+                <a:spcPts val="2750"/>
+              </a:lnSpc>
+            </a:pPr>
+            <a:r>
+              <a:rPr lang="en-US" sz="2200" b="1" dirty="0">
+                <a:solidFill>
+                  <a:srgbClr val="151617"/>
+                </a:solidFill>
+                <a:latin typeface="Montserrat Black" pitchFamily="34" charset="0"/>
+                <a:ea typeface="Montserrat Black" pitchFamily="34" charset="-122"/>
+                <a:cs typeface="Montserrat Black" pitchFamily="34" charset="-120"/>
+              </a:rPr>
+              <a:t>HTML templates</a:t>
+            </a:r>
+            <a:endParaRPr lang="en-US" sz="2200" dirty="0"/>
+          </a:p>
+        </p:txBody>
+      </p:sp>
+      <p:sp>
+        <p:nvSpPr>
+          <p:cNvPr id="11" name="Text 9">
+            <a:extLst>
+              <a:ext uri="{FF2B5EF4-FFF2-40B4-BE49-F238E27FC236}">
+                <a16:creationId xmlns:a16="http://schemas.microsoft.com/office/drawing/2014/main" id="{86BD07F7-1108-045B-4170-859AC41E04C8}"/>
+              </a:ext>
+            </a:extLst>
+          </p:cNvPr>
+          <p:cNvSpPr/>
+          <p:nvPr/>
+        </p:nvSpPr>
+        <p:spPr>
+          <a:xfrm>
+            <a:off x="1984415" y="5785776"/>
+            <a:ext cx="2348434" cy="362903"/>
+          </a:xfrm>
+          <a:prstGeom prst="rect">
+            <a:avLst/>
+          </a:prstGeom>
+          <a:noFill/>
+          <a:ln/>
+        </p:spPr>
+        <p:txBody>
+          <a:bodyPr wrap="none" lIns="0" tIns="0" rIns="0" bIns="0" rtlCol="0" anchor="t"/>
+          <a:lstStyle/>
+          <a:p>
+            <a:pPr marL="0" indent="0" algn="l">
               <a:lnSpc>
                 <a:spcPts val="2850"/>
               </a:lnSpc>
-              <a:buSzPct val="100000"/>
-              <a:buChar char="•"/>
+              <a:buNone/>
+            </a:pPr>
+            <a:r>
+              <a:rPr lang="en-US" sz="1750" dirty="0">
+                <a:solidFill>
+                  <a:srgbClr val="151617"/>
+                </a:solidFill>
+                <a:latin typeface="Inconsolata" pitchFamily="34" charset="0"/>
+                <a:ea typeface="Inconsolata" pitchFamily="34" charset="-122"/>
+              </a:rPr>
+              <a:t>Input &amp; Result</a:t>
+            </a:r>
+            <a:endParaRPr lang="en-US" sz="1750" dirty="0"/>
+          </a:p>
+        </p:txBody>
+      </p:sp>
+      <p:sp>
+        <p:nvSpPr>
+          <p:cNvPr id="18" name="Text 6">
+            <a:extLst>
+              <a:ext uri="{FF2B5EF4-FFF2-40B4-BE49-F238E27FC236}">
+                <a16:creationId xmlns:a16="http://schemas.microsoft.com/office/drawing/2014/main" id="{FA7AE6F7-12CB-75BF-1E2F-90DC441744B1}"/>
+              </a:ext>
+            </a:extLst>
+          </p:cNvPr>
+          <p:cNvSpPr/>
+          <p:nvPr/>
+        </p:nvSpPr>
+        <p:spPr>
+          <a:xfrm>
+            <a:off x="1303972" y="3620413"/>
+            <a:ext cx="7699351" cy="362903"/>
+          </a:xfrm>
+          <a:prstGeom prst="rect">
+            <a:avLst/>
+          </a:prstGeom>
+          <a:noFill/>
+          <a:ln/>
+        </p:spPr>
+        <p:txBody>
+          <a:bodyPr wrap="none" lIns="0" tIns="0" rIns="0" bIns="0" rtlCol="0" anchor="t"/>
+          <a:lstStyle/>
+          <a:p>
+            <a:pPr>
+              <a:lnSpc>
+                <a:spcPts val="2850"/>
+              </a:lnSpc>
             </a:pPr>
             <a:r>
               <a:rPr lang="en-US" sz="1750" dirty="0">
@@ -7769,17 +8210,229 @@
                 <a:ea typeface="Inconsolata" pitchFamily="34" charset="-122"/>
                 <a:cs typeface="Inconsolata" pitchFamily="34" charset="-120"/>
               </a:rPr>
-              <a:t>API serving and deployment</a:t>
+              <a:t>Load ML model, give real-time predictions from user-entered metadata</a:t>
             </a:r>
             <a:endParaRPr lang="en-US" sz="1750" dirty="0"/>
           </a:p>
         </p:txBody>
       </p:sp>
+      <p:pic>
+        <p:nvPicPr>
+          <p:cNvPr id="22" name="图片 21">
+            <a:extLst>
+              <a:ext uri="{FF2B5EF4-FFF2-40B4-BE49-F238E27FC236}">
+                <a16:creationId xmlns:a16="http://schemas.microsoft.com/office/drawing/2014/main" id="{A4E2F03B-0626-6559-0DF8-704725E3FE55}"/>
+              </a:ext>
+            </a:extLst>
+          </p:cNvPr>
+          <p:cNvPicPr>
+            <a:picLocks noChangeAspect="1"/>
+          </p:cNvPicPr>
+          <p:nvPr/>
+        </p:nvPicPr>
+        <p:blipFill>
+          <a:blip r:embed="rId3"/>
+          <a:stretch>
+            <a:fillRect/>
+          </a:stretch>
+        </p:blipFill>
+        <p:spPr>
+          <a:xfrm>
+            <a:off x="9369082" y="2490192"/>
+            <a:ext cx="4870115" cy="3865333"/>
+          </a:xfrm>
+          <a:prstGeom prst="rect">
+            <a:avLst/>
+          </a:prstGeom>
+        </p:spPr>
+      </p:pic>
+      <p:pic>
+        <p:nvPicPr>
+          <p:cNvPr id="24" name="图片 23">
+            <a:extLst>
+              <a:ext uri="{FF2B5EF4-FFF2-40B4-BE49-F238E27FC236}">
+                <a16:creationId xmlns:a16="http://schemas.microsoft.com/office/drawing/2014/main" id="{F9346896-4C9A-1BC5-5F5E-114E2569F52B}"/>
+              </a:ext>
+            </a:extLst>
+          </p:cNvPr>
+          <p:cNvPicPr>
+            <a:picLocks noChangeAspect="1"/>
+          </p:cNvPicPr>
+          <p:nvPr/>
+        </p:nvPicPr>
+        <p:blipFill>
+          <a:blip r:embed="rId4"/>
+          <a:stretch>
+            <a:fillRect/>
+          </a:stretch>
+        </p:blipFill>
+        <p:spPr>
+          <a:xfrm>
+            <a:off x="7482806" y="4246285"/>
+            <a:ext cx="6846970" cy="2807192"/>
+          </a:xfrm>
+          <a:prstGeom prst="rect">
+            <a:avLst/>
+          </a:prstGeom>
+        </p:spPr>
+      </p:pic>
     </p:spTree>
+    <p:extLst>
+      <p:ext uri="{BB962C8B-B14F-4D97-AF65-F5344CB8AC3E}">
+        <p14:creationId xmlns:p14="http://schemas.microsoft.com/office/powerpoint/2010/main" val="2748225843"/>
+      </p:ext>
+    </p:extLst>
   </p:cSld>
   <p:clrMapOvr>
     <a:masterClrMapping/>
   </p:clrMapOvr>
+  <p:timing>
+    <p:tnLst>
+      <p:par>
+        <p:cTn id="1" dur="indefinite" restart="never" nodeType="tmRoot">
+          <p:childTnLst>
+            <p:seq concurrent="1" nextAc="seek">
+              <p:cTn id="2" dur="indefinite" nodeType="mainSeq">
+                <p:childTnLst>
+                  <p:par>
+                    <p:cTn id="3" fill="hold">
+                      <p:stCondLst>
+                        <p:cond delay="indefinite"/>
+                      </p:stCondLst>
+                      <p:childTnLst>
+                        <p:par>
+                          <p:cTn id="4" fill="hold">
+                            <p:stCondLst>
+                              <p:cond delay="0"/>
+                            </p:stCondLst>
+                            <p:childTnLst>
+                              <p:par>
+                                <p:cTn id="5" presetID="1" presetClass="entr" presetSubtype="0" fill="hold" nodeType="clickEffect">
+                                  <p:stCondLst>
+                                    <p:cond delay="0"/>
+                                  </p:stCondLst>
+                                  <p:childTnLst>
+                                    <p:set>
+                                      <p:cBhvr>
+                                        <p:cTn id="6" dur="1" fill="hold">
+                                          <p:stCondLst>
+                                            <p:cond delay="0"/>
+                                          </p:stCondLst>
+                                        </p:cTn>
+                                        <p:tgtEl>
+                                          <p:spTgt spid="24"/>
+                                        </p:tgtEl>
+                                        <p:attrNameLst>
+                                          <p:attrName>style.visibility</p:attrName>
+                                        </p:attrNameLst>
+                                      </p:cBhvr>
+                                      <p:to>
+                                        <p:strVal val="visible"/>
+                                      </p:to>
+                                    </p:set>
+                                  </p:childTnLst>
+                                </p:cTn>
+                              </p:par>
+                            </p:childTnLst>
+                          </p:cTn>
+                        </p:par>
+                      </p:childTnLst>
+                    </p:cTn>
+                  </p:par>
+                  <p:par>
+                    <p:cTn id="7" fill="hold">
+                      <p:stCondLst>
+                        <p:cond delay="indefinite"/>
+                      </p:stCondLst>
+                      <p:childTnLst>
+                        <p:par>
+                          <p:cTn id="8" fill="hold">
+                            <p:stCondLst>
+                              <p:cond delay="0"/>
+                            </p:stCondLst>
+                            <p:childTnLst>
+                              <p:par>
+                                <p:cTn id="9" presetID="1" presetClass="entr" presetSubtype="0" fill="hold" nodeType="clickEffect">
+                                  <p:stCondLst>
+                                    <p:cond delay="0"/>
+                                  </p:stCondLst>
+                                  <p:childTnLst>
+                                    <p:set>
+                                      <p:cBhvr>
+                                        <p:cTn id="10" dur="1" fill="hold">
+                                          <p:stCondLst>
+                                            <p:cond delay="0"/>
+                                          </p:stCondLst>
+                                        </p:cTn>
+                                        <p:tgtEl>
+                                          <p:spTgt spid="22"/>
+                                        </p:tgtEl>
+                                        <p:attrNameLst>
+                                          <p:attrName>style.visibility</p:attrName>
+                                        </p:attrNameLst>
+                                      </p:cBhvr>
+                                      <p:to>
+                                        <p:strVal val="visible"/>
+                                      </p:to>
+                                    </p:set>
+                                  </p:childTnLst>
+                                </p:cTn>
+                              </p:par>
+                              <p:par>
+                                <p:cTn id="11" presetID="1" presetClass="exit" presetSubtype="0" fill="hold" nodeType="withEffect">
+                                  <p:stCondLst>
+                                    <p:cond delay="0"/>
+                                  </p:stCondLst>
+                                  <p:childTnLst>
+                                    <p:set>
+                                      <p:cBhvr>
+                                        <p:cTn id="12" dur="1" fill="hold">
+                                          <p:stCondLst>
+                                            <p:cond delay="0"/>
+                                          </p:stCondLst>
+                                        </p:cTn>
+                                        <p:tgtEl>
+                                          <p:spTgt spid="24"/>
+                                        </p:tgtEl>
+                                        <p:attrNameLst>
+                                          <p:attrName>style.visibility</p:attrName>
+                                        </p:attrNameLst>
+                                      </p:cBhvr>
+                                      <p:to>
+                                        <p:strVal val="hidden"/>
+                                      </p:to>
+                                    </p:set>
+                                  </p:childTnLst>
+                                </p:cTn>
+                              </p:par>
+                            </p:childTnLst>
+                          </p:cTn>
+                        </p:par>
+                      </p:childTnLst>
+                    </p:cTn>
+                  </p:par>
+                </p:childTnLst>
+              </p:cTn>
+              <p:prevCondLst>
+                <p:cond evt="onPrev" delay="0">
+                  <p:tgtEl>
+                    <p:sldTgt/>
+                  </p:tgtEl>
+                </p:cond>
+              </p:prevCondLst>
+              <p:nextCondLst>
+                <p:cond evt="onNext" delay="0">
+                  <p:tgtEl>
+                    <p:sldTgt/>
+                  </p:tgtEl>
+                </p:cond>
+              </p:nextCondLst>
+            </p:seq>
+          </p:childTnLst>
+        </p:cTn>
+      </p:par>
+    </p:tnLst>
+  </p:timing>
 </p:sld>
 </file>
 
@@ -8076,4 +8729,299 @@
     </a:ext>
   </a:extLst>
 </a:theme>
+</file>
+
+<file path=ppt/theme/theme2.xml><?xml version="1.0" encoding="utf-8"?>
+<a:theme xmlns:a="http://schemas.openxmlformats.org/drawingml/2006/main" name="Office 主题​​">
+  <a:themeElements>
+    <a:clrScheme name="Office">
+      <a:dk1>
+        <a:sysClr val="windowText" lastClr="000000"/>
+      </a:dk1>
+      <a:lt1>
+        <a:sysClr val="window" lastClr="FFFFFF"/>
+      </a:lt1>
+      <a:dk2>
+        <a:srgbClr val="44546A"/>
+      </a:dk2>
+      <a:lt2>
+        <a:srgbClr val="E7E6E6"/>
+      </a:lt2>
+      <a:accent1>
+        <a:srgbClr val="4472C4"/>
+      </a:accent1>
+      <a:accent2>
+        <a:srgbClr val="ED7D31"/>
+      </a:accent2>
+      <a:accent3>
+        <a:srgbClr val="A5A5A5"/>
+      </a:accent3>
+      <a:accent4>
+        <a:srgbClr val="FFC000"/>
+      </a:accent4>
+      <a:accent5>
+        <a:srgbClr val="5B9BD5"/>
+      </a:accent5>
+      <a:accent6>
+        <a:srgbClr val="70AD47"/>
+      </a:accent6>
+      <a:hlink>
+        <a:srgbClr val="0563C1"/>
+      </a:hlink>
+      <a:folHlink>
+        <a:srgbClr val="954F72"/>
+      </a:folHlink>
+    </a:clrScheme>
+    <a:fontScheme name="Office">
+      <a:majorFont>
+        <a:latin typeface="等线 Light" panose="020F0302020204030204"/>
+        <a:ea typeface=""/>
+        <a:cs typeface=""/>
+        <a:font script="Jpan" typeface="游ゴシック Light"/>
+        <a:font script="Hang" typeface="맑은 고딕"/>
+        <a:font script="Hans" typeface="等线 Light"/>
+        <a:font script="Hant" typeface="新細明體"/>
+        <a:font script="Arab" typeface="Times New Roman"/>
+        <a:font script="Hebr" typeface="Times New Roman"/>
+        <a:font script="Thai" typeface="Angsana New"/>
+        <a:font script="Ethi" typeface="Nyala"/>
+        <a:font script="Beng" typeface="Vrinda"/>
+        <a:font script="Gujr" typeface="Shruti"/>
+        <a:font script="Khmr" typeface="MoolBoran"/>
+        <a:font script="Knda" typeface="Tunga"/>
+        <a:font script="Guru" typeface="Raavi"/>
+        <a:font script="Cans" typeface="Euphemia"/>
+        <a:font script="Cher" typeface="Plantagenet Cherokee"/>
+        <a:font script="Yiii" typeface="Microsoft Yi Baiti"/>
+        <a:font script="Tibt" typeface="Microsoft Himalaya"/>
+        <a:font script="Thaa" typeface="MV Boli"/>
+        <a:font script="Deva" typeface="Mangal"/>
+        <a:font script="Telu" typeface="Gautami"/>
+        <a:font script="Taml" typeface="Latha"/>
+        <a:font script="Syrc" typeface="Estrangelo Edessa"/>
+        <a:font script="Orya" typeface="Kalinga"/>
+        <a:font script="Mlym" typeface="Kartika"/>
+        <a:font script="Laoo" typeface="DokChampa"/>
+        <a:font script="Sinh" typeface="Iskoola Pota"/>
+        <a:font script="Mong" typeface="Mongolian Baiti"/>
+        <a:font script="Viet" typeface="Times New Roman"/>
+        <a:font script="Uigh" typeface="Microsoft Uighur"/>
+        <a:font script="Geor" typeface="Sylfaen"/>
+        <a:font script="Armn" typeface="Arial"/>
+        <a:font script="Bugi" typeface="Leelawadee UI"/>
+        <a:font script="Bopo" typeface="Microsoft JhengHei"/>
+        <a:font script="Java" typeface="Javanese Text"/>
+        <a:font script="Lisu" typeface="Segoe UI"/>
+        <a:font script="Mymr" typeface="Myanmar Text"/>
+        <a:font script="Nkoo" typeface="Ebrima"/>
+        <a:font script="Olck" typeface="Nirmala UI"/>
+        <a:font script="Osma" typeface="Ebrima"/>
+        <a:font script="Phag" typeface="Phagspa"/>
+        <a:font script="Syrn" typeface="Estrangelo Edessa"/>
+        <a:font script="Syrj" typeface="Estrangelo Edessa"/>
+        <a:font script="Syre" typeface="Estrangelo Edessa"/>
+        <a:font script="Sora" typeface="Nirmala UI"/>
+        <a:font script="Tale" typeface="Microsoft Tai Le"/>
+        <a:font script="Talu" typeface="Microsoft New Tai Lue"/>
+        <a:font script="Tfng" typeface="Ebrima"/>
+      </a:majorFont>
+      <a:minorFont>
+        <a:latin typeface="等线" panose="020F0502020204030204"/>
+        <a:ea typeface=""/>
+        <a:cs typeface=""/>
+        <a:font script="Jpan" typeface="游ゴシック"/>
+        <a:font script="Hang" typeface="맑은 고딕"/>
+        <a:font script="Hans" typeface="等线"/>
+        <a:font script="Hant" typeface="新細明體"/>
+        <a:font script="Arab" typeface="Arial"/>
+        <a:font script="Hebr" typeface="Arial"/>
+        <a:font script="Thai" typeface="Cordia New"/>
+        <a:font script="Ethi" typeface="Nyala"/>
+        <a:font script="Beng" typeface="Vrinda"/>
+        <a:font script="Gujr" typeface="Shruti"/>
+        <a:font script="Khmr" typeface="DaunPenh"/>
+        <a:font script="Knda" typeface="Tunga"/>
+        <a:font script="Guru" typeface="Raavi"/>
+        <a:font script="Cans" typeface="Euphemia"/>
+        <a:font script="Cher" typeface="Plantagenet Cherokee"/>
+        <a:font script="Yiii" typeface="Microsoft Yi Baiti"/>
+        <a:font script="Tibt" typeface="Microsoft Himalaya"/>
+        <a:font script="Thaa" typeface="MV Boli"/>
+        <a:font script="Deva" typeface="Mangal"/>
+        <a:font script="Telu" typeface="Gautami"/>
+        <a:font script="Taml" typeface="Latha"/>
+        <a:font script="Syrc" typeface="Estrangelo Edessa"/>
+        <a:font script="Orya" typeface="Kalinga"/>
+        <a:font script="Mlym" typeface="Kartika"/>
+        <a:font script="Laoo" typeface="DokChampa"/>
+        <a:font script="Sinh" typeface="Iskoola Pota"/>
+        <a:font script="Mong" typeface="Mongolian Baiti"/>
+        <a:font script="Viet" typeface="Arial"/>
+        <a:font script="Uigh" typeface="Microsoft Uighur"/>
+        <a:font script="Geor" typeface="Sylfaen"/>
+        <a:font script="Armn" typeface="Arial"/>
+        <a:font script="Bugi" typeface="Leelawadee UI"/>
+        <a:font script="Bopo" typeface="Microsoft JhengHei"/>
+        <a:font script="Java" typeface="Javanese Text"/>
+        <a:font script="Lisu" typeface="Segoe UI"/>
+        <a:font script="Mymr" typeface="Myanmar Text"/>
+        <a:font script="Nkoo" typeface="Ebrima"/>
+        <a:font script="Olck" typeface="Nirmala UI"/>
+        <a:font script="Osma" typeface="Ebrima"/>
+        <a:font script="Phag" typeface="Phagspa"/>
+        <a:font script="Syrn" typeface="Estrangelo Edessa"/>
+        <a:font script="Syrj" typeface="Estrangelo Edessa"/>
+        <a:font script="Syre" typeface="Estrangelo Edessa"/>
+        <a:font script="Sora" typeface="Nirmala UI"/>
+        <a:font script="Tale" typeface="Microsoft Tai Le"/>
+        <a:font script="Talu" typeface="Microsoft New Tai Lue"/>
+        <a:font script="Tfng" typeface="Ebrima"/>
+      </a:minorFont>
+    </a:fontScheme>
+    <a:fmtScheme name="Office">
+      <a:fillStyleLst>
+        <a:solidFill>
+          <a:schemeClr val="phClr"/>
+        </a:solidFill>
+        <a:gradFill rotWithShape="1">
+          <a:gsLst>
+            <a:gs pos="0">
+              <a:schemeClr val="phClr">
+                <a:lumMod val="110000"/>
+                <a:satMod val="105000"/>
+                <a:tint val="67000"/>
+              </a:schemeClr>
+            </a:gs>
+            <a:gs pos="50000">
+              <a:schemeClr val="phClr">
+                <a:lumMod val="105000"/>
+                <a:satMod val="103000"/>
+                <a:tint val="73000"/>
+              </a:schemeClr>
+            </a:gs>
+            <a:gs pos="100000">
+              <a:schemeClr val="phClr">
+                <a:lumMod val="105000"/>
+                <a:satMod val="109000"/>
+                <a:tint val="81000"/>
+              </a:schemeClr>
+            </a:gs>
+          </a:gsLst>
+          <a:lin ang="5400000" scaled="0"/>
+        </a:gradFill>
+        <a:gradFill rotWithShape="1">
+          <a:gsLst>
+            <a:gs pos="0">
+              <a:schemeClr val="phClr">
+                <a:satMod val="103000"/>
+                <a:lumMod val="102000"/>
+                <a:tint val="94000"/>
+              </a:schemeClr>
+            </a:gs>
+            <a:gs pos="50000">
+              <a:schemeClr val="phClr">
+                <a:satMod val="110000"/>
+                <a:lumMod val="100000"/>
+                <a:shade val="100000"/>
+              </a:schemeClr>
+            </a:gs>
+            <a:gs pos="100000">
+              <a:schemeClr val="phClr">
+                <a:lumMod val="99000"/>
+                <a:satMod val="120000"/>
+                <a:shade val="78000"/>
+              </a:schemeClr>
+            </a:gs>
+          </a:gsLst>
+          <a:lin ang="5400000" scaled="0"/>
+        </a:gradFill>
+      </a:fillStyleLst>
+      <a:lnStyleLst>
+        <a:ln w="6350" cap="flat" cmpd="sng" algn="ctr">
+          <a:solidFill>
+            <a:schemeClr val="phClr"/>
+          </a:solidFill>
+          <a:prstDash val="solid"/>
+          <a:miter lim="800000"/>
+        </a:ln>
+        <a:ln w="12700" cap="flat" cmpd="sng" algn="ctr">
+          <a:solidFill>
+            <a:schemeClr val="phClr"/>
+          </a:solidFill>
+          <a:prstDash val="solid"/>
+          <a:miter lim="800000"/>
+        </a:ln>
+        <a:ln w="19050" cap="flat" cmpd="sng" algn="ctr">
+          <a:solidFill>
+            <a:schemeClr val="phClr"/>
+          </a:solidFill>
+          <a:prstDash val="solid"/>
+          <a:miter lim="800000"/>
+        </a:ln>
+      </a:lnStyleLst>
+      <a:effectStyleLst>
+        <a:effectStyle>
+          <a:effectLst/>
+        </a:effectStyle>
+        <a:effectStyle>
+          <a:effectLst/>
+        </a:effectStyle>
+        <a:effectStyle>
+          <a:effectLst>
+            <a:outerShdw blurRad="57150" dist="19050" dir="5400000" algn="ctr" rotWithShape="0">
+              <a:srgbClr val="000000">
+                <a:alpha val="63000"/>
+              </a:srgbClr>
+            </a:outerShdw>
+          </a:effectLst>
+        </a:effectStyle>
+      </a:effectStyleLst>
+      <a:bgFillStyleLst>
+        <a:solidFill>
+          <a:schemeClr val="phClr"/>
+        </a:solidFill>
+        <a:solidFill>
+          <a:schemeClr val="phClr">
+            <a:tint val="95000"/>
+            <a:satMod val="170000"/>
+          </a:schemeClr>
+        </a:solidFill>
+        <a:gradFill rotWithShape="1">
+          <a:gsLst>
+            <a:gs pos="0">
+              <a:schemeClr val="phClr">
+                <a:tint val="93000"/>
+                <a:satMod val="150000"/>
+                <a:shade val="98000"/>
+                <a:lumMod val="102000"/>
+              </a:schemeClr>
+            </a:gs>
+            <a:gs pos="50000">
+              <a:schemeClr val="phClr">
+                <a:tint val="98000"/>
+                <a:satMod val="130000"/>
+                <a:shade val="90000"/>
+                <a:lumMod val="103000"/>
+              </a:schemeClr>
+            </a:gs>
+            <a:gs pos="100000">
+              <a:schemeClr val="phClr">
+                <a:shade val="63000"/>
+                <a:satMod val="120000"/>
+              </a:schemeClr>
+            </a:gs>
+          </a:gsLst>
+          <a:lin ang="5400000" scaled="0"/>
+        </a:gradFill>
+      </a:bgFillStyleLst>
+    </a:fmtScheme>
+  </a:themeElements>
+  <a:objectDefaults/>
+  <a:extraClrSchemeLst/>
+  <a:extLst>
+    <a:ext uri="{05A4C25C-085E-4340-85A3-A5531E510DB2}">
+      <thm15:themeFamily xmlns:thm15="http://schemas.microsoft.com/office/thememl/2012/main" name="Office Theme" id="{62F939B6-93AF-4DB8-9C6B-D6C7DFDC589F}" vid="{4A3C46E8-61CC-4603-A589-7422A47A8E4A}"/>
+    </a:ext>
+  </a:extLst>
+</a:theme>
 </file>
</xml_diff>

<commit_message>
Removed the watermark at the bottom right
</commit_message>
<xml_diff>
--- a/StarGazers.pptx
+++ b/StarGazers.pptx
@@ -24,11 +24,11 @@
   <p:notesSz cx="8229600" cy="14630400"/>
   <p:embeddedFontLst>
     <p:embeddedFont>
-      <p:font typeface="Inconsolata" pitchFamily="49" charset="0"/>
+      <p:font typeface="Inconsolata" pitchFamily="1" charset="0"/>
       <p:regular r:id="rId14"/>
     </p:embeddedFont>
     <p:embeddedFont>
-      <p:font typeface="Montserrat Black" panose="020F0502020204030204" pitchFamily="34" charset="0"/>
+      <p:font typeface="Montserrat Black" panose="00000A00000000000000" pitchFamily="2" charset="0"/>
       <p:regular r:id="rId15"/>
       <p:bold r:id="rId16"/>
       <p:italic r:id="rId17"/>
@@ -2666,6 +2666,58 @@
           </a:p>
         </p:txBody>
       </p:sp>
+      <p:sp>
+        <p:nvSpPr>
+          <p:cNvPr id="5" name="Rectangle 4">
+            <a:extLst>
+              <a:ext uri="{FF2B5EF4-FFF2-40B4-BE49-F238E27FC236}">
+                <a16:creationId xmlns:a16="http://schemas.microsoft.com/office/drawing/2014/main" id="{5E3FC0EC-C2D1-5A93-3986-75CD451E74E0}"/>
+              </a:ext>
+            </a:extLst>
+          </p:cNvPr>
+          <p:cNvSpPr/>
+          <p:nvPr/>
+        </p:nvSpPr>
+        <p:spPr>
+          <a:xfrm>
+            <a:off x="11564983" y="7646125"/>
+            <a:ext cx="2978331" cy="548640"/>
+          </a:xfrm>
+          <a:prstGeom prst="rect">
+            <a:avLst/>
+          </a:prstGeom>
+          <a:solidFill>
+            <a:srgbClr val="F8ECE4"/>
+          </a:solidFill>
+          <a:ln>
+            <a:noFill/>
+          </a:ln>
+        </p:spPr>
+        <p:style>
+          <a:lnRef idx="2">
+            <a:schemeClr val="dk1">
+              <a:shade val="15000"/>
+            </a:schemeClr>
+          </a:lnRef>
+          <a:fillRef idx="1">
+            <a:schemeClr val="dk1"/>
+          </a:fillRef>
+          <a:effectRef idx="0">
+            <a:schemeClr val="dk1"/>
+          </a:effectRef>
+          <a:fontRef idx="minor">
+            <a:schemeClr val="lt1"/>
+          </a:fontRef>
+        </p:style>
+        <p:txBody>
+          <a:bodyPr rtlCol="0" anchor="ctr"/>
+          <a:lstStyle/>
+          <a:p>
+            <a:pPr algn="ctr"/>
+            <a:endParaRPr lang="en-GB"/>
+          </a:p>
+        </p:txBody>
+      </p:sp>
     </p:spTree>
   </p:cSld>
   <p:clrMapOvr>
@@ -2766,6 +2818,13 @@
             </a:outerShdw>
           </a:effectLst>
         </p:spPr>
+        <p:txBody>
+          <a:bodyPr/>
+          <a:lstStyle/>
+          <a:p>
+            <a:endParaRPr lang="en-GB"/>
+          </a:p>
+        </p:txBody>
       </p:sp>
       <p:sp>
         <p:nvSpPr>
@@ -2971,6 +3030,13 @@
             </a:outerShdw>
           </a:effectLst>
         </p:spPr>
+        <p:txBody>
+          <a:bodyPr/>
+          <a:lstStyle/>
+          <a:p>
+            <a:endParaRPr lang="en-GB"/>
+          </a:p>
+        </p:txBody>
       </p:sp>
       <p:sp>
         <p:nvSpPr>
@@ -3097,6 +3163,58 @@
               <a:t>API serving and deployment</a:t>
             </a:r>
             <a:endParaRPr lang="en-US" sz="1750" dirty="0"/>
+          </a:p>
+        </p:txBody>
+      </p:sp>
+      <p:sp>
+        <p:nvSpPr>
+          <p:cNvPr id="12" name="Rectangle 11">
+            <a:extLst>
+              <a:ext uri="{FF2B5EF4-FFF2-40B4-BE49-F238E27FC236}">
+                <a16:creationId xmlns:a16="http://schemas.microsoft.com/office/drawing/2014/main" id="{66416E9F-DD7B-8F44-C49B-2D9323F724DC}"/>
+              </a:ext>
+            </a:extLst>
+          </p:cNvPr>
+          <p:cNvSpPr/>
+          <p:nvPr/>
+        </p:nvSpPr>
+        <p:spPr>
+          <a:xfrm>
+            <a:off x="11564983" y="7646125"/>
+            <a:ext cx="2978331" cy="548640"/>
+          </a:xfrm>
+          <a:prstGeom prst="rect">
+            <a:avLst/>
+          </a:prstGeom>
+          <a:solidFill>
+            <a:srgbClr val="F8ECE4"/>
+          </a:solidFill>
+          <a:ln>
+            <a:noFill/>
+          </a:ln>
+        </p:spPr>
+        <p:style>
+          <a:lnRef idx="2">
+            <a:schemeClr val="dk1">
+              <a:shade val="15000"/>
+            </a:schemeClr>
+          </a:lnRef>
+          <a:fillRef idx="1">
+            <a:schemeClr val="dk1"/>
+          </a:fillRef>
+          <a:effectRef idx="0">
+            <a:schemeClr val="dk1"/>
+          </a:effectRef>
+          <a:fontRef idx="minor">
+            <a:schemeClr val="lt1"/>
+          </a:fontRef>
+        </p:style>
+        <p:txBody>
+          <a:bodyPr rtlCol="0" anchor="ctr"/>
+          <a:lstStyle/>
+          <a:p>
+            <a:pPr algn="ctr"/>
+            <a:endParaRPr lang="en-GB"/>
           </a:p>
         </p:txBody>
       </p:sp>
@@ -3200,6 +3318,13 @@
             </a:outerShdw>
           </a:effectLst>
         </p:spPr>
+        <p:txBody>
+          <a:bodyPr/>
+          <a:lstStyle/>
+          <a:p>
+            <a:endParaRPr lang="en-GB"/>
+          </a:p>
+        </p:txBody>
       </p:sp>
       <p:sp>
         <p:nvSpPr>
@@ -3329,6 +3454,13 @@
             </a:outerShdw>
           </a:effectLst>
         </p:spPr>
+        <p:txBody>
+          <a:bodyPr/>
+          <a:lstStyle/>
+          <a:p>
+            <a:endParaRPr lang="en-GB"/>
+          </a:p>
+        </p:txBody>
       </p:sp>
       <p:sp>
         <p:nvSpPr>
@@ -3447,6 +3579,13 @@
             </a:outerShdw>
           </a:effectLst>
         </p:spPr>
+        <p:txBody>
+          <a:bodyPr/>
+          <a:lstStyle/>
+          <a:p>
+            <a:endParaRPr lang="en-GB"/>
+          </a:p>
+        </p:txBody>
       </p:sp>
       <p:sp>
         <p:nvSpPr>
@@ -3565,6 +3704,13 @@
             </a:outerShdw>
           </a:effectLst>
         </p:spPr>
+        <p:txBody>
+          <a:bodyPr/>
+          <a:lstStyle/>
+          <a:p>
+            <a:endParaRPr lang="en-GB"/>
+          </a:p>
+        </p:txBody>
       </p:sp>
       <p:sp>
         <p:nvSpPr>
@@ -3683,6 +3829,13 @@
             </a:outerShdw>
           </a:effectLst>
         </p:spPr>
+        <p:txBody>
+          <a:bodyPr/>
+          <a:lstStyle/>
+          <a:p>
+            <a:endParaRPr lang="en-GB"/>
+          </a:p>
+        </p:txBody>
       </p:sp>
       <p:sp>
         <p:nvSpPr>
@@ -3765,6 +3918,58 @@
               <a:t>Prepare final report and evaluation</a:t>
             </a:r>
             <a:endParaRPr lang="en-US" sz="1750" dirty="0"/>
+          </a:p>
+        </p:txBody>
+      </p:sp>
+      <p:sp>
+        <p:nvSpPr>
+          <p:cNvPr id="18" name="Rectangle 17">
+            <a:extLst>
+              <a:ext uri="{FF2B5EF4-FFF2-40B4-BE49-F238E27FC236}">
+                <a16:creationId xmlns:a16="http://schemas.microsoft.com/office/drawing/2014/main" id="{49014B23-BAB7-3DAA-F0D1-3EBF836DD34B}"/>
+              </a:ext>
+            </a:extLst>
+          </p:cNvPr>
+          <p:cNvSpPr/>
+          <p:nvPr/>
+        </p:nvSpPr>
+        <p:spPr>
+          <a:xfrm>
+            <a:off x="11564983" y="7646125"/>
+            <a:ext cx="2978331" cy="548640"/>
+          </a:xfrm>
+          <a:prstGeom prst="rect">
+            <a:avLst/>
+          </a:prstGeom>
+          <a:solidFill>
+            <a:srgbClr val="F8ECE4"/>
+          </a:solidFill>
+          <a:ln>
+            <a:noFill/>
+          </a:ln>
+        </p:spPr>
+        <p:style>
+          <a:lnRef idx="2">
+            <a:schemeClr val="dk1">
+              <a:shade val="15000"/>
+            </a:schemeClr>
+          </a:lnRef>
+          <a:fillRef idx="1">
+            <a:schemeClr val="dk1"/>
+          </a:fillRef>
+          <a:effectRef idx="0">
+            <a:schemeClr val="dk1"/>
+          </a:effectRef>
+          <a:fontRef idx="minor">
+            <a:schemeClr val="lt1"/>
+          </a:fontRef>
+        </p:style>
+        <p:txBody>
+          <a:bodyPr rtlCol="0" anchor="ctr"/>
+          <a:lstStyle/>
+          <a:p>
+            <a:pPr algn="ctr"/>
+            <a:endParaRPr lang="en-GB"/>
           </a:p>
         </p:txBody>
       </p:sp>
@@ -3868,6 +4073,13 @@
             </a:outerShdw>
           </a:effectLst>
         </p:spPr>
+        <p:txBody>
+          <a:bodyPr/>
+          <a:lstStyle/>
+          <a:p>
+            <a:endParaRPr lang="en-GB"/>
+          </a:p>
+        </p:txBody>
       </p:sp>
       <p:sp>
         <p:nvSpPr>
@@ -4159,6 +4371,13 @@
             </a:outerShdw>
           </a:effectLst>
         </p:spPr>
+        <p:txBody>
+          <a:bodyPr/>
+          <a:lstStyle/>
+          <a:p>
+            <a:endParaRPr lang="en-GB"/>
+          </a:p>
+        </p:txBody>
       </p:sp>
       <p:sp>
         <p:nvSpPr>
@@ -4277,6 +4496,13 @@
             </a:outerShdw>
           </a:effectLst>
         </p:spPr>
+        <p:txBody>
+          <a:bodyPr/>
+          <a:lstStyle/>
+          <a:p>
+            <a:endParaRPr lang="en-GB"/>
+          </a:p>
+        </p:txBody>
       </p:sp>
       <p:sp>
         <p:nvSpPr>
@@ -4489,6 +4715,58 @@
               <a:t>GitHub API</a:t>
             </a:r>
             <a:endParaRPr lang="en-US" sz="1750" dirty="0"/>
+          </a:p>
+        </p:txBody>
+      </p:sp>
+      <p:sp>
+        <p:nvSpPr>
+          <p:cNvPr id="19" name="Rectangle 18">
+            <a:extLst>
+              <a:ext uri="{FF2B5EF4-FFF2-40B4-BE49-F238E27FC236}">
+                <a16:creationId xmlns:a16="http://schemas.microsoft.com/office/drawing/2014/main" id="{58208489-DEC4-66A4-5206-3C480EBB65ED}"/>
+              </a:ext>
+            </a:extLst>
+          </p:cNvPr>
+          <p:cNvSpPr/>
+          <p:nvPr/>
+        </p:nvSpPr>
+        <p:spPr>
+          <a:xfrm>
+            <a:off x="11564983" y="7646125"/>
+            <a:ext cx="2978331" cy="548640"/>
+          </a:xfrm>
+          <a:prstGeom prst="rect">
+            <a:avLst/>
+          </a:prstGeom>
+          <a:solidFill>
+            <a:srgbClr val="F8ECE4"/>
+          </a:solidFill>
+          <a:ln>
+            <a:noFill/>
+          </a:ln>
+        </p:spPr>
+        <p:style>
+          <a:lnRef idx="2">
+            <a:schemeClr val="dk1">
+              <a:shade val="15000"/>
+            </a:schemeClr>
+          </a:lnRef>
+          <a:fillRef idx="1">
+            <a:schemeClr val="dk1"/>
+          </a:fillRef>
+          <a:effectRef idx="0">
+            <a:schemeClr val="dk1"/>
+          </a:effectRef>
+          <a:fontRef idx="minor">
+            <a:schemeClr val="lt1"/>
+          </a:fontRef>
+        </p:style>
+        <p:txBody>
+          <a:bodyPr rtlCol="0" anchor="ctr"/>
+          <a:lstStyle/>
+          <a:p>
+            <a:pPr algn="ctr"/>
+            <a:endParaRPr lang="en-GB"/>
           </a:p>
         </p:txBody>
       </p:sp>
@@ -4592,6 +4870,13 @@
             </a:outerShdw>
           </a:effectLst>
         </p:spPr>
+        <p:txBody>
+          <a:bodyPr/>
+          <a:lstStyle/>
+          <a:p>
+            <a:endParaRPr lang="en-GB"/>
+          </a:p>
+        </p:txBody>
       </p:sp>
       <p:pic>
         <p:nvPicPr>
@@ -4734,6 +5019,13 @@
             </a:outerShdw>
           </a:effectLst>
         </p:spPr>
+        <p:txBody>
+          <a:bodyPr/>
+          <a:lstStyle/>
+          <a:p>
+            <a:endParaRPr lang="en-GB"/>
+          </a:p>
+        </p:txBody>
       </p:sp>
       <p:pic>
         <p:nvPicPr>
@@ -4876,6 +5168,13 @@
             </a:outerShdw>
           </a:effectLst>
         </p:spPr>
+        <p:txBody>
+          <a:bodyPr/>
+          <a:lstStyle/>
+          <a:p>
+            <a:endParaRPr lang="en-GB"/>
+          </a:p>
+        </p:txBody>
       </p:sp>
       <p:pic>
         <p:nvPicPr>
@@ -5018,6 +5317,13 @@
             </a:outerShdw>
           </a:effectLst>
         </p:spPr>
+        <p:txBody>
+          <a:bodyPr/>
+          <a:lstStyle/>
+          <a:p>
+            <a:endParaRPr lang="en-GB"/>
+          </a:p>
+        </p:txBody>
       </p:sp>
       <p:pic>
         <p:nvPicPr>
@@ -5124,6 +5430,58 @@
               <a:t>Serve predictions through an API endpoint</a:t>
             </a:r>
             <a:endParaRPr lang="en-US" sz="1750" dirty="0"/>
+          </a:p>
+        </p:txBody>
+      </p:sp>
+      <p:sp>
+        <p:nvSpPr>
+          <p:cNvPr id="19" name="Rectangle 18">
+            <a:extLst>
+              <a:ext uri="{FF2B5EF4-FFF2-40B4-BE49-F238E27FC236}">
+                <a16:creationId xmlns:a16="http://schemas.microsoft.com/office/drawing/2014/main" id="{AB503306-0901-EEAA-970A-E6F09A867947}"/>
+              </a:ext>
+            </a:extLst>
+          </p:cNvPr>
+          <p:cNvSpPr/>
+          <p:nvPr/>
+        </p:nvSpPr>
+        <p:spPr>
+          <a:xfrm>
+            <a:off x="11564983" y="7646125"/>
+            <a:ext cx="2978331" cy="548640"/>
+          </a:xfrm>
+          <a:prstGeom prst="rect">
+            <a:avLst/>
+          </a:prstGeom>
+          <a:solidFill>
+            <a:srgbClr val="F8ECE4"/>
+          </a:solidFill>
+          <a:ln>
+            <a:noFill/>
+          </a:ln>
+        </p:spPr>
+        <p:style>
+          <a:lnRef idx="2">
+            <a:schemeClr val="dk1">
+              <a:shade val="15000"/>
+            </a:schemeClr>
+          </a:lnRef>
+          <a:fillRef idx="1">
+            <a:schemeClr val="dk1"/>
+          </a:fillRef>
+          <a:effectRef idx="0">
+            <a:schemeClr val="dk1"/>
+          </a:effectRef>
+          <a:fontRef idx="minor">
+            <a:schemeClr val="lt1"/>
+          </a:fontRef>
+        </p:style>
+        <p:txBody>
+          <a:bodyPr rtlCol="0" anchor="ctr"/>
+          <a:lstStyle/>
+          <a:p>
+            <a:pPr algn="ctr"/>
+            <a:endParaRPr lang="en-GB"/>
           </a:p>
         </p:txBody>
       </p:sp>
@@ -5227,6 +5585,13 @@
             </a:outerShdw>
           </a:effectLst>
         </p:spPr>
+        <p:txBody>
+          <a:bodyPr/>
+          <a:lstStyle/>
+          <a:p>
+            <a:endParaRPr lang="en-GB"/>
+          </a:p>
+        </p:txBody>
       </p:sp>
       <p:sp>
         <p:nvSpPr>
@@ -5345,6 +5710,13 @@
             </a:outerShdw>
           </a:effectLst>
         </p:spPr>
+        <p:txBody>
+          <a:bodyPr/>
+          <a:lstStyle/>
+          <a:p>
+            <a:endParaRPr lang="en-GB"/>
+          </a:p>
+        </p:txBody>
       </p:sp>
       <p:sp>
         <p:nvSpPr>
@@ -5463,6 +5835,13 @@
             </a:outerShdw>
           </a:effectLst>
         </p:spPr>
+        <p:txBody>
+          <a:bodyPr/>
+          <a:lstStyle/>
+          <a:p>
+            <a:endParaRPr lang="en-GB"/>
+          </a:p>
+        </p:txBody>
       </p:sp>
       <p:sp>
         <p:nvSpPr>
@@ -5581,6 +5960,13 @@
             </a:outerShdw>
           </a:effectLst>
         </p:spPr>
+        <p:txBody>
+          <a:bodyPr/>
+          <a:lstStyle/>
+          <a:p>
+            <a:endParaRPr lang="en-GB"/>
+          </a:p>
+        </p:txBody>
       </p:sp>
       <p:sp>
         <p:nvSpPr>
@@ -5663,6 +6049,58 @@
               <a:t>Flask prediction endpoint (in progress)</a:t>
             </a:r>
             <a:endParaRPr lang="en-US" sz="1750" dirty="0"/>
+          </a:p>
+        </p:txBody>
+      </p:sp>
+      <p:sp>
+        <p:nvSpPr>
+          <p:cNvPr id="15" name="Rectangle 14">
+            <a:extLst>
+              <a:ext uri="{FF2B5EF4-FFF2-40B4-BE49-F238E27FC236}">
+                <a16:creationId xmlns:a16="http://schemas.microsoft.com/office/drawing/2014/main" id="{A9F47D3B-0DDE-1AFE-F8A8-DA6E6606C60F}"/>
+              </a:ext>
+            </a:extLst>
+          </p:cNvPr>
+          <p:cNvSpPr/>
+          <p:nvPr/>
+        </p:nvSpPr>
+        <p:spPr>
+          <a:xfrm>
+            <a:off x="11564983" y="7646125"/>
+            <a:ext cx="2978331" cy="548640"/>
+          </a:xfrm>
+          <a:prstGeom prst="rect">
+            <a:avLst/>
+          </a:prstGeom>
+          <a:solidFill>
+            <a:srgbClr val="F8ECE4"/>
+          </a:solidFill>
+          <a:ln>
+            <a:noFill/>
+          </a:ln>
+        </p:spPr>
+        <p:style>
+          <a:lnRef idx="2">
+            <a:schemeClr val="dk1">
+              <a:shade val="15000"/>
+            </a:schemeClr>
+          </a:lnRef>
+          <a:fillRef idx="1">
+            <a:schemeClr val="dk1"/>
+          </a:fillRef>
+          <a:effectRef idx="0">
+            <a:schemeClr val="dk1"/>
+          </a:effectRef>
+          <a:fontRef idx="minor">
+            <a:schemeClr val="lt1"/>
+          </a:fontRef>
+        </p:style>
+        <p:txBody>
+          <a:bodyPr rtlCol="0" anchor="ctr"/>
+          <a:lstStyle/>
+          <a:p>
+            <a:pPr algn="ctr"/>
+            <a:endParaRPr lang="en-GB"/>
           </a:p>
         </p:txBody>
       </p:sp>
@@ -6032,6 +6470,58 @@
           </a:p>
         </p:txBody>
       </p:sp>
+      <p:sp>
+        <p:nvSpPr>
+          <p:cNvPr id="10" name="Rectangle 9">
+            <a:extLst>
+              <a:ext uri="{FF2B5EF4-FFF2-40B4-BE49-F238E27FC236}">
+                <a16:creationId xmlns:a16="http://schemas.microsoft.com/office/drawing/2014/main" id="{663FA5F2-417B-B4FD-9E1C-D44041EF0F9A}"/>
+              </a:ext>
+            </a:extLst>
+          </p:cNvPr>
+          <p:cNvSpPr/>
+          <p:nvPr/>
+        </p:nvSpPr>
+        <p:spPr>
+          <a:xfrm>
+            <a:off x="11564983" y="7646125"/>
+            <a:ext cx="2978331" cy="548640"/>
+          </a:xfrm>
+          <a:prstGeom prst="rect">
+            <a:avLst/>
+          </a:prstGeom>
+          <a:solidFill>
+            <a:srgbClr val="F8ECE4"/>
+          </a:solidFill>
+          <a:ln>
+            <a:noFill/>
+          </a:ln>
+        </p:spPr>
+        <p:style>
+          <a:lnRef idx="2">
+            <a:schemeClr val="dk1">
+              <a:shade val="15000"/>
+            </a:schemeClr>
+          </a:lnRef>
+          <a:fillRef idx="1">
+            <a:schemeClr val="dk1"/>
+          </a:fillRef>
+          <a:effectRef idx="0">
+            <a:schemeClr val="dk1"/>
+          </a:effectRef>
+          <a:fontRef idx="minor">
+            <a:schemeClr val="lt1"/>
+          </a:fontRef>
+        </p:style>
+        <p:txBody>
+          <a:bodyPr rtlCol="0" anchor="ctr"/>
+          <a:lstStyle/>
+          <a:p>
+            <a:pPr algn="ctr"/>
+            <a:endParaRPr lang="en-GB"/>
+          </a:p>
+        </p:txBody>
+      </p:sp>
     </p:spTree>
   </p:cSld>
   <p:clrMapOvr>
@@ -6767,6 +7257,58 @@
           </a:p>
         </p:txBody>
       </p:sp>
+      <p:sp>
+        <p:nvSpPr>
+          <p:cNvPr id="20" name="Rectangle 19">
+            <a:extLst>
+              <a:ext uri="{FF2B5EF4-FFF2-40B4-BE49-F238E27FC236}">
+                <a16:creationId xmlns:a16="http://schemas.microsoft.com/office/drawing/2014/main" id="{9E938AC8-DDAA-C07D-D50C-6F8E6EE8E596}"/>
+              </a:ext>
+            </a:extLst>
+          </p:cNvPr>
+          <p:cNvSpPr/>
+          <p:nvPr/>
+        </p:nvSpPr>
+        <p:spPr>
+          <a:xfrm>
+            <a:off x="11564983" y="7646125"/>
+            <a:ext cx="2978331" cy="548640"/>
+          </a:xfrm>
+          <a:prstGeom prst="rect">
+            <a:avLst/>
+          </a:prstGeom>
+          <a:solidFill>
+            <a:srgbClr val="F8ECE4"/>
+          </a:solidFill>
+          <a:ln>
+            <a:noFill/>
+          </a:ln>
+        </p:spPr>
+        <p:style>
+          <a:lnRef idx="2">
+            <a:schemeClr val="dk1">
+              <a:shade val="15000"/>
+            </a:schemeClr>
+          </a:lnRef>
+          <a:fillRef idx="1">
+            <a:schemeClr val="dk1"/>
+          </a:fillRef>
+          <a:effectRef idx="0">
+            <a:schemeClr val="dk1"/>
+          </a:effectRef>
+          <a:fontRef idx="minor">
+            <a:schemeClr val="lt1"/>
+          </a:fontRef>
+        </p:style>
+        <p:txBody>
+          <a:bodyPr rtlCol="0" anchor="ctr"/>
+          <a:lstStyle/>
+          <a:p>
+            <a:pPr algn="ctr"/>
+            <a:endParaRPr lang="en-GB"/>
+          </a:p>
+        </p:txBody>
+      </p:sp>
     </p:spTree>
   </p:cSld>
   <p:clrMapOvr>
@@ -6867,6 +7409,13 @@
             </a:outerShdw>
           </a:effectLst>
         </p:spPr>
+        <p:txBody>
+          <a:bodyPr/>
+          <a:lstStyle/>
+          <a:p>
+            <a:endParaRPr lang="en-GB"/>
+          </a:p>
+        </p:txBody>
       </p:sp>
       <p:sp>
         <p:nvSpPr>
@@ -6985,6 +7534,13 @@
             </a:outerShdw>
           </a:effectLst>
         </p:spPr>
+        <p:txBody>
+          <a:bodyPr/>
+          <a:lstStyle/>
+          <a:p>
+            <a:endParaRPr lang="en-GB"/>
+          </a:p>
+        </p:txBody>
       </p:sp>
       <p:sp>
         <p:nvSpPr>
@@ -7276,6 +7832,13 @@
             </a:outerShdw>
           </a:effectLst>
         </p:spPr>
+        <p:txBody>
+          <a:bodyPr/>
+          <a:lstStyle/>
+          <a:p>
+            <a:endParaRPr lang="en-GB"/>
+          </a:p>
+        </p:txBody>
       </p:sp>
       <p:sp>
         <p:nvSpPr>
@@ -7358,6 +7921,58 @@
               <a:t>R² scores ranged from 0.51 to 0.61</a:t>
             </a:r>
             <a:endParaRPr lang="en-US" sz="1750" dirty="0"/>
+          </a:p>
+        </p:txBody>
+      </p:sp>
+      <p:sp>
+        <p:nvSpPr>
+          <p:cNvPr id="16" name="Rectangle 15">
+            <a:extLst>
+              <a:ext uri="{FF2B5EF4-FFF2-40B4-BE49-F238E27FC236}">
+                <a16:creationId xmlns:a16="http://schemas.microsoft.com/office/drawing/2014/main" id="{77D2D548-DAB7-FA30-E800-36C2924D6A22}"/>
+              </a:ext>
+            </a:extLst>
+          </p:cNvPr>
+          <p:cNvSpPr/>
+          <p:nvPr/>
+        </p:nvSpPr>
+        <p:spPr>
+          <a:xfrm>
+            <a:off x="11564983" y="7646125"/>
+            <a:ext cx="2978331" cy="548640"/>
+          </a:xfrm>
+          <a:prstGeom prst="rect">
+            <a:avLst/>
+          </a:prstGeom>
+          <a:solidFill>
+            <a:srgbClr val="F8ECE4"/>
+          </a:solidFill>
+          <a:ln>
+            <a:noFill/>
+          </a:ln>
+        </p:spPr>
+        <p:style>
+          <a:lnRef idx="2">
+            <a:schemeClr val="dk1">
+              <a:shade val="15000"/>
+            </a:schemeClr>
+          </a:lnRef>
+          <a:fillRef idx="1">
+            <a:schemeClr val="dk1"/>
+          </a:fillRef>
+          <a:effectRef idx="0">
+            <a:schemeClr val="dk1"/>
+          </a:effectRef>
+          <a:fontRef idx="minor">
+            <a:schemeClr val="lt1"/>
+          </a:fontRef>
+        </p:style>
+        <p:txBody>
+          <a:bodyPr rtlCol="0" anchor="ctr"/>
+          <a:lstStyle/>
+          <a:p>
+            <a:pPr algn="ctr"/>
+            <a:endParaRPr lang="en-GB"/>
           </a:p>
         </p:txBody>
       </p:sp>
@@ -7732,6 +8347,58 @@
               <a:t> High accuracy but poor generalization</a:t>
             </a:r>
             <a:endParaRPr lang="en-US" sz="1750" dirty="0"/>
+          </a:p>
+        </p:txBody>
+      </p:sp>
+      <p:sp>
+        <p:nvSpPr>
+          <p:cNvPr id="10" name="Rectangle 9">
+            <a:extLst>
+              <a:ext uri="{FF2B5EF4-FFF2-40B4-BE49-F238E27FC236}">
+                <a16:creationId xmlns:a16="http://schemas.microsoft.com/office/drawing/2014/main" id="{416382B0-D660-26FE-4793-F25FA94A3611}"/>
+              </a:ext>
+            </a:extLst>
+          </p:cNvPr>
+          <p:cNvSpPr/>
+          <p:nvPr/>
+        </p:nvSpPr>
+        <p:spPr>
+          <a:xfrm>
+            <a:off x="11564983" y="7646125"/>
+            <a:ext cx="2978331" cy="548640"/>
+          </a:xfrm>
+          <a:prstGeom prst="rect">
+            <a:avLst/>
+          </a:prstGeom>
+          <a:solidFill>
+            <a:srgbClr val="F8ECE4"/>
+          </a:solidFill>
+          <a:ln>
+            <a:noFill/>
+          </a:ln>
+        </p:spPr>
+        <p:style>
+          <a:lnRef idx="2">
+            <a:schemeClr val="dk1">
+              <a:shade val="15000"/>
+            </a:schemeClr>
+          </a:lnRef>
+          <a:fillRef idx="1">
+            <a:schemeClr val="dk1"/>
+          </a:fillRef>
+          <a:effectRef idx="0">
+            <a:schemeClr val="dk1"/>
+          </a:effectRef>
+          <a:fontRef idx="minor">
+            <a:schemeClr val="lt1"/>
+          </a:fontRef>
+        </p:style>
+        <p:txBody>
+          <a:bodyPr rtlCol="0" anchor="ctr"/>
+          <a:lstStyle/>
+          <a:p>
+            <a:pPr algn="ctr"/>
+            <a:endParaRPr lang="en-GB"/>
           </a:p>
         </p:txBody>
       </p:sp>
@@ -7853,6 +8520,13 @@
             </a:outerShdw>
           </a:effectLst>
         </p:spPr>
+        <p:txBody>
+          <a:bodyPr/>
+          <a:lstStyle/>
+          <a:p>
+            <a:endParaRPr lang="en-GB"/>
+          </a:p>
+        </p:txBody>
       </p:sp>
       <p:sp>
         <p:nvSpPr>
@@ -7940,6 +8614,13 @@
             </a:outerShdw>
           </a:effectLst>
         </p:spPr>
+        <p:txBody>
+          <a:bodyPr/>
+          <a:lstStyle/>
+          <a:p>
+            <a:endParaRPr lang="en-GB"/>
+          </a:p>
+        </p:txBody>
       </p:sp>
       <p:sp>
         <p:nvSpPr>
@@ -8074,6 +8755,13 @@
             </a:outerShdw>
           </a:effectLst>
         </p:spPr>
+        <p:txBody>
+          <a:bodyPr/>
+          <a:lstStyle/>
+          <a:p>
+            <a:endParaRPr lang="en-GB"/>
+          </a:p>
+        </p:txBody>
       </p:sp>
       <p:sp>
         <p:nvSpPr>
@@ -8276,6 +8964,58 @@
           </a:prstGeom>
         </p:spPr>
       </p:pic>
+      <p:sp>
+        <p:nvSpPr>
+          <p:cNvPr id="5" name="Rectangle 4">
+            <a:extLst>
+              <a:ext uri="{FF2B5EF4-FFF2-40B4-BE49-F238E27FC236}">
+                <a16:creationId xmlns:a16="http://schemas.microsoft.com/office/drawing/2014/main" id="{2C7C165E-7199-B18C-2E1E-C3FDC45E666B}"/>
+              </a:ext>
+            </a:extLst>
+          </p:cNvPr>
+          <p:cNvSpPr/>
+          <p:nvPr/>
+        </p:nvSpPr>
+        <p:spPr>
+          <a:xfrm>
+            <a:off x="11564983" y="7646125"/>
+            <a:ext cx="2978331" cy="548640"/>
+          </a:xfrm>
+          <a:prstGeom prst="rect">
+            <a:avLst/>
+          </a:prstGeom>
+          <a:solidFill>
+            <a:srgbClr val="F8ECE4"/>
+          </a:solidFill>
+          <a:ln>
+            <a:noFill/>
+          </a:ln>
+        </p:spPr>
+        <p:style>
+          <a:lnRef idx="2">
+            <a:schemeClr val="dk1">
+              <a:shade val="15000"/>
+            </a:schemeClr>
+          </a:lnRef>
+          <a:fillRef idx="1">
+            <a:schemeClr val="dk1"/>
+          </a:fillRef>
+          <a:effectRef idx="0">
+            <a:schemeClr val="dk1"/>
+          </a:effectRef>
+          <a:fontRef idx="minor">
+            <a:schemeClr val="lt1"/>
+          </a:fontRef>
+        </p:style>
+        <p:txBody>
+          <a:bodyPr rtlCol="0" anchor="ctr"/>
+          <a:lstStyle/>
+          <a:p>
+            <a:pPr algn="ctr"/>
+            <a:endParaRPr lang="en-GB"/>
+          </a:p>
+        </p:txBody>
+      </p:sp>
     </p:spTree>
     <p:extLst>
       <p:ext uri="{BB962C8B-B14F-4D97-AF65-F5344CB8AC3E}">

</xml_diff>